<commit_message>
Getting to the finish line
Added quite a few slides and diagrams
</commit_message>
<xml_diff>
--- a/presentation/us-17-Swami-SGX-Remote-Attestation-Is-Not-Sufficient.pptx
+++ b/presentation/us-17-Swami-SGX-Remote-Attestation-Is-Not-Sufficient.pptx
@@ -5,7 +5,7 @@
     <p:sldMasterId id="2147483648" r:id="rId1"/>
   </p:sldMasterIdLst>
   <p:notesMasterIdLst>
-    <p:notesMasterId r:id="rId19"/>
+    <p:notesMasterId r:id="rId21"/>
   </p:notesMasterIdLst>
   <p:sldIdLst>
     <p:sldId id="256" r:id="rId2"/>
@@ -22,9 +22,11 @@
     <p:sldId id="266" r:id="rId13"/>
     <p:sldId id="273" r:id="rId14"/>
     <p:sldId id="271" r:id="rId15"/>
-    <p:sldId id="272" r:id="rId16"/>
-    <p:sldId id="267" r:id="rId17"/>
-    <p:sldId id="268" r:id="rId18"/>
+    <p:sldId id="278" r:id="rId16"/>
+    <p:sldId id="272" r:id="rId17"/>
+    <p:sldId id="267" r:id="rId18"/>
+    <p:sldId id="268" r:id="rId19"/>
+    <p:sldId id="279" r:id="rId20"/>
   </p:sldIdLst>
   <p:sldSz cx="12192000" cy="6858000"/>
   <p:notesSz cx="6858000" cy="9144000"/>
@@ -228,7 +230,7 @@
           <a:p>
             <a:fld id="{D05950A8-7D29-42E5-BF04-268604A9F382}" type="datetimeFigureOut">
               <a:rPr lang="en-US" smtClean="0"/>
-              <a:t>7/23/2017</a:t>
+              <a:t>7/24/2017</a:t>
             </a:fld>
             <a:endParaRPr lang="en-US"/>
           </a:p>
@@ -1064,6 +1066,90 @@
           <a:p>
             <a:fld id="{BC62DBB3-CA1F-4185-9E97-9B426BC1F1DF}" type="slidenum">
               <a:rPr lang="en-US" smtClean="0"/>
+              <a:t>8</a:t>
+            </a:fld>
+            <a:endParaRPr lang="en-US"/>
+          </a:p>
+        </p:txBody>
+      </p:sp>
+    </p:spTree>
+    <p:extLst>
+      <p:ext uri="{BB962C8B-B14F-4D97-AF65-F5344CB8AC3E}">
+        <p14:creationId xmlns:p14="http://schemas.microsoft.com/office/powerpoint/2010/main" val="4182362411"/>
+      </p:ext>
+    </p:extLst>
+  </p:cSld>
+  <p:clrMapOvr>
+    <a:masterClrMapping/>
+  </p:clrMapOvr>
+</p:notes>
+</file>
+
+<file path=ppt/notesSlides/notesSlide8.xml><?xml version="1.0" encoding="utf-8"?>
+<p:notes xmlns:a="http://schemas.openxmlformats.org/drawingml/2006/main" xmlns:r="http://schemas.openxmlformats.org/officeDocument/2006/relationships" xmlns:p="http://schemas.openxmlformats.org/presentationml/2006/main">
+  <p:cSld>
+    <p:spTree>
+      <p:nvGrpSpPr>
+        <p:cNvPr id="1" name=""/>
+        <p:cNvGrpSpPr/>
+        <p:nvPr/>
+      </p:nvGrpSpPr>
+      <p:grpSpPr>
+        <a:xfrm>
+          <a:off x="0" y="0"/>
+          <a:ext cx="0" cy="0"/>
+          <a:chOff x="0" y="0"/>
+          <a:chExt cx="0" cy="0"/>
+        </a:xfrm>
+      </p:grpSpPr>
+      <p:sp>
+        <p:nvSpPr>
+          <p:cNvPr id="2" name="Slide Image Placeholder 1"/>
+          <p:cNvSpPr>
+            <a:spLocks noGrp="1" noRot="1" noChangeAspect="1"/>
+          </p:cNvSpPr>
+          <p:nvPr>
+            <p:ph type="sldImg"/>
+          </p:nvPr>
+        </p:nvSpPr>
+        <p:spPr/>
+      </p:sp>
+      <p:sp>
+        <p:nvSpPr>
+          <p:cNvPr id="3" name="Notes Placeholder 2"/>
+          <p:cNvSpPr>
+            <a:spLocks noGrp="1"/>
+          </p:cNvSpPr>
+          <p:nvPr>
+            <p:ph type="body" idx="1"/>
+          </p:nvPr>
+        </p:nvSpPr>
+        <p:spPr/>
+        <p:txBody>
+          <a:bodyPr/>
+          <a:lstStyle/>
+          <a:p>
+            <a:endParaRPr lang="en-US" dirty="0"/>
+          </a:p>
+        </p:txBody>
+      </p:sp>
+      <p:sp>
+        <p:nvSpPr>
+          <p:cNvPr id="4" name="Slide Number Placeholder 3"/>
+          <p:cNvSpPr>
+            <a:spLocks noGrp="1"/>
+          </p:cNvSpPr>
+          <p:nvPr>
+            <p:ph type="sldNum" sz="quarter" idx="10"/>
+          </p:nvPr>
+        </p:nvSpPr>
+        <p:spPr/>
+        <p:txBody>
+          <a:bodyPr/>
+          <a:lstStyle/>
+          <a:p>
+            <a:fld id="{BC62DBB3-CA1F-4185-9E97-9B426BC1F1DF}" type="slidenum">
+              <a:rPr lang="en-US" smtClean="0"/>
               <a:t>9</a:t>
             </a:fld>
             <a:endParaRPr lang="en-US"/>
@@ -1212,7 +1298,7 @@
           <a:p>
             <a:fld id="{FA75F998-5F87-6E42-8922-48408A16CBB5}" type="datetimeFigureOut">
               <a:rPr lang="en-US" smtClean="0"/>
-              <a:t>7/23/2017</a:t>
+              <a:t>7/24/2017</a:t>
             </a:fld>
             <a:endParaRPr lang="en-US"/>
           </a:p>
@@ -1380,7 +1466,7 @@
           <a:p>
             <a:fld id="{FA75F998-5F87-6E42-8922-48408A16CBB5}" type="datetimeFigureOut">
               <a:rPr lang="en-US" smtClean="0"/>
-              <a:t>7/23/2017</a:t>
+              <a:t>7/24/2017</a:t>
             </a:fld>
             <a:endParaRPr lang="en-US"/>
           </a:p>
@@ -1558,7 +1644,7 @@
           <a:p>
             <a:fld id="{FA75F998-5F87-6E42-8922-48408A16CBB5}" type="datetimeFigureOut">
               <a:rPr lang="en-US" smtClean="0"/>
-              <a:t>7/23/2017</a:t>
+              <a:t>7/24/2017</a:t>
             </a:fld>
             <a:endParaRPr lang="en-US"/>
           </a:p>
@@ -1726,7 +1812,7 @@
           <a:p>
             <a:fld id="{FA75F998-5F87-6E42-8922-48408A16CBB5}" type="datetimeFigureOut">
               <a:rPr lang="en-US" smtClean="0"/>
-              <a:t>7/23/2017</a:t>
+              <a:t>7/24/2017</a:t>
             </a:fld>
             <a:endParaRPr lang="en-US"/>
           </a:p>
@@ -1971,7 +2057,7 @@
           <a:p>
             <a:fld id="{FA75F998-5F87-6E42-8922-48408A16CBB5}" type="datetimeFigureOut">
               <a:rPr lang="en-US" smtClean="0"/>
-              <a:t>7/23/2017</a:t>
+              <a:t>7/24/2017</a:t>
             </a:fld>
             <a:endParaRPr lang="en-US"/>
           </a:p>
@@ -2200,7 +2286,7 @@
           <a:p>
             <a:fld id="{FA75F998-5F87-6E42-8922-48408A16CBB5}" type="datetimeFigureOut">
               <a:rPr lang="en-US" smtClean="0"/>
-              <a:t>7/23/2017</a:t>
+              <a:t>7/24/2017</a:t>
             </a:fld>
             <a:endParaRPr lang="en-US"/>
           </a:p>
@@ -2564,7 +2650,7 @@
           <a:p>
             <a:fld id="{FA75F998-5F87-6E42-8922-48408A16CBB5}" type="datetimeFigureOut">
               <a:rPr lang="en-US" smtClean="0"/>
-              <a:t>7/23/2017</a:t>
+              <a:t>7/24/2017</a:t>
             </a:fld>
             <a:endParaRPr lang="en-US"/>
           </a:p>
@@ -2681,7 +2767,7 @@
           <a:p>
             <a:fld id="{FA75F998-5F87-6E42-8922-48408A16CBB5}" type="datetimeFigureOut">
               <a:rPr lang="en-US" smtClean="0"/>
-              <a:t>7/23/2017</a:t>
+              <a:t>7/24/2017</a:t>
             </a:fld>
             <a:endParaRPr lang="en-US"/>
           </a:p>
@@ -2776,7 +2862,7 @@
           <a:p>
             <a:fld id="{FA75F998-5F87-6E42-8922-48408A16CBB5}" type="datetimeFigureOut">
               <a:rPr lang="en-US" smtClean="0"/>
-              <a:t>7/23/2017</a:t>
+              <a:t>7/24/2017</a:t>
             </a:fld>
             <a:endParaRPr lang="en-US"/>
           </a:p>
@@ -3051,7 +3137,7 @@
           <a:p>
             <a:fld id="{FA75F998-5F87-6E42-8922-48408A16CBB5}" type="datetimeFigureOut">
               <a:rPr lang="en-US" smtClean="0"/>
-              <a:t>7/23/2017</a:t>
+              <a:t>7/24/2017</a:t>
             </a:fld>
             <a:endParaRPr lang="en-US"/>
           </a:p>
@@ -3303,7 +3389,7 @@
           <a:p>
             <a:fld id="{FA75F998-5F87-6E42-8922-48408A16CBB5}" type="datetimeFigureOut">
               <a:rPr lang="en-US" smtClean="0"/>
-              <a:t>7/23/2017</a:t>
+              <a:t>7/24/2017</a:t>
             </a:fld>
             <a:endParaRPr lang="en-US"/>
           </a:p>
@@ -3520,7 +3606,7 @@
           <a:p>
             <a:fld id="{FA75F998-5F87-6E42-8922-48408A16CBB5}" type="datetimeFigureOut">
               <a:rPr lang="en-US" smtClean="0"/>
-              <a:t>7/23/2017</a:t>
+              <a:t>7/24/2017</a:t>
             </a:fld>
             <a:endParaRPr lang="en-US"/>
           </a:p>
@@ -5236,6 +5322,187 @@
           </a:p>
         </p:txBody>
       </p:sp>
+      <p:sp>
+        <p:nvSpPr>
+          <p:cNvPr id="3" name="Content Placeholder 2">
+            <a:extLst>
+              <a:ext uri="{FF2B5EF4-FFF2-40B4-BE49-F238E27FC236}">
+                <a16:creationId xmlns:a16="http://schemas.microsoft.com/office/drawing/2014/main" id="{F35A8FAD-E0AC-43F5-90F2-105B38815131}"/>
+              </a:ext>
+            </a:extLst>
+          </p:cNvPr>
+          <p:cNvSpPr>
+            <a:spLocks noGrp="1"/>
+          </p:cNvSpPr>
+          <p:nvPr>
+            <p:ph idx="1"/>
+          </p:nvPr>
+        </p:nvSpPr>
+        <p:spPr>
+          <a:xfrm>
+            <a:off x="347179" y="2092850"/>
+            <a:ext cx="11124385" cy="4263941"/>
+          </a:xfrm>
+        </p:spPr>
+        <p:txBody>
+          <a:bodyPr>
+            <a:normAutofit/>
+          </a:bodyPr>
+          <a:lstStyle/>
+          <a:p>
+            <a:pPr marL="0" indent="0">
+              <a:buNone/>
+            </a:pPr>
+            <a:r>
+              <a:rPr lang="en-US" b="1" dirty="0"/>
+              <a:t>Goal</a:t>
+            </a:r>
+            <a:r>
+              <a:rPr lang="en-US" dirty="0"/>
+              <a:t>: </a:t>
+            </a:r>
+            <a:r>
+              <a:rPr lang="en-US" dirty="0">
+                <a:solidFill>
+                  <a:srgbClr val="0070C0"/>
+                </a:solidFill>
+              </a:rPr>
+              <a:t>How to bootstrap EPID credentials and join SGX EPID Group</a:t>
+            </a:r>
+          </a:p>
+          <a:p>
+            <a:pPr lvl="1"/>
+            <a:r>
+              <a:rPr lang="en-US" dirty="0"/>
+              <a:t>EPID Join protocol only defines how to get group member certificate</a:t>
+            </a:r>
+          </a:p>
+          <a:p>
+            <a:r>
+              <a:rPr lang="en-US" dirty="0"/>
+              <a:t>Handled by two Intel Provided Enclave:</a:t>
+            </a:r>
+          </a:p>
+          <a:p>
+            <a:pPr lvl="1"/>
+            <a:r>
+              <a:rPr lang="en-US" dirty="0" err="1">
+                <a:solidFill>
+                  <a:srgbClr val="C00000"/>
+                </a:solidFill>
+              </a:rPr>
+              <a:t>PvE</a:t>
+            </a:r>
+            <a:r>
+              <a:rPr lang="en-US" dirty="0"/>
+              <a:t> (Provisioning Enclave)</a:t>
+            </a:r>
+          </a:p>
+          <a:p>
+            <a:pPr lvl="1"/>
+            <a:r>
+              <a:rPr lang="en-US" dirty="0" err="1">
+                <a:solidFill>
+                  <a:srgbClr val="C00000"/>
+                </a:solidFill>
+              </a:rPr>
+              <a:t>PcE</a:t>
+            </a:r>
+            <a:r>
+              <a:rPr lang="en-US" dirty="0"/>
+              <a:t> (Provisioning Certification Enclave?)</a:t>
+            </a:r>
+          </a:p>
+          <a:p>
+            <a:pPr lvl="1"/>
+            <a:r>
+              <a:rPr lang="en-US" dirty="0"/>
+              <a:t>Both enclaves have access to Provision Key</a:t>
+            </a:r>
+          </a:p>
+          <a:p>
+            <a:pPr lvl="1"/>
+            <a:r>
+              <a:rPr lang="en-US" dirty="0"/>
+              <a:t>Launch Enclave limits access to Provision Key to only these two enclaves</a:t>
+            </a:r>
+          </a:p>
+          <a:p>
+            <a:r>
+              <a:rPr lang="en-US" dirty="0"/>
+              <a:t>Each platform given a Provisioning ID (PPID)</a:t>
+            </a:r>
+          </a:p>
+          <a:p>
+            <a:pPr lvl="1"/>
+            <a:r>
+              <a:rPr lang="en-US" dirty="0" err="1">
+                <a:latin typeface="Inconsolata" panose="020B0609030003000000" pitchFamily="49" charset="0"/>
+              </a:rPr>
+              <a:t>ppid</a:t>
+            </a:r>
+            <a:r>
+              <a:rPr lang="en-US" dirty="0"/>
+              <a:t> </a:t>
+            </a:r>
+            <a:r>
+              <a:rPr lang="en-US" dirty="0">
+                <a:sym typeface="Symbol" panose="05050102010706020507" pitchFamily="18" charset="2"/>
+              </a:rPr>
+              <a:t></a:t>
+            </a:r>
+            <a:r>
+              <a:rPr lang="en-US" dirty="0"/>
+              <a:t> </a:t>
+            </a:r>
+            <a:r>
+              <a:rPr lang="en-US" b="1" dirty="0" err="1"/>
+              <a:t>cmac</a:t>
+            </a:r>
+            <a:r>
+              <a:rPr lang="en-US" dirty="0"/>
+              <a:t>(</a:t>
+            </a:r>
+            <a:r>
+              <a:rPr lang="en-US" dirty="0" err="1">
+                <a:latin typeface="Inconsolata" panose="020B0609030003000000" pitchFamily="49" charset="0"/>
+              </a:rPr>
+              <a:t>provision_key</a:t>
+            </a:r>
+            <a:r>
+              <a:rPr lang="en-US" dirty="0"/>
+              <a:t>, </a:t>
+            </a:r>
+            <a:r>
+              <a:rPr lang="en-US" dirty="0">
+                <a:latin typeface="Inconsolata" panose="020B0609030003000000" pitchFamily="49" charset="0"/>
+              </a:rPr>
+              <a:t>0</a:t>
+            </a:r>
+            <a:r>
+              <a:rPr lang="en-US" baseline="-25000" dirty="0">
+                <a:latin typeface="Inconsolata" panose="020B0609030003000000" pitchFamily="49" charset="0"/>
+              </a:rPr>
+              <a:t>128</a:t>
+            </a:r>
+            <a:r>
+              <a:rPr lang="en-US" dirty="0"/>
+              <a:t>)</a:t>
+            </a:r>
+          </a:p>
+          <a:p>
+            <a:pPr lvl="1"/>
+            <a:r>
+              <a:rPr lang="en-US" dirty="0">
+                <a:solidFill>
+                  <a:srgbClr val="C00000"/>
+                </a:solidFill>
+              </a:rPr>
+              <a:t>Platform provisioning is not anonymous</a:t>
+            </a:r>
+          </a:p>
+        </p:txBody>
+      </p:sp>
     </p:spTree>
     <p:extLst>
       <p:ext uri="{BB962C8B-B14F-4D97-AF65-F5344CB8AC3E}">
@@ -5294,7 +5561,346 @@
                   <a:schemeClr val="accent4"/>
                 </a:solidFill>
               </a:rPr>
-              <a:t>EPID Provisioning (2)</a:t>
+              <a:t>SGX EPID Provisioning (2)</a:t>
+            </a:r>
+          </a:p>
+        </p:txBody>
+      </p:sp>
+      <p:sp>
+        <p:nvSpPr>
+          <p:cNvPr id="3" name="Content Placeholder 2">
+            <a:extLst>
+              <a:ext uri="{FF2B5EF4-FFF2-40B4-BE49-F238E27FC236}">
+                <a16:creationId xmlns:a16="http://schemas.microsoft.com/office/drawing/2014/main" id="{F35A8FAD-E0AC-43F5-90F2-105B38815131}"/>
+              </a:ext>
+            </a:extLst>
+          </p:cNvPr>
+          <p:cNvSpPr>
+            <a:spLocks noGrp="1"/>
+          </p:cNvSpPr>
+          <p:nvPr>
+            <p:ph idx="1"/>
+          </p:nvPr>
+        </p:nvSpPr>
+        <p:spPr>
+          <a:xfrm>
+            <a:off x="347179" y="1442504"/>
+            <a:ext cx="11124385" cy="5329924"/>
+          </a:xfrm>
+        </p:spPr>
+        <p:txBody>
+          <a:bodyPr>
+            <a:normAutofit fontScale="92500" lnSpcReduction="10000"/>
+          </a:bodyPr>
+          <a:lstStyle/>
+          <a:p>
+            <a:r>
+              <a:rPr lang="en-US" dirty="0"/>
+              <a:t>Endpoint Selection</a:t>
+            </a:r>
+          </a:p>
+          <a:p>
+            <a:pPr lvl="1"/>
+            <a:r>
+              <a:rPr lang="en-US" dirty="0" err="1"/>
+              <a:t>PvE</a:t>
+            </a:r>
+            <a:r>
+              <a:rPr lang="en-US" dirty="0"/>
+              <a:t>/</a:t>
+            </a:r>
+            <a:r>
+              <a:rPr lang="en-US" dirty="0" err="1"/>
+              <a:t>PcE</a:t>
+            </a:r>
+            <a:r>
+              <a:rPr lang="en-US" dirty="0"/>
+              <a:t> send OAEP encrypted PPID to IAS</a:t>
+            </a:r>
+          </a:p>
+          <a:p>
+            <a:pPr lvl="1"/>
+            <a:r>
+              <a:rPr lang="en-US" dirty="0"/>
+              <a:t>IAS responds with &lt;nonce, Signed EPID System </a:t>
+            </a:r>
+            <a:r>
+              <a:rPr lang="en-US" dirty="0" err="1"/>
+              <a:t>Params</a:t>
+            </a:r>
+            <a:r>
+              <a:rPr lang="en-US" dirty="0"/>
+              <a:t>&gt;</a:t>
+            </a:r>
+          </a:p>
+          <a:p>
+            <a:r>
+              <a:rPr lang="en-US" dirty="0" err="1"/>
+              <a:t>EpidJoin</a:t>
+            </a:r>
+            <a:r>
+              <a:rPr lang="en-US" dirty="0"/>
+              <a:t> (</a:t>
+            </a:r>
+            <a:r>
+              <a:rPr lang="en-US" dirty="0" err="1"/>
+              <a:t>PvE</a:t>
+            </a:r>
+            <a:r>
+              <a:rPr lang="en-US" dirty="0"/>
+              <a:t>/</a:t>
+            </a:r>
+            <a:r>
+              <a:rPr lang="en-US" dirty="0" err="1"/>
+              <a:t>PcE</a:t>
+            </a:r>
+            <a:r>
+              <a:rPr lang="en-US" dirty="0"/>
+              <a:t> action)</a:t>
+            </a:r>
+          </a:p>
+          <a:p>
+            <a:pPr lvl="1"/>
+            <a:r>
+              <a:rPr lang="en-US" dirty="0"/>
+              <a:t>Generate </a:t>
+            </a:r>
+            <a:r>
+              <a:rPr lang="en-US" dirty="0" err="1">
+                <a:solidFill>
+                  <a:srgbClr val="0070C0"/>
+                </a:solidFill>
+              </a:rPr>
+              <a:t>EpidPrivateKey</a:t>
+            </a:r>
+            <a:r>
+              <a:rPr lang="en-US" dirty="0"/>
+              <a:t> and </a:t>
+            </a:r>
+            <a:r>
+              <a:rPr lang="en-US" dirty="0" err="1">
+                <a:solidFill>
+                  <a:srgbClr val="0070C0"/>
+                </a:solidFill>
+              </a:rPr>
+              <a:t>EpidJoinRequest</a:t>
+            </a:r>
+            <a:r>
+              <a:rPr lang="en-US" dirty="0"/>
+              <a:t> with given nonce</a:t>
+            </a:r>
+          </a:p>
+          <a:p>
+            <a:pPr lvl="1"/>
+            <a:r>
+              <a:rPr lang="en-US" dirty="0"/>
+              <a:t>Encrypt </a:t>
+            </a:r>
+            <a:r>
+              <a:rPr lang="en-US" dirty="0" err="1">
+                <a:solidFill>
+                  <a:srgbClr val="0070C0"/>
+                </a:solidFill>
+              </a:rPr>
+              <a:t>EpidPrivateKey</a:t>
+            </a:r>
+            <a:r>
+              <a:rPr lang="en-US" dirty="0"/>
+              <a:t> with </a:t>
+            </a:r>
+            <a:r>
+              <a:rPr lang="en-US" dirty="0" err="1">
+                <a:solidFill>
+                  <a:srgbClr val="C00000"/>
+                </a:solidFill>
+              </a:rPr>
+              <a:t>ProvisioningSealKey</a:t>
+            </a:r>
+            <a:r>
+              <a:rPr lang="en-US" dirty="0"/>
+              <a:t> to create </a:t>
+            </a:r>
+            <a:r>
+              <a:rPr lang="en-US" dirty="0" err="1">
+                <a:solidFill>
+                  <a:srgbClr val="0070C0"/>
+                </a:solidFill>
+              </a:rPr>
+              <a:t>EpidKeyEscrow</a:t>
+            </a:r>
+            <a:endParaRPr lang="en-US" dirty="0">
+              <a:solidFill>
+                <a:srgbClr val="0070C0"/>
+              </a:solidFill>
+            </a:endParaRPr>
+          </a:p>
+          <a:p>
+            <a:pPr lvl="1"/>
+            <a:r>
+              <a:rPr lang="en-US" dirty="0"/>
+              <a:t>Encrypt </a:t>
+            </a:r>
+            <a:r>
+              <a:rPr lang="en-US" dirty="0" err="1">
+                <a:solidFill>
+                  <a:srgbClr val="0070C0"/>
+                </a:solidFill>
+              </a:rPr>
+              <a:t>EpidJoinRequest</a:t>
+            </a:r>
+            <a:r>
+              <a:rPr lang="en-US" dirty="0">
+                <a:solidFill>
+                  <a:srgbClr val="0070C0"/>
+                </a:solidFill>
+              </a:rPr>
+              <a:t> || </a:t>
+            </a:r>
+            <a:r>
+              <a:rPr lang="en-US" dirty="0" err="1">
+                <a:solidFill>
+                  <a:srgbClr val="0070C0"/>
+                </a:solidFill>
+              </a:rPr>
+              <a:t>EpidKeyEscrow</a:t>
+            </a:r>
+            <a:r>
+              <a:rPr lang="en-US" dirty="0">
+                <a:solidFill>
+                  <a:srgbClr val="0070C0"/>
+                </a:solidFill>
+              </a:rPr>
+              <a:t> </a:t>
+            </a:r>
+            <a:r>
+              <a:rPr lang="en-US" dirty="0"/>
+              <a:t>with</a:t>
+            </a:r>
+            <a:r>
+              <a:rPr lang="en-US" dirty="0">
+                <a:solidFill>
+                  <a:srgbClr val="0070C0"/>
+                </a:solidFill>
+              </a:rPr>
+              <a:t> </a:t>
+            </a:r>
+            <a:r>
+              <a:rPr lang="en-US" dirty="0" err="1">
+                <a:solidFill>
+                  <a:srgbClr val="C00000"/>
+                </a:solidFill>
+              </a:rPr>
+              <a:t>ProvisioningKey</a:t>
+            </a:r>
+            <a:endParaRPr lang="en-US" dirty="0">
+              <a:solidFill>
+                <a:srgbClr val="C00000"/>
+              </a:solidFill>
+            </a:endParaRPr>
+          </a:p>
+          <a:p>
+            <a:pPr lvl="1"/>
+            <a:r>
+              <a:rPr lang="en-US" dirty="0"/>
+              <a:t>ECDSA sign encrypted blob with a key derived from </a:t>
+            </a:r>
+            <a:r>
+              <a:rPr lang="en-US" dirty="0" err="1">
+                <a:solidFill>
+                  <a:srgbClr val="C00000"/>
+                </a:solidFill>
+              </a:rPr>
+              <a:t>ProvisioningKey</a:t>
+            </a:r>
+            <a:endParaRPr lang="en-US" dirty="0">
+              <a:solidFill>
+                <a:srgbClr val="C00000"/>
+              </a:solidFill>
+            </a:endParaRPr>
+          </a:p>
+          <a:p>
+            <a:pPr lvl="1"/>
+            <a:r>
+              <a:rPr lang="en-US" dirty="0">
+                <a:solidFill>
+                  <a:srgbClr val="C00000"/>
+                </a:solidFill>
+              </a:rPr>
+              <a:t>Whole step skipped if platform already provisioned in past</a:t>
+            </a:r>
+          </a:p>
+          <a:p>
+            <a:r>
+              <a:rPr lang="en-US" dirty="0"/>
+              <a:t>Finalize (IAS action)</a:t>
+            </a:r>
+          </a:p>
+          <a:p>
+            <a:pPr lvl="1"/>
+            <a:r>
+              <a:rPr lang="en-US" dirty="0"/>
+              <a:t>Member certificate </a:t>
+            </a:r>
+            <a:r>
+              <a:rPr lang="en-US" dirty="0" err="1"/>
+              <a:t>encypted</a:t>
+            </a:r>
+            <a:r>
+              <a:rPr lang="en-US" dirty="0"/>
+              <a:t> with </a:t>
+            </a:r>
+            <a:r>
+              <a:rPr lang="en-US" dirty="0" err="1">
+                <a:solidFill>
+                  <a:srgbClr val="C00000"/>
+                </a:solidFill>
+              </a:rPr>
+              <a:t>ProvisioningKey</a:t>
+            </a:r>
+            <a:endParaRPr lang="en-US" dirty="0">
+              <a:solidFill>
+                <a:srgbClr val="C00000"/>
+              </a:solidFill>
+            </a:endParaRPr>
+          </a:p>
+          <a:p>
+            <a:pPr lvl="1"/>
+            <a:r>
+              <a:rPr lang="en-US" dirty="0" err="1">
+                <a:solidFill>
+                  <a:srgbClr val="0070C0"/>
+                </a:solidFill>
+              </a:rPr>
+              <a:t>EpidKeyEscrow</a:t>
+            </a:r>
+            <a:endParaRPr lang="en-US" dirty="0">
+              <a:solidFill>
+                <a:srgbClr val="0070C0"/>
+              </a:solidFill>
+            </a:endParaRPr>
+          </a:p>
+          <a:p>
+            <a:r>
+              <a:rPr lang="en-US" dirty="0"/>
+              <a:t>Proof of knowledge based on ECDSA signature</a:t>
+            </a:r>
+          </a:p>
+          <a:p>
+            <a:r>
+              <a:rPr lang="en-US" dirty="0"/>
+              <a:t>Encrypting </a:t>
+            </a:r>
+            <a:r>
+              <a:rPr lang="en-US" dirty="0" err="1">
+                <a:solidFill>
+                  <a:srgbClr val="0070C0"/>
+                </a:solidFill>
+              </a:rPr>
+              <a:t>EpidJoinRequest</a:t>
+            </a:r>
+            <a:r>
+              <a:rPr lang="en-US" dirty="0"/>
+              <a:t> prevents concurrent join</a:t>
             </a:r>
           </a:p>
         </p:txBody>
@@ -5302,7 +5908,7 @@
     </p:spTree>
     <p:extLst>
       <p:ext uri="{BB962C8B-B14F-4D97-AF65-F5344CB8AC3E}">
-        <p14:creationId xmlns:p14="http://schemas.microsoft.com/office/powerpoint/2010/main" val="2767877206"/>
+        <p14:creationId xmlns:p14="http://schemas.microsoft.com/office/powerpoint/2010/main" val="2825682460"/>
       </p:ext>
     </p:extLst>
   </p:cSld>
@@ -5342,12 +5948,12 @@
             <a:spLocks noGrp="1"/>
           </p:cNvSpPr>
           <p:nvPr>
-            <p:ph type="title"/>
+            <p:ph type="title" idx="4294967295"/>
           </p:nvPr>
         </p:nvSpPr>
         <p:spPr>
           <a:xfrm>
-            <a:off x="1371195" y="365125"/>
+            <a:off x="0" y="365125"/>
             <a:ext cx="10515600" cy="1325563"/>
           </a:xfrm>
         </p:spPr>
@@ -5362,15 +5968,114 @@
                   <a:schemeClr val="accent4"/>
                 </a:solidFill>
               </a:rPr>
-              <a:t>EPID Quoting Enclave</a:t>
-            </a:r>
-          </a:p>
-        </p:txBody>
-      </p:sp>
+              <a:t>EPID Provisioning (2)</a:t>
+            </a:r>
+            <a:endParaRPr lang="en-US" dirty="0">
+              <a:solidFill>
+                <a:schemeClr val="bg1"/>
+              </a:solidFill>
+            </a:endParaRPr>
+          </a:p>
+        </p:txBody>
+      </p:sp>
+      <p:pic>
+        <p:nvPicPr>
+          <p:cNvPr id="8" name="Content Placeholder 4">
+            <a:extLst>
+              <a:ext uri="{FF2B5EF4-FFF2-40B4-BE49-F238E27FC236}">
+                <a16:creationId xmlns:a16="http://schemas.microsoft.com/office/drawing/2014/main" id="{3205CE90-B615-47FD-AFE3-B127FE03A124}"/>
+              </a:ext>
+            </a:extLst>
+          </p:cNvPr>
+          <p:cNvPicPr>
+            <a:picLocks noGrp="1" noChangeAspect="1"/>
+          </p:cNvPicPr>
+          <p:nvPr>
+            <p:ph sz="half" idx="4294967295"/>
+          </p:nvPr>
+        </p:nvPicPr>
+        <p:blipFill>
+          <a:blip r:embed="rId2"/>
+          <a:stretch>
+            <a:fillRect/>
+          </a:stretch>
+        </p:blipFill>
+        <p:spPr>
+          <a:xfrm>
+            <a:off x="1" y="1379285"/>
+            <a:ext cx="5175422" cy="2972820"/>
+          </a:xfrm>
+          <a:prstGeom prst="rect">
+            <a:avLst/>
+          </a:prstGeom>
+        </p:spPr>
+      </p:pic>
+      <p:pic>
+        <p:nvPicPr>
+          <p:cNvPr id="9" name="Content Placeholder 8">
+            <a:extLst>
+              <a:ext uri="{FF2B5EF4-FFF2-40B4-BE49-F238E27FC236}">
+                <a16:creationId xmlns:a16="http://schemas.microsoft.com/office/drawing/2014/main" id="{4909D1EC-6CD2-443F-A413-E0E5C9F25901}"/>
+              </a:ext>
+            </a:extLst>
+          </p:cNvPr>
+          <p:cNvPicPr>
+            <a:picLocks noGrp="1" noChangeAspect="1"/>
+          </p:cNvPicPr>
+          <p:nvPr>
+            <p:ph sz="half" idx="4294967295"/>
+          </p:nvPr>
+        </p:nvPicPr>
+        <p:blipFill>
+          <a:blip r:embed="rId3"/>
+          <a:stretch>
+            <a:fillRect/>
+          </a:stretch>
+        </p:blipFill>
+        <p:spPr>
+          <a:xfrm>
+            <a:off x="7100046" y="1315928"/>
+            <a:ext cx="4911029" cy="3410938"/>
+          </a:xfrm>
+          <a:prstGeom prst="rect">
+            <a:avLst/>
+          </a:prstGeom>
+        </p:spPr>
+      </p:pic>
+      <p:pic>
+        <p:nvPicPr>
+          <p:cNvPr id="11" name="Picture 10">
+            <a:extLst>
+              <a:ext uri="{FF2B5EF4-FFF2-40B4-BE49-F238E27FC236}">
+                <a16:creationId xmlns:a16="http://schemas.microsoft.com/office/drawing/2014/main" id="{62D0BB84-47BB-4BA0-A2B3-E81A2E713F91}"/>
+              </a:ext>
+            </a:extLst>
+          </p:cNvPr>
+          <p:cNvPicPr>
+            <a:picLocks noChangeAspect="1"/>
+          </p:cNvPicPr>
+          <p:nvPr/>
+        </p:nvPicPr>
+        <p:blipFill>
+          <a:blip r:embed="rId4"/>
+          <a:stretch>
+            <a:fillRect/>
+          </a:stretch>
+        </p:blipFill>
+        <p:spPr>
+          <a:xfrm>
+            <a:off x="2405734" y="4277934"/>
+            <a:ext cx="6314551" cy="2712767"/>
+          </a:xfrm>
+          <a:prstGeom prst="rect">
+            <a:avLst/>
+          </a:prstGeom>
+        </p:spPr>
+      </p:pic>
     </p:spTree>
     <p:extLst>
       <p:ext uri="{BB962C8B-B14F-4D97-AF65-F5344CB8AC3E}">
-        <p14:creationId xmlns:p14="http://schemas.microsoft.com/office/powerpoint/2010/main" val="4020399910"/>
+        <p14:creationId xmlns:p14="http://schemas.microsoft.com/office/powerpoint/2010/main" val="2767877206"/>
       </p:ext>
     </p:extLst>
   </p:cSld>
@@ -5425,7 +6130,237 @@
                   <a:schemeClr val="accent4"/>
                 </a:solidFill>
               </a:rPr>
-              <a:t>EPID Quote Verification Pitfalls</a:t>
+              <a:t>SGX Local Attestation</a:t>
+            </a:r>
+          </a:p>
+        </p:txBody>
+      </p:sp>
+      <p:sp>
+        <p:nvSpPr>
+          <p:cNvPr id="3" name="Content Placeholder 2">
+            <a:extLst>
+              <a:ext uri="{FF2B5EF4-FFF2-40B4-BE49-F238E27FC236}">
+                <a16:creationId xmlns:a16="http://schemas.microsoft.com/office/drawing/2014/main" id="{57F140BF-B428-4DE1-B378-034DF8483A01}"/>
+              </a:ext>
+            </a:extLst>
+          </p:cNvPr>
+          <p:cNvSpPr>
+            <a:spLocks noGrp="1"/>
+          </p:cNvSpPr>
+          <p:nvPr>
+            <p:ph sz="half" idx="1"/>
+          </p:nvPr>
+        </p:nvSpPr>
+        <p:spPr>
+          <a:xfrm>
+            <a:off x="361507" y="1759688"/>
+            <a:ext cx="6326372" cy="4827182"/>
+          </a:xfrm>
+        </p:spPr>
+        <p:txBody>
+          <a:bodyPr/>
+          <a:lstStyle/>
+          <a:p>
+            <a:r>
+              <a:rPr lang="en-US" dirty="0"/>
+              <a:t>Allows source enclave to prove it’s identity is valid to any target enclave</a:t>
+            </a:r>
+          </a:p>
+          <a:p>
+            <a:pPr lvl="1"/>
+            <a:r>
+              <a:rPr lang="en-US" dirty="0"/>
+              <a:t>Allows 512-bits additional report data</a:t>
+            </a:r>
+          </a:p>
+          <a:p>
+            <a:r>
+              <a:rPr lang="en-US" dirty="0"/>
+              <a:t>EREPORT provides oracle access to target enclave’s </a:t>
+            </a:r>
+            <a:r>
+              <a:rPr lang="en-US" dirty="0" err="1">
+                <a:solidFill>
+                  <a:srgbClr val="0070C0"/>
+                </a:solidFill>
+              </a:rPr>
+              <a:t>ReportKey</a:t>
+            </a:r>
+            <a:endParaRPr lang="en-US" dirty="0">
+              <a:solidFill>
+                <a:srgbClr val="0070C0"/>
+              </a:solidFill>
+            </a:endParaRPr>
+          </a:p>
+          <a:p>
+            <a:pPr lvl="1"/>
+            <a:r>
+              <a:rPr lang="en-US" b="1" dirty="0" err="1">
+                <a:solidFill>
+                  <a:srgbClr val="0070C0"/>
+                </a:solidFill>
+                <a:latin typeface="Inconsolata" panose="020B0609030003000000" pitchFamily="49" charset="0"/>
+              </a:rPr>
+              <a:t>cmac</a:t>
+            </a:r>
+            <a:r>
+              <a:rPr lang="en-US" dirty="0"/>
+              <a:t> over source enclave’s identity present in CPU (cannot be forged)</a:t>
+            </a:r>
+          </a:p>
+          <a:p>
+            <a:pPr lvl="1"/>
+            <a:r>
+              <a:rPr lang="en-US" dirty="0"/>
+              <a:t>Randomized by CR_REPORT_KEYID set at bootup time</a:t>
+            </a:r>
+          </a:p>
+          <a:p>
+            <a:r>
+              <a:rPr lang="en-US" dirty="0"/>
+              <a:t>Target enclave manually computes the CMAC using it’s own </a:t>
+            </a:r>
+            <a:r>
+              <a:rPr lang="en-US" dirty="0" err="1">
+                <a:solidFill>
+                  <a:srgbClr val="0070C0"/>
+                </a:solidFill>
+              </a:rPr>
+              <a:t>ReportKey</a:t>
+            </a:r>
+            <a:r>
+              <a:rPr lang="en-US" dirty="0"/>
+              <a:t> </a:t>
+            </a:r>
+          </a:p>
+        </p:txBody>
+      </p:sp>
+      <p:pic>
+        <p:nvPicPr>
+          <p:cNvPr id="5" name="Content Placeholder 4">
+            <a:extLst>
+              <a:ext uri="{FF2B5EF4-FFF2-40B4-BE49-F238E27FC236}">
+                <a16:creationId xmlns:a16="http://schemas.microsoft.com/office/drawing/2014/main" id="{4B976F0F-F639-45A1-9663-605A1C61943E}"/>
+              </a:ext>
+            </a:extLst>
+          </p:cNvPr>
+          <p:cNvPicPr>
+            <a:picLocks noGrp="1" noChangeAspect="1"/>
+          </p:cNvPicPr>
+          <p:nvPr>
+            <p:ph sz="half" idx="2"/>
+          </p:nvPr>
+        </p:nvPicPr>
+        <p:blipFill>
+          <a:blip r:embed="rId2"/>
+          <a:stretch>
+            <a:fillRect/>
+          </a:stretch>
+        </p:blipFill>
+        <p:spPr>
+          <a:xfrm>
+            <a:off x="7209488" y="3958776"/>
+            <a:ext cx="4202175" cy="2838867"/>
+          </a:xfrm>
+          <a:prstGeom prst="rect">
+            <a:avLst/>
+          </a:prstGeom>
+        </p:spPr>
+      </p:pic>
+      <p:pic>
+        <p:nvPicPr>
+          <p:cNvPr id="6" name="Picture 5">
+            <a:extLst>
+              <a:ext uri="{FF2B5EF4-FFF2-40B4-BE49-F238E27FC236}">
+                <a16:creationId xmlns:a16="http://schemas.microsoft.com/office/drawing/2014/main" id="{A1FC4D44-83DF-4A3D-A4D1-9B5D7E6822AA}"/>
+              </a:ext>
+            </a:extLst>
+          </p:cNvPr>
+          <p:cNvPicPr>
+            <a:picLocks noChangeAspect="1"/>
+          </p:cNvPicPr>
+          <p:nvPr/>
+        </p:nvPicPr>
+        <p:blipFill>
+          <a:blip r:embed="rId3"/>
+          <a:stretch>
+            <a:fillRect/>
+          </a:stretch>
+        </p:blipFill>
+        <p:spPr>
+          <a:xfrm>
+            <a:off x="7199184" y="1434723"/>
+            <a:ext cx="4366651" cy="2188967"/>
+          </a:xfrm>
+          <a:prstGeom prst="rect">
+            <a:avLst/>
+          </a:prstGeom>
+        </p:spPr>
+      </p:pic>
+    </p:spTree>
+    <p:extLst>
+      <p:ext uri="{BB962C8B-B14F-4D97-AF65-F5344CB8AC3E}">
+        <p14:creationId xmlns:p14="http://schemas.microsoft.com/office/powerpoint/2010/main" val="4020399910"/>
+      </p:ext>
+    </p:extLst>
+  </p:cSld>
+  <p:clrMapOvr>
+    <a:masterClrMapping/>
+  </p:clrMapOvr>
+</p:sld>
+</file>
+
+<file path=ppt/slides/slide18.xml><?xml version="1.0" encoding="utf-8"?>
+<p:sld xmlns:a="http://schemas.openxmlformats.org/drawingml/2006/main" xmlns:r="http://schemas.openxmlformats.org/officeDocument/2006/relationships" xmlns:p="http://schemas.openxmlformats.org/presentationml/2006/main">
+  <p:cSld>
+    <p:spTree>
+      <p:nvGrpSpPr>
+        <p:cNvPr id="1" name=""/>
+        <p:cNvGrpSpPr/>
+        <p:nvPr/>
+      </p:nvGrpSpPr>
+      <p:grpSpPr>
+        <a:xfrm>
+          <a:off x="0" y="0"/>
+          <a:ext cx="0" cy="0"/>
+          <a:chOff x="0" y="0"/>
+          <a:chExt cx="0" cy="0"/>
+        </a:xfrm>
+      </p:grpSpPr>
+      <p:sp>
+        <p:nvSpPr>
+          <p:cNvPr id="2" name="Title 1">
+            <a:extLst>
+              <a:ext uri="{FF2B5EF4-FFF2-40B4-BE49-F238E27FC236}">
+                <a16:creationId xmlns:a16="http://schemas.microsoft.com/office/drawing/2014/main" id="{D07508BC-BF03-4430-AF11-EAA992AE8E28}"/>
+              </a:ext>
+            </a:extLst>
+          </p:cNvPr>
+          <p:cNvSpPr>
+            <a:spLocks noGrp="1"/>
+          </p:cNvSpPr>
+          <p:nvPr>
+            <p:ph type="title"/>
+          </p:nvPr>
+        </p:nvSpPr>
+        <p:spPr>
+          <a:xfrm>
+            <a:off x="4476306" y="210952"/>
+            <a:ext cx="7276215" cy="1325563"/>
+          </a:xfrm>
+        </p:spPr>
+        <p:txBody>
+          <a:bodyPr/>
+          <a:lstStyle/>
+          <a:p>
+            <a:pPr algn="r"/>
+            <a:r>
+              <a:rPr lang="en-US" dirty="0">
+                <a:solidFill>
+                  <a:schemeClr val="accent4"/>
+                </a:solidFill>
+              </a:rPr>
+              <a:t>Remote Attestation</a:t>
             </a:r>
           </a:p>
         </p:txBody>
@@ -5434,6 +6369,74 @@
     <p:extLst>
       <p:ext uri="{BB962C8B-B14F-4D97-AF65-F5344CB8AC3E}">
         <p14:creationId xmlns:p14="http://schemas.microsoft.com/office/powerpoint/2010/main" val="416790091"/>
+      </p:ext>
+    </p:extLst>
+  </p:cSld>
+  <p:clrMapOvr>
+    <a:masterClrMapping/>
+  </p:clrMapOvr>
+</p:sld>
+</file>
+
+<file path=ppt/slides/slide19.xml><?xml version="1.0" encoding="utf-8"?>
+<p:sld xmlns:a="http://schemas.openxmlformats.org/drawingml/2006/main" xmlns:r="http://schemas.openxmlformats.org/officeDocument/2006/relationships" xmlns:p="http://schemas.openxmlformats.org/presentationml/2006/main">
+  <p:cSld>
+    <p:spTree>
+      <p:nvGrpSpPr>
+        <p:cNvPr id="1" name=""/>
+        <p:cNvGrpSpPr/>
+        <p:nvPr/>
+      </p:nvGrpSpPr>
+      <p:grpSpPr>
+        <a:xfrm>
+          <a:off x="0" y="0"/>
+          <a:ext cx="0" cy="0"/>
+          <a:chOff x="0" y="0"/>
+          <a:chExt cx="0" cy="0"/>
+        </a:xfrm>
+      </p:grpSpPr>
+      <p:sp>
+        <p:nvSpPr>
+          <p:cNvPr id="2" name="Title 1">
+            <a:extLst>
+              <a:ext uri="{FF2B5EF4-FFF2-40B4-BE49-F238E27FC236}">
+                <a16:creationId xmlns:a16="http://schemas.microsoft.com/office/drawing/2014/main" id="{D07508BC-BF03-4430-AF11-EAA992AE8E28}"/>
+              </a:ext>
+            </a:extLst>
+          </p:cNvPr>
+          <p:cNvSpPr>
+            <a:spLocks noGrp="1"/>
+          </p:cNvSpPr>
+          <p:nvPr>
+            <p:ph type="title"/>
+          </p:nvPr>
+        </p:nvSpPr>
+        <p:spPr>
+          <a:xfrm>
+            <a:off x="4476306" y="210952"/>
+            <a:ext cx="7276215" cy="1325563"/>
+          </a:xfrm>
+        </p:spPr>
+        <p:txBody>
+          <a:bodyPr/>
+          <a:lstStyle/>
+          <a:p>
+            <a:pPr algn="r"/>
+            <a:r>
+              <a:rPr lang="en-US" dirty="0">
+                <a:solidFill>
+                  <a:schemeClr val="accent4"/>
+                </a:solidFill>
+              </a:rPr>
+              <a:t>Quote Verification Pitfalls</a:t>
+            </a:r>
+          </a:p>
+        </p:txBody>
+      </p:sp>
+    </p:spTree>
+    <p:extLst>
+      <p:ext uri="{BB962C8B-B14F-4D97-AF65-F5344CB8AC3E}">
+        <p14:creationId xmlns:p14="http://schemas.microsoft.com/office/powerpoint/2010/main" val="866501179"/>
       </p:ext>
     </p:extLst>
   </p:cSld>
@@ -7317,17 +8320,6 @@
             </a:r>
           </a:p>
           <a:p>
-            <a:pPr lvl="1"/>
-            <a:r>
-              <a:rPr lang="en-US" dirty="0">
-                <a:solidFill>
-                  <a:srgbClr val="C00000"/>
-                </a:solidFill>
-              </a:rPr>
-              <a:t>Select number of allowed threads carefully!</a:t>
-            </a:r>
-          </a:p>
-          <a:p>
             <a:r>
               <a:rPr lang="en-US" dirty="0"/>
               <a:t>Makes global state in enclave malleable</a:t>
@@ -8286,27 +9278,7 @@
               <a:rPr lang="en-US" sz="1800" dirty="0">
                 <a:latin typeface="Inconsolata" panose="020B0609030003000000" pitchFamily="49" charset="0"/>
               </a:rPr>
-              <a:t>} </a:t>
-            </a:r>
-            <a:r>
-              <a:rPr lang="en-US" sz="1800" dirty="0">
-                <a:solidFill>
-                  <a:schemeClr val="accent5"/>
-                </a:solidFill>
-                <a:latin typeface="Inconsolata" panose="020B0609030003000000" pitchFamily="49" charset="0"/>
-              </a:rPr>
-              <a:t>…</a:t>
-            </a:r>
-            <a:br>
-              <a:rPr lang="en-US" sz="1800" dirty="0">
-                <a:latin typeface="Inconsolata" panose="020B0609030003000000" pitchFamily="49" charset="0"/>
-              </a:rPr>
-            </a:br>
-            <a:r>
-              <a:rPr lang="en-US" sz="1800" dirty="0">
-                <a:latin typeface="Inconsolata" panose="020B0609030003000000" pitchFamily="49" charset="0"/>
-              </a:rPr>
-              <a:t>}</a:t>
+              <a:t>} …</a:t>
             </a:r>
           </a:p>
         </p:txBody>
@@ -8485,61 +9457,6 @@
       </p:grpSpPr>
       <p:sp>
         <p:nvSpPr>
-          <p:cNvPr id="19" name="TextBox 18">
-            <a:extLst>
-              <a:ext uri="{FF2B5EF4-FFF2-40B4-BE49-F238E27FC236}">
-                <a16:creationId xmlns:a16="http://schemas.microsoft.com/office/drawing/2014/main" id="{D3764F8E-CAA8-4410-94C3-24335CB59F0E}"/>
-              </a:ext>
-            </a:extLst>
-          </p:cNvPr>
-          <p:cNvSpPr txBox="1"/>
-          <p:nvPr/>
-        </p:nvSpPr>
-        <p:spPr>
-          <a:xfrm flipH="1">
-            <a:off x="8536748" y="3036595"/>
-            <a:ext cx="2415010" cy="646331"/>
-          </a:xfrm>
-          <a:prstGeom prst="rect">
-            <a:avLst/>
-          </a:prstGeom>
-          <a:noFill/>
-        </p:spPr>
-        <p:txBody>
-          <a:bodyPr wrap="square" rtlCol="0">
-            <a:spAutoFit/>
-          </a:bodyPr>
-          <a:lstStyle/>
-          <a:p>
-            <a:pPr algn="ctr"/>
-            <a:r>
-              <a:rPr lang="en-US" dirty="0"/>
-              <a:t>EPID Blinded Join and</a:t>
-            </a:r>
-          </a:p>
-          <a:p>
-            <a:pPr algn="ctr"/>
-            <a:r>
-              <a:rPr lang="en-US" dirty="0" err="1"/>
-              <a:t>PoK</a:t>
-            </a:r>
-            <a:r>
-              <a:rPr lang="en-US" dirty="0"/>
-              <a:t> of </a:t>
-            </a:r>
-            <a:r>
-              <a:rPr lang="en-US" dirty="0" err="1"/>
-              <a:t>RoT</a:t>
-            </a:r>
-            <a:r>
-              <a:rPr lang="en-US" dirty="0"/>
-              <a:t> </a:t>
-            </a:r>
-          </a:p>
-        </p:txBody>
-      </p:sp>
-      <p:sp>
-        <p:nvSpPr>
           <p:cNvPr id="2" name="Title 1">
             <a:extLst>
               <a:ext uri="{FF2B5EF4-FFF2-40B4-BE49-F238E27FC236}">
@@ -8589,8 +9506,8 @@
         </p:nvSpPr>
         <p:spPr>
           <a:xfrm>
-            <a:off x="159488" y="1825625"/>
-            <a:ext cx="6571675" cy="4838562"/>
+            <a:off x="255182" y="1677557"/>
+            <a:ext cx="5929709" cy="5116648"/>
           </a:xfrm>
         </p:spPr>
         <p:txBody>
@@ -8601,624 +9518,1292 @@
           <a:p>
             <a:r>
               <a:rPr lang="en-US" dirty="0"/>
-              <a:t>SGX Hardware contains a 128-bit secret that’s known to Intel</a:t>
+              <a:t>EPID Provisioning</a:t>
             </a:r>
           </a:p>
           <a:p>
             <a:pPr lvl="1"/>
             <a:r>
               <a:rPr lang="en-US" dirty="0"/>
-              <a:t>Interpretation/use of this secret left to software</a:t>
+              <a:t>Each SGX CPU contains a 128-bit </a:t>
+            </a:r>
+            <a:r>
+              <a:rPr lang="en-US" dirty="0">
+                <a:solidFill>
+                  <a:srgbClr val="0070C0"/>
+                </a:solidFill>
+              </a:rPr>
+              <a:t>Root Provisioning Key</a:t>
+            </a:r>
+            <a:r>
+              <a:rPr lang="en-US" dirty="0"/>
+              <a:t> known to Intel</a:t>
             </a:r>
           </a:p>
           <a:p>
             <a:pPr lvl="1"/>
             <a:r>
               <a:rPr lang="en-US" dirty="0"/>
-              <a:t>Access controlled by Launch Enclave</a:t>
-            </a:r>
-          </a:p>
-          <a:p>
-            <a:r>
-              <a:rPr lang="en-US" dirty="0"/>
-              <a:t>Used as Root-of-Trust between Intel Attestation Service (IAS) and the CPU</a:t>
+              <a:t>CPU joins SGX EPID Group using </a:t>
+            </a:r>
+            <a:r>
+              <a:rPr lang="en-US" dirty="0">
+                <a:solidFill>
+                  <a:srgbClr val="0070C0"/>
+                </a:solidFill>
+              </a:rPr>
+              <a:t>Root Provisioning Key</a:t>
+            </a:r>
+            <a:r>
+              <a:rPr lang="en-US" dirty="0"/>
+              <a:t> as </a:t>
+            </a:r>
+            <a:r>
+              <a:rPr lang="en-US" dirty="0" err="1"/>
+              <a:t>RoT</a:t>
+            </a:r>
+            <a:endParaRPr lang="en-US" dirty="0"/>
+          </a:p>
+          <a:p>
+            <a:r>
+              <a:rPr lang="en-US" dirty="0"/>
+              <a:t>Remote Attestation</a:t>
             </a:r>
           </a:p>
           <a:p>
             <a:pPr lvl="1"/>
             <a:r>
               <a:rPr lang="en-US" dirty="0"/>
-              <a:t>Proof-of-Knowledge of this secret deciding factor on who gets to join EPID SGX Group</a:t>
-            </a:r>
-          </a:p>
-          <a:p>
-            <a:r>
-              <a:rPr lang="en-US" dirty="0"/>
-              <a:t>Remote Attestation based on EPID Group Signatures</a:t>
-            </a:r>
-          </a:p>
-        </p:txBody>
-      </p:sp>
-      <p:cxnSp>
-        <p:nvCxnSpPr>
-          <p:cNvPr id="5" name="Straight Connector 4">
+              <a:t>Enclaves generate local attestation for Quoting Enclave (QE)</a:t>
+            </a:r>
+          </a:p>
+          <a:p>
+            <a:pPr lvl="1"/>
+            <a:r>
+              <a:rPr lang="en-US" dirty="0"/>
+              <a:t>QE generates </a:t>
+            </a:r>
+            <a:r>
+              <a:rPr lang="en-US" dirty="0">
+                <a:solidFill>
+                  <a:srgbClr val="C00000"/>
+                </a:solidFill>
+              </a:rPr>
+              <a:t>encrypted</a:t>
+            </a:r>
+            <a:r>
+              <a:rPr lang="en-US" dirty="0"/>
+              <a:t> EPID Signature on data sent in local attestation</a:t>
+            </a:r>
+          </a:p>
+          <a:p>
+            <a:pPr lvl="1"/>
+            <a:r>
+              <a:rPr lang="en-US" dirty="0">
+                <a:solidFill>
+                  <a:srgbClr val="C00000"/>
+                </a:solidFill>
+              </a:rPr>
+              <a:t>Enclave must send the encrypted Sig to Intel for validation</a:t>
+            </a:r>
+            <a:endParaRPr lang="en-US" dirty="0"/>
+          </a:p>
+        </p:txBody>
+      </p:sp>
+      <p:grpSp>
+        <p:nvGrpSpPr>
+          <p:cNvPr id="26" name="Group 25">
             <a:extLst>
               <a:ext uri="{FF2B5EF4-FFF2-40B4-BE49-F238E27FC236}">
-                <a16:creationId xmlns:a16="http://schemas.microsoft.com/office/drawing/2014/main" id="{79471148-23B5-4749-B446-AA2036FB8249}"/>
+                <a16:creationId xmlns:a16="http://schemas.microsoft.com/office/drawing/2014/main" id="{731A692E-9FCE-4BF8-B831-B54CE46A8DD4}"/>
               </a:ext>
             </a:extLst>
           </p:cNvPr>
-          <p:cNvCxnSpPr>
-            <a:cxnSpLocks/>
-          </p:cNvCxnSpPr>
+          <p:cNvGrpSpPr/>
           <p:nvPr/>
-        </p:nvCxnSpPr>
-        <p:spPr>
+        </p:nvGrpSpPr>
+        <p:grpSpPr>
           <a:xfrm>
-            <a:off x="8527888" y="2065489"/>
-            <a:ext cx="0" cy="3324640"/>
+            <a:off x="6226839" y="1500398"/>
+            <a:ext cx="5766501" cy="5174041"/>
+            <a:chOff x="6216207" y="1441919"/>
+            <a:chExt cx="5766501" cy="5174041"/>
           </a:xfrm>
-          <a:prstGeom prst="line">
-            <a:avLst/>
-          </a:prstGeom>
-          <a:ln w="25400">
+        </p:grpSpPr>
+        <p:sp>
+          <p:nvSpPr>
+            <p:cNvPr id="53" name="TextBox 52">
+              <a:extLst>
+                <a:ext uri="{FF2B5EF4-FFF2-40B4-BE49-F238E27FC236}">
+                  <a16:creationId xmlns:a16="http://schemas.microsoft.com/office/drawing/2014/main" id="{5E57E1BB-E042-47C3-B486-3D906F6ED32C}"/>
+                </a:ext>
+              </a:extLst>
+            </p:cNvPr>
+            <p:cNvSpPr txBox="1"/>
+            <p:nvPr/>
+          </p:nvSpPr>
+          <p:spPr>
+            <a:xfrm>
+              <a:off x="10872797" y="5363615"/>
+              <a:ext cx="1109911" cy="369332"/>
+            </a:xfrm>
+            <a:prstGeom prst="rect">
+              <a:avLst/>
+            </a:prstGeom>
+            <a:noFill/>
+          </p:spPr>
+          <p:txBody>
+            <a:bodyPr wrap="square" rtlCol="0">
+              <a:spAutoFit/>
+            </a:bodyPr>
+            <a:lstStyle/>
+            <a:p>
+              <a:pPr algn="ctr"/>
+              <a:r>
+                <a:rPr lang="en-US" b="1" dirty="0"/>
+                <a:t>YES/NO</a:t>
+              </a:r>
+              <a:endParaRPr lang="en-US" dirty="0"/>
+            </a:p>
+          </p:txBody>
+        </p:sp>
+        <p:sp>
+          <p:nvSpPr>
+            <p:cNvPr id="51" name="TextBox 50">
+              <a:extLst>
+                <a:ext uri="{FF2B5EF4-FFF2-40B4-BE49-F238E27FC236}">
+                  <a16:creationId xmlns:a16="http://schemas.microsoft.com/office/drawing/2014/main" id="{90E3ED74-53F7-4ECD-BBE6-E0E2FDB9C111}"/>
+                </a:ext>
+              </a:extLst>
+            </p:cNvPr>
+            <p:cNvSpPr txBox="1"/>
+            <p:nvPr/>
+          </p:nvSpPr>
+          <p:spPr>
+            <a:xfrm>
+              <a:off x="9126275" y="5180835"/>
+              <a:ext cx="1889631" cy="369332"/>
+            </a:xfrm>
+            <a:prstGeom prst="rect">
+              <a:avLst/>
+            </a:prstGeom>
+            <a:noFill/>
+          </p:spPr>
+          <p:txBody>
+            <a:bodyPr wrap="square" rtlCol="0">
+              <a:spAutoFit/>
+            </a:bodyPr>
+            <a:lstStyle/>
+            <a:p>
+              <a:pPr algn="ctr"/>
+              <a:r>
+                <a:rPr lang="en-US" b="1" dirty="0" err="1">
+                  <a:solidFill>
+                    <a:srgbClr val="FF0000"/>
+                  </a:solidFill>
+                </a:rPr>
+                <a:t>enc</a:t>
+              </a:r>
+              <a:r>
+                <a:rPr lang="en-US" b="1" dirty="0">
+                  <a:solidFill>
+                    <a:srgbClr val="FF0000"/>
+                  </a:solidFill>
+                </a:rPr>
+                <a:t>(</a:t>
+              </a:r>
+              <a:r>
+                <a:rPr lang="en-US" b="1" dirty="0" err="1">
+                  <a:solidFill>
+                    <a:srgbClr val="FF0000"/>
+                  </a:solidFill>
+                </a:rPr>
+                <a:t>epid_sig</a:t>
+              </a:r>
+              <a:r>
+                <a:rPr lang="en-US" b="1" dirty="0">
+                  <a:solidFill>
+                    <a:srgbClr val="FF0000"/>
+                  </a:solidFill>
+                </a:rPr>
+                <a:t>)</a:t>
+              </a:r>
+              <a:endParaRPr lang="en-US" dirty="0"/>
+            </a:p>
+          </p:txBody>
+        </p:sp>
+        <p:cxnSp>
+          <p:nvCxnSpPr>
+            <p:cNvPr id="8" name="Straight Connector 7">
+              <a:extLst>
+                <a:ext uri="{FF2B5EF4-FFF2-40B4-BE49-F238E27FC236}">
+                  <a16:creationId xmlns:a16="http://schemas.microsoft.com/office/drawing/2014/main" id="{63D56ABB-C316-403B-BD41-81CFF5B1CBFD}"/>
+                </a:ext>
+              </a:extLst>
+            </p:cNvPr>
+            <p:cNvCxnSpPr>
+              <a:cxnSpLocks/>
+            </p:cNvCxnSpPr>
+            <p:nvPr/>
+          </p:nvCxnSpPr>
+          <p:spPr>
+            <a:xfrm flipH="1">
+              <a:off x="10980760" y="1958532"/>
+              <a:ext cx="35146" cy="4362524"/>
+            </a:xfrm>
+            <a:prstGeom prst="line">
+              <a:avLst/>
+            </a:prstGeom>
+            <a:ln w="25400">
+              <a:solidFill>
+                <a:schemeClr val="tx1"/>
+              </a:solidFill>
+            </a:ln>
+          </p:spPr>
+          <p:style>
+            <a:lnRef idx="1">
+              <a:schemeClr val="accent1"/>
+            </a:lnRef>
+            <a:fillRef idx="0">
+              <a:schemeClr val="accent1"/>
+            </a:fillRef>
+            <a:effectRef idx="0">
+              <a:schemeClr val="accent1"/>
+            </a:effectRef>
+            <a:fontRef idx="minor">
+              <a:schemeClr val="tx1"/>
+            </a:fontRef>
+          </p:style>
+        </p:cxnSp>
+        <p:sp>
+          <p:nvSpPr>
+            <p:cNvPr id="19" name="TextBox 18">
+              <a:extLst>
+                <a:ext uri="{FF2B5EF4-FFF2-40B4-BE49-F238E27FC236}">
+                  <a16:creationId xmlns:a16="http://schemas.microsoft.com/office/drawing/2014/main" id="{D3764F8E-CAA8-4410-94C3-24335CB59F0E}"/>
+                </a:ext>
+              </a:extLst>
+            </p:cNvPr>
+            <p:cNvSpPr txBox="1"/>
+            <p:nvPr/>
+          </p:nvSpPr>
+          <p:spPr>
+            <a:xfrm flipH="1">
+              <a:off x="8026384" y="2242222"/>
+              <a:ext cx="2982434" cy="646331"/>
+            </a:xfrm>
+            <a:prstGeom prst="rect">
+              <a:avLst/>
+            </a:prstGeom>
+            <a:noFill/>
+          </p:spPr>
+          <p:txBody>
+            <a:bodyPr wrap="square" rtlCol="0">
+              <a:spAutoFit/>
+            </a:bodyPr>
+            <a:lstStyle/>
+            <a:p>
+              <a:pPr algn="ctr"/>
+              <a:r>
+                <a:rPr lang="en-US" dirty="0"/>
+                <a:t>EPID Blinded Join and</a:t>
+              </a:r>
+            </a:p>
+            <a:p>
+              <a:pPr algn="ctr"/>
+              <a:r>
+                <a:rPr lang="en-US" dirty="0" err="1"/>
+                <a:t>PoK</a:t>
+              </a:r>
+              <a:r>
+                <a:rPr lang="en-US" dirty="0"/>
+                <a:t> of </a:t>
+              </a:r>
+              <a:r>
+                <a:rPr lang="en-US" dirty="0" err="1"/>
+                <a:t>RoT</a:t>
+              </a:r>
+              <a:r>
+                <a:rPr lang="en-US" dirty="0"/>
+                <a:t> </a:t>
+              </a:r>
+            </a:p>
+          </p:txBody>
+        </p:sp>
+        <p:cxnSp>
+          <p:nvCxnSpPr>
+            <p:cNvPr id="5" name="Straight Connector 4">
+              <a:extLst>
+                <a:ext uri="{FF2B5EF4-FFF2-40B4-BE49-F238E27FC236}">
+                  <a16:creationId xmlns:a16="http://schemas.microsoft.com/office/drawing/2014/main" id="{79471148-23B5-4749-B446-AA2036FB8249}"/>
+                </a:ext>
+              </a:extLst>
+            </p:cNvPr>
+            <p:cNvCxnSpPr>
+              <a:cxnSpLocks/>
+            </p:cNvCxnSpPr>
+            <p:nvPr/>
+          </p:nvCxnSpPr>
+          <p:spPr>
+            <a:xfrm>
+              <a:off x="8012385" y="1958532"/>
+              <a:ext cx="19316" cy="2247611"/>
+            </a:xfrm>
+            <a:prstGeom prst="line">
+              <a:avLst/>
+            </a:prstGeom>
+            <a:ln w="25400">
+              <a:solidFill>
+                <a:schemeClr val="tx1"/>
+              </a:solidFill>
+            </a:ln>
+          </p:spPr>
+          <p:style>
+            <a:lnRef idx="1">
+              <a:schemeClr val="accent1"/>
+            </a:lnRef>
+            <a:fillRef idx="0">
+              <a:schemeClr val="accent1"/>
+            </a:fillRef>
+            <a:effectRef idx="0">
+              <a:schemeClr val="accent1"/>
+            </a:effectRef>
+            <a:fontRef idx="minor">
+              <a:schemeClr val="tx1"/>
+            </a:fontRef>
+          </p:style>
+        </p:cxnSp>
+        <p:sp>
+          <p:nvSpPr>
+            <p:cNvPr id="9" name="TextBox 8">
+              <a:extLst>
+                <a:ext uri="{FF2B5EF4-FFF2-40B4-BE49-F238E27FC236}">
+                  <a16:creationId xmlns:a16="http://schemas.microsoft.com/office/drawing/2014/main" id="{9EF57797-5D19-4A08-98CF-19C1AF66048E}"/>
+                </a:ext>
+              </a:extLst>
+            </p:cNvPr>
+            <p:cNvSpPr txBox="1"/>
+            <p:nvPr/>
+          </p:nvSpPr>
+          <p:spPr>
+            <a:xfrm flipH="1">
+              <a:off x="7416607" y="1592497"/>
+              <a:ext cx="1230188" cy="369332"/>
+            </a:xfrm>
+            <a:prstGeom prst="rect">
+              <a:avLst/>
+            </a:prstGeom>
             <a:solidFill>
               <a:schemeClr val="tx1"/>
             </a:solidFill>
-          </a:ln>
-        </p:spPr>
-        <p:style>
-          <a:lnRef idx="1">
-            <a:schemeClr val="accent1"/>
-          </a:lnRef>
-          <a:fillRef idx="0">
-            <a:schemeClr val="accent1"/>
-          </a:fillRef>
-          <a:effectRef idx="0">
-            <a:schemeClr val="accent1"/>
-          </a:effectRef>
-          <a:fontRef idx="minor">
-            <a:schemeClr val="tx1"/>
-          </a:fontRef>
-        </p:style>
-      </p:cxnSp>
-      <p:cxnSp>
-        <p:nvCxnSpPr>
-          <p:cNvPr id="8" name="Straight Connector 7">
-            <a:extLst>
-              <a:ext uri="{FF2B5EF4-FFF2-40B4-BE49-F238E27FC236}">
-                <a16:creationId xmlns:a16="http://schemas.microsoft.com/office/drawing/2014/main" id="{63D56ABB-C316-403B-BD41-81CFF5B1CBFD}"/>
-              </a:ext>
-            </a:extLst>
-          </p:cNvPr>
-          <p:cNvCxnSpPr>
-            <a:cxnSpLocks/>
-          </p:cNvCxnSpPr>
-          <p:nvPr/>
-        </p:nvCxnSpPr>
-        <p:spPr>
-          <a:xfrm>
-            <a:off x="10939708" y="2065489"/>
-            <a:ext cx="0" cy="3324640"/>
-          </a:xfrm>
-          <a:prstGeom prst="line">
-            <a:avLst/>
-          </a:prstGeom>
-          <a:ln w="25400">
+          </p:spPr>
+          <p:txBody>
+            <a:bodyPr wrap="square" rtlCol="0">
+              <a:spAutoFit/>
+            </a:bodyPr>
+            <a:lstStyle/>
+            <a:p>
+              <a:pPr algn="ctr"/>
+              <a:r>
+                <a:rPr lang="en-US" dirty="0">
+                  <a:solidFill>
+                    <a:schemeClr val="bg1"/>
+                  </a:solidFill>
+                </a:rPr>
+                <a:t>SGX CPU</a:t>
+              </a:r>
+            </a:p>
+          </p:txBody>
+        </p:sp>
+        <p:sp>
+          <p:nvSpPr>
+            <p:cNvPr id="13" name="TextBox 12">
+              <a:extLst>
+                <a:ext uri="{FF2B5EF4-FFF2-40B4-BE49-F238E27FC236}">
+                  <a16:creationId xmlns:a16="http://schemas.microsoft.com/office/drawing/2014/main" id="{44E91206-8F2F-4D78-A303-72FA2D540805}"/>
+                </a:ext>
+              </a:extLst>
+            </p:cNvPr>
+            <p:cNvSpPr txBox="1"/>
+            <p:nvPr/>
+          </p:nvSpPr>
+          <p:spPr>
+            <a:xfrm flipH="1">
+              <a:off x="8614719" y="1441919"/>
+              <a:ext cx="1807358" cy="646331"/>
+            </a:xfrm>
+            <a:prstGeom prst="rect">
+              <a:avLst/>
+            </a:prstGeom>
+            <a:noFill/>
+          </p:spPr>
+          <p:txBody>
+            <a:bodyPr wrap="square" rtlCol="0">
+              <a:spAutoFit/>
+            </a:bodyPr>
+            <a:lstStyle/>
+            <a:p>
+              <a:pPr algn="ctr"/>
+              <a:r>
+                <a:rPr lang="en-US" dirty="0" err="1">
+                  <a:solidFill>
+                    <a:schemeClr val="accent6">
+                      <a:lumMod val="75000"/>
+                    </a:schemeClr>
+                  </a:solidFill>
+                </a:rPr>
+                <a:t>RoT</a:t>
+              </a:r>
+              <a:r>
+                <a:rPr lang="en-US" dirty="0">
+                  <a:solidFill>
+                    <a:schemeClr val="accent6">
+                      <a:lumMod val="75000"/>
+                    </a:schemeClr>
+                  </a:solidFill>
+                </a:rPr>
+                <a:t> established </a:t>
+              </a:r>
+            </a:p>
+            <a:p>
+              <a:pPr algn="ctr"/>
+              <a:r>
+                <a:rPr lang="en-US" dirty="0">
+                  <a:solidFill>
+                    <a:schemeClr val="accent6">
+                      <a:lumMod val="75000"/>
+                    </a:schemeClr>
+                  </a:solidFill>
+                </a:rPr>
+                <a:t>at </a:t>
+              </a:r>
+              <a:r>
+                <a:rPr lang="en-US" dirty="0" err="1">
+                  <a:solidFill>
+                    <a:schemeClr val="accent6">
+                      <a:lumMod val="75000"/>
+                    </a:schemeClr>
+                  </a:solidFill>
+                </a:rPr>
+                <a:t>mfg</a:t>
+              </a:r>
+              <a:endParaRPr lang="en-US" dirty="0">
+                <a:solidFill>
+                  <a:schemeClr val="accent6">
+                    <a:lumMod val="75000"/>
+                  </a:schemeClr>
+                </a:solidFill>
+              </a:endParaRPr>
+            </a:p>
+          </p:txBody>
+        </p:sp>
+        <p:sp>
+          <p:nvSpPr>
+            <p:cNvPr id="16" name="TextBox 15">
+              <a:extLst>
+                <a:ext uri="{FF2B5EF4-FFF2-40B4-BE49-F238E27FC236}">
+                  <a16:creationId xmlns:a16="http://schemas.microsoft.com/office/drawing/2014/main" id="{C48C0B54-2A73-49E6-9A2F-75AAB3FE7118}"/>
+                </a:ext>
+              </a:extLst>
+            </p:cNvPr>
+            <p:cNvSpPr txBox="1"/>
+            <p:nvPr/>
+          </p:nvSpPr>
+          <p:spPr>
+            <a:xfrm>
+              <a:off x="6583806" y="2100248"/>
+              <a:ext cx="1454407" cy="369332"/>
+            </a:xfrm>
+            <a:prstGeom prst="rect">
+              <a:avLst/>
+            </a:prstGeom>
+            <a:noFill/>
+          </p:spPr>
+          <p:txBody>
+            <a:bodyPr wrap="square" rtlCol="0">
+              <a:spAutoFit/>
+            </a:bodyPr>
+            <a:lstStyle/>
+            <a:p>
+              <a:r>
+                <a:rPr lang="en-US" dirty="0"/>
+                <a:t>EPID Key Gen</a:t>
+              </a:r>
+            </a:p>
+          </p:txBody>
+        </p:sp>
+        <p:cxnSp>
+          <p:nvCxnSpPr>
+            <p:cNvPr id="18" name="Straight Arrow Connector 17">
+              <a:extLst>
+                <a:ext uri="{FF2B5EF4-FFF2-40B4-BE49-F238E27FC236}">
+                  <a16:creationId xmlns:a16="http://schemas.microsoft.com/office/drawing/2014/main" id="{A1DF2CF6-8318-4AED-8E78-9AE6095AEE4F}"/>
+                </a:ext>
+              </a:extLst>
+            </p:cNvPr>
+            <p:cNvCxnSpPr>
+              <a:cxnSpLocks/>
+            </p:cNvCxnSpPr>
+            <p:nvPr/>
+          </p:nvCxnSpPr>
+          <p:spPr>
+            <a:xfrm>
+              <a:off x="8017524" y="2574866"/>
+              <a:ext cx="2998382" cy="0"/>
+            </a:xfrm>
+            <a:prstGeom prst="straightConnector1">
+              <a:avLst/>
+            </a:prstGeom>
+            <a:ln w="25400">
+              <a:solidFill>
+                <a:schemeClr val="tx1"/>
+              </a:solidFill>
+              <a:tailEnd type="arrow" w="lg" len="lg"/>
+            </a:ln>
+          </p:spPr>
+          <p:style>
+            <a:lnRef idx="1">
+              <a:schemeClr val="accent1"/>
+            </a:lnRef>
+            <a:fillRef idx="0">
+              <a:schemeClr val="accent1"/>
+            </a:fillRef>
+            <a:effectRef idx="0">
+              <a:schemeClr val="accent1"/>
+            </a:effectRef>
+            <a:fontRef idx="minor">
+              <a:schemeClr val="tx1"/>
+            </a:fontRef>
+          </p:style>
+        </p:cxnSp>
+        <p:sp>
+          <p:nvSpPr>
+            <p:cNvPr id="22" name="TextBox 21">
+              <a:extLst>
+                <a:ext uri="{FF2B5EF4-FFF2-40B4-BE49-F238E27FC236}">
+                  <a16:creationId xmlns:a16="http://schemas.microsoft.com/office/drawing/2014/main" id="{95CAE067-91A0-4ABE-8BCC-396C527D16CF}"/>
+                </a:ext>
+              </a:extLst>
+            </p:cNvPr>
+            <p:cNvSpPr txBox="1"/>
+            <p:nvPr/>
+          </p:nvSpPr>
+          <p:spPr>
+            <a:xfrm flipH="1">
+              <a:off x="8026738" y="2957626"/>
+              <a:ext cx="2987396" cy="646331"/>
+            </a:xfrm>
+            <a:prstGeom prst="rect">
+              <a:avLst/>
+            </a:prstGeom>
+            <a:noFill/>
+          </p:spPr>
+          <p:txBody>
+            <a:bodyPr wrap="square" rtlCol="0">
+              <a:spAutoFit/>
+            </a:bodyPr>
+            <a:lstStyle/>
+            <a:p>
+              <a:pPr algn="ctr"/>
+              <a:r>
+                <a:rPr lang="en-US" dirty="0"/>
+                <a:t>Group Membership Credentials</a:t>
+              </a:r>
+            </a:p>
+          </p:txBody>
+        </p:sp>
+        <p:cxnSp>
+          <p:nvCxnSpPr>
+            <p:cNvPr id="20" name="Straight Arrow Connector 19">
+              <a:extLst>
+                <a:ext uri="{FF2B5EF4-FFF2-40B4-BE49-F238E27FC236}">
+                  <a16:creationId xmlns:a16="http://schemas.microsoft.com/office/drawing/2014/main" id="{A03078F8-0C6E-4E63-A5FD-B491E1201CF1}"/>
+                </a:ext>
+              </a:extLst>
+            </p:cNvPr>
+            <p:cNvCxnSpPr>
+              <a:cxnSpLocks/>
+            </p:cNvCxnSpPr>
+            <p:nvPr/>
+          </p:nvCxnSpPr>
+          <p:spPr>
+            <a:xfrm>
+              <a:off x="8031701" y="3278278"/>
+              <a:ext cx="2977117" cy="2513"/>
+            </a:xfrm>
+            <a:prstGeom prst="straightConnector1">
+              <a:avLst/>
+            </a:prstGeom>
+            <a:ln w="25400">
+              <a:solidFill>
+                <a:schemeClr val="tx1"/>
+              </a:solidFill>
+              <a:headEnd type="arrow"/>
+              <a:tailEnd type="none" w="lg" len="lg"/>
+            </a:ln>
+          </p:spPr>
+          <p:style>
+            <a:lnRef idx="1">
+              <a:schemeClr val="accent1"/>
+            </a:lnRef>
+            <a:fillRef idx="0">
+              <a:schemeClr val="accent1"/>
+            </a:fillRef>
+            <a:effectRef idx="0">
+              <a:schemeClr val="accent1"/>
+            </a:effectRef>
+            <a:fontRef idx="minor">
+              <a:schemeClr val="tx1"/>
+            </a:fontRef>
+          </p:style>
+        </p:cxnSp>
+        <p:cxnSp>
+          <p:nvCxnSpPr>
+            <p:cNvPr id="7" name="Straight Connector 6">
+              <a:extLst>
+                <a:ext uri="{FF2B5EF4-FFF2-40B4-BE49-F238E27FC236}">
+                  <a16:creationId xmlns:a16="http://schemas.microsoft.com/office/drawing/2014/main" id="{52B5D75B-CBDE-409B-B42B-052549F0C151}"/>
+                </a:ext>
+              </a:extLst>
+            </p:cNvPr>
+            <p:cNvCxnSpPr>
+              <a:cxnSpLocks/>
+            </p:cNvCxnSpPr>
+            <p:nvPr/>
+          </p:nvCxnSpPr>
+          <p:spPr>
+            <a:xfrm>
+              <a:off x="6812389" y="4200827"/>
+              <a:ext cx="2320976" cy="0"/>
+            </a:xfrm>
+            <a:prstGeom prst="line">
+              <a:avLst/>
+            </a:prstGeom>
+            <a:ln w="25400">
+              <a:solidFill>
+                <a:schemeClr val="tx1"/>
+              </a:solidFill>
+            </a:ln>
+          </p:spPr>
+          <p:style>
+            <a:lnRef idx="1">
+              <a:schemeClr val="accent1"/>
+            </a:lnRef>
+            <a:fillRef idx="0">
+              <a:schemeClr val="accent1"/>
+            </a:fillRef>
+            <a:effectRef idx="0">
+              <a:schemeClr val="accent1"/>
+            </a:effectRef>
+            <a:fontRef idx="minor">
+              <a:schemeClr val="tx1"/>
+            </a:fontRef>
+          </p:style>
+        </p:cxnSp>
+        <p:sp>
+          <p:nvSpPr>
+            <p:cNvPr id="24" name="TextBox 23">
+              <a:extLst>
+                <a:ext uri="{FF2B5EF4-FFF2-40B4-BE49-F238E27FC236}">
+                  <a16:creationId xmlns:a16="http://schemas.microsoft.com/office/drawing/2014/main" id="{FA92B5C6-08A5-4145-A329-8369841A8C00}"/>
+                </a:ext>
+              </a:extLst>
+            </p:cNvPr>
+            <p:cNvSpPr txBox="1"/>
+            <p:nvPr/>
+          </p:nvSpPr>
+          <p:spPr>
+            <a:xfrm flipH="1">
+              <a:off x="10422077" y="1609183"/>
+              <a:ext cx="1230188" cy="369332"/>
+            </a:xfrm>
+            <a:prstGeom prst="rect">
+              <a:avLst/>
+            </a:prstGeom>
             <a:solidFill>
               <a:schemeClr val="tx1"/>
             </a:solidFill>
-          </a:ln>
-        </p:spPr>
-        <p:style>
-          <a:lnRef idx="1">
-            <a:schemeClr val="accent1"/>
-          </a:lnRef>
-          <a:fillRef idx="0">
-            <a:schemeClr val="accent1"/>
-          </a:fillRef>
-          <a:effectRef idx="0">
-            <a:schemeClr val="accent1"/>
-          </a:effectRef>
-          <a:fontRef idx="minor">
-            <a:schemeClr val="tx1"/>
-          </a:fontRef>
-        </p:style>
-      </p:cxnSp>
-      <p:sp>
-        <p:nvSpPr>
-          <p:cNvPr id="9" name="TextBox 8">
-            <a:extLst>
-              <a:ext uri="{FF2B5EF4-FFF2-40B4-BE49-F238E27FC236}">
-                <a16:creationId xmlns:a16="http://schemas.microsoft.com/office/drawing/2014/main" id="{9EF57797-5D19-4A08-98CF-19C1AF66048E}"/>
-              </a:ext>
-            </a:extLst>
-          </p:cNvPr>
-          <p:cNvSpPr txBox="1"/>
-          <p:nvPr/>
-        </p:nvSpPr>
-        <p:spPr>
-          <a:xfrm flipH="1">
-            <a:off x="7912794" y="5390129"/>
-            <a:ext cx="1230188" cy="640080"/>
-          </a:xfrm>
-          <a:prstGeom prst="rect">
-            <a:avLst/>
-          </a:prstGeom>
-          <a:solidFill>
-            <a:schemeClr val="tx1"/>
-          </a:solidFill>
-        </p:spPr>
-        <p:txBody>
-          <a:bodyPr wrap="square" rtlCol="0">
-            <a:spAutoFit/>
-          </a:bodyPr>
-          <a:lstStyle/>
-          <a:p>
-            <a:pPr algn="ctr"/>
-            <a:r>
-              <a:rPr lang="en-US" dirty="0">
-                <a:solidFill>
-                  <a:schemeClr val="bg1"/>
-                </a:solidFill>
-              </a:rPr>
-              <a:t>SGX Processor</a:t>
-            </a:r>
-          </a:p>
-        </p:txBody>
-      </p:sp>
-      <p:sp>
-        <p:nvSpPr>
-          <p:cNvPr id="10" name="TextBox 9">
-            <a:extLst>
-              <a:ext uri="{FF2B5EF4-FFF2-40B4-BE49-F238E27FC236}">
-                <a16:creationId xmlns:a16="http://schemas.microsoft.com/office/drawing/2014/main" id="{A33A78A9-DA19-41EF-8914-052A45DDB35F}"/>
-              </a:ext>
-            </a:extLst>
-          </p:cNvPr>
-          <p:cNvSpPr txBox="1"/>
-          <p:nvPr/>
-        </p:nvSpPr>
-        <p:spPr>
-          <a:xfrm flipH="1">
-            <a:off x="10324614" y="5392017"/>
-            <a:ext cx="1230188" cy="640080"/>
-          </a:xfrm>
-          <a:prstGeom prst="rect">
-            <a:avLst/>
-          </a:prstGeom>
-          <a:solidFill>
-            <a:schemeClr val="tx1"/>
-          </a:solidFill>
-        </p:spPr>
-        <p:txBody>
-          <a:bodyPr wrap="square" rtlCol="0" anchor="ctr" anchorCtr="0">
-            <a:spAutoFit/>
-          </a:bodyPr>
-          <a:lstStyle/>
-          <a:p>
-            <a:pPr algn="ctr"/>
-            <a:r>
-              <a:rPr lang="en-US" dirty="0">
-                <a:solidFill>
-                  <a:schemeClr val="bg1"/>
-                </a:solidFill>
-              </a:rPr>
-              <a:t>IAS</a:t>
-            </a:r>
-          </a:p>
-        </p:txBody>
-      </p:sp>
-      <p:cxnSp>
-        <p:nvCxnSpPr>
-          <p:cNvPr id="12" name="Straight Connector 11">
-            <a:extLst>
-              <a:ext uri="{FF2B5EF4-FFF2-40B4-BE49-F238E27FC236}">
-                <a16:creationId xmlns:a16="http://schemas.microsoft.com/office/drawing/2014/main" id="{245BDD42-CC9B-46C4-9527-F0879DCCD7D9}"/>
-              </a:ext>
-            </a:extLst>
-          </p:cNvPr>
-          <p:cNvCxnSpPr/>
-          <p:nvPr/>
-        </p:nvCxnSpPr>
-        <p:spPr>
-          <a:xfrm>
-            <a:off x="8527888" y="2301949"/>
-            <a:ext cx="2411820" cy="0"/>
-          </a:xfrm>
-          <a:prstGeom prst="line">
-            <a:avLst/>
-          </a:prstGeom>
-          <a:ln w="25400">
+          </p:spPr>
+          <p:txBody>
+            <a:bodyPr wrap="square" rtlCol="0">
+              <a:spAutoFit/>
+            </a:bodyPr>
+            <a:lstStyle/>
+            <a:p>
+              <a:pPr algn="ctr"/>
+              <a:r>
+                <a:rPr lang="en-US" dirty="0">
+                  <a:solidFill>
+                    <a:schemeClr val="bg1"/>
+                  </a:solidFill>
+                </a:rPr>
+                <a:t>IAS</a:t>
+              </a:r>
+            </a:p>
+          </p:txBody>
+        </p:sp>
+        <p:cxnSp>
+          <p:nvCxnSpPr>
+            <p:cNvPr id="28" name="Straight Connector 27">
+              <a:extLst>
+                <a:ext uri="{FF2B5EF4-FFF2-40B4-BE49-F238E27FC236}">
+                  <a16:creationId xmlns:a16="http://schemas.microsoft.com/office/drawing/2014/main" id="{FE224A87-E331-480A-AEDE-27BB4A87F4E5}"/>
+                </a:ext>
+              </a:extLst>
+            </p:cNvPr>
+            <p:cNvCxnSpPr>
+              <a:cxnSpLocks/>
+            </p:cNvCxnSpPr>
+            <p:nvPr/>
+          </p:nvCxnSpPr>
+          <p:spPr>
+            <a:xfrm>
+              <a:off x="6810618" y="4184982"/>
+              <a:ext cx="20683" cy="2066962"/>
+            </a:xfrm>
+            <a:prstGeom prst="line">
+              <a:avLst/>
+            </a:prstGeom>
+            <a:ln w="25400">
+              <a:solidFill>
+                <a:schemeClr val="accent5"/>
+              </a:solidFill>
+            </a:ln>
+          </p:spPr>
+          <p:style>
+            <a:lnRef idx="1">
+              <a:schemeClr val="accent1"/>
+            </a:lnRef>
+            <a:fillRef idx="0">
+              <a:schemeClr val="accent1"/>
+            </a:fillRef>
+            <a:effectRef idx="0">
+              <a:schemeClr val="accent1"/>
+            </a:effectRef>
+            <a:fontRef idx="minor">
+              <a:schemeClr val="tx1"/>
+            </a:fontRef>
+          </p:style>
+        </p:cxnSp>
+        <p:sp>
+          <p:nvSpPr>
+            <p:cNvPr id="30" name="TextBox 29">
+              <a:extLst>
+                <a:ext uri="{FF2B5EF4-FFF2-40B4-BE49-F238E27FC236}">
+                  <a16:creationId xmlns:a16="http://schemas.microsoft.com/office/drawing/2014/main" id="{EFE33E3A-A07F-4D9F-9D9E-F7DA87F45927}"/>
+                </a:ext>
+              </a:extLst>
+            </p:cNvPr>
+            <p:cNvSpPr txBox="1"/>
+            <p:nvPr/>
+          </p:nvSpPr>
+          <p:spPr>
+            <a:xfrm flipH="1">
+              <a:off x="6216207" y="6246628"/>
+              <a:ext cx="1230188" cy="369332"/>
+            </a:xfrm>
+            <a:prstGeom prst="rect">
+              <a:avLst/>
+            </a:prstGeom>
             <a:solidFill>
-              <a:srgbClr val="00B050"/>
+              <a:schemeClr val="accent5"/>
             </a:solidFill>
-            <a:headEnd type="oval" w="lg" len="lg"/>
-            <a:tailEnd type="oval" w="lg" len="lg"/>
-          </a:ln>
-        </p:spPr>
-        <p:style>
-          <a:lnRef idx="1">
-            <a:schemeClr val="accent1"/>
-          </a:lnRef>
-          <a:fillRef idx="0">
-            <a:schemeClr val="accent1"/>
-          </a:fillRef>
-          <a:effectRef idx="0">
-            <a:schemeClr val="accent1"/>
-          </a:effectRef>
-          <a:fontRef idx="minor">
-            <a:schemeClr val="tx1"/>
-          </a:fontRef>
-        </p:style>
-      </p:cxnSp>
-      <p:sp>
-        <p:nvSpPr>
-          <p:cNvPr id="13" name="TextBox 12">
-            <a:extLst>
-              <a:ext uri="{FF2B5EF4-FFF2-40B4-BE49-F238E27FC236}">
-                <a16:creationId xmlns:a16="http://schemas.microsoft.com/office/drawing/2014/main" id="{44E91206-8F2F-4D78-A303-72FA2D540805}"/>
-              </a:ext>
-            </a:extLst>
-          </p:cNvPr>
-          <p:cNvSpPr txBox="1"/>
-          <p:nvPr/>
-        </p:nvSpPr>
-        <p:spPr>
-          <a:xfrm flipH="1">
-            <a:off x="8527888" y="1953847"/>
-            <a:ext cx="2399770" cy="369332"/>
-          </a:xfrm>
-          <a:prstGeom prst="rect">
-            <a:avLst/>
-          </a:prstGeom>
-          <a:noFill/>
-        </p:spPr>
-        <p:txBody>
-          <a:bodyPr wrap="square" rtlCol="0">
-            <a:spAutoFit/>
-          </a:bodyPr>
-          <a:lstStyle/>
-          <a:p>
-            <a:pPr algn="ctr"/>
-            <a:r>
-              <a:rPr lang="en-US" dirty="0" err="1"/>
-              <a:t>RoT</a:t>
-            </a:r>
-            <a:r>
-              <a:rPr lang="en-US" dirty="0"/>
-              <a:t> established at </a:t>
-            </a:r>
-            <a:r>
-              <a:rPr lang="en-US" dirty="0" err="1"/>
-              <a:t>mfg</a:t>
-            </a:r>
-            <a:endParaRPr lang="en-US" dirty="0"/>
-          </a:p>
-        </p:txBody>
-      </p:sp>
-      <p:sp>
-        <p:nvSpPr>
-          <p:cNvPr id="15" name="Arrow: Curved Right 14">
-            <a:extLst>
-              <a:ext uri="{FF2B5EF4-FFF2-40B4-BE49-F238E27FC236}">
-                <a16:creationId xmlns:a16="http://schemas.microsoft.com/office/drawing/2014/main" id="{81EE6113-4E25-46DD-A743-ABD65CF63E3D}"/>
-              </a:ext>
-            </a:extLst>
-          </p:cNvPr>
-          <p:cNvSpPr/>
-          <p:nvPr/>
-        </p:nvSpPr>
-        <p:spPr>
-          <a:xfrm>
-            <a:off x="8139800" y="4262800"/>
-            <a:ext cx="388088" cy="643270"/>
-          </a:xfrm>
-          <a:prstGeom prst="curvedRightArrow">
-            <a:avLst/>
-          </a:prstGeom>
-          <a:solidFill>
-            <a:srgbClr val="002060"/>
-          </a:solidFill>
-          <a:ln>
+          </p:spPr>
+          <p:txBody>
+            <a:bodyPr wrap="square" rtlCol="0">
+              <a:spAutoFit/>
+            </a:bodyPr>
+            <a:lstStyle/>
+            <a:p>
+              <a:pPr algn="ctr"/>
+              <a:r>
+                <a:rPr lang="en-US" dirty="0">
+                  <a:solidFill>
+                    <a:schemeClr val="bg1"/>
+                  </a:solidFill>
+                </a:rPr>
+                <a:t>QE</a:t>
+              </a:r>
+            </a:p>
+          </p:txBody>
+        </p:sp>
+        <p:cxnSp>
+          <p:nvCxnSpPr>
+            <p:cNvPr id="29" name="Straight Connector 28">
+              <a:extLst>
+                <a:ext uri="{FF2B5EF4-FFF2-40B4-BE49-F238E27FC236}">
+                  <a16:creationId xmlns:a16="http://schemas.microsoft.com/office/drawing/2014/main" id="{1E910DEE-9AB3-4160-B046-ED1EABF564A9}"/>
+                </a:ext>
+              </a:extLst>
+            </p:cNvPr>
+            <p:cNvCxnSpPr>
+              <a:cxnSpLocks/>
+            </p:cNvCxnSpPr>
+            <p:nvPr/>
+          </p:nvCxnSpPr>
+          <p:spPr>
+            <a:xfrm>
+              <a:off x="9117411" y="4184982"/>
+              <a:ext cx="0" cy="2066962"/>
+            </a:xfrm>
+            <a:prstGeom prst="line">
+              <a:avLst/>
+            </a:prstGeom>
+            <a:ln w="25400">
+              <a:solidFill>
+                <a:schemeClr val="tx1"/>
+              </a:solidFill>
+            </a:ln>
+          </p:spPr>
+          <p:style>
+            <a:lnRef idx="1">
+              <a:schemeClr val="accent1"/>
+            </a:lnRef>
+            <a:fillRef idx="0">
+              <a:schemeClr val="accent1"/>
+            </a:fillRef>
+            <a:effectRef idx="0">
+              <a:schemeClr val="accent1"/>
+            </a:effectRef>
+            <a:fontRef idx="minor">
+              <a:schemeClr val="tx1"/>
+            </a:fontRef>
+          </p:style>
+        </p:cxnSp>
+        <p:sp>
+          <p:nvSpPr>
+            <p:cNvPr id="31" name="TextBox 30">
+              <a:extLst>
+                <a:ext uri="{FF2B5EF4-FFF2-40B4-BE49-F238E27FC236}">
+                  <a16:creationId xmlns:a16="http://schemas.microsoft.com/office/drawing/2014/main" id="{5EB0703A-7ACC-44EC-8179-579508A1EE49}"/>
+                </a:ext>
+              </a:extLst>
+            </p:cNvPr>
+            <p:cNvSpPr txBox="1"/>
+            <p:nvPr/>
+          </p:nvSpPr>
+          <p:spPr>
+            <a:xfrm flipH="1">
+              <a:off x="8502317" y="6246628"/>
+              <a:ext cx="1230188" cy="369332"/>
+            </a:xfrm>
+            <a:prstGeom prst="rect">
+              <a:avLst/>
+            </a:prstGeom>
             <a:solidFill>
               <a:schemeClr val="tx1"/>
             </a:solidFill>
-          </a:ln>
-        </p:spPr>
-        <p:style>
-          <a:lnRef idx="2">
-            <a:schemeClr val="accent1">
-              <a:shade val="50000"/>
-            </a:schemeClr>
-          </a:lnRef>
-          <a:fillRef idx="1">
-            <a:schemeClr val="accent1"/>
-          </a:fillRef>
-          <a:effectRef idx="0">
-            <a:schemeClr val="accent1"/>
-          </a:effectRef>
-          <a:fontRef idx="minor">
-            <a:schemeClr val="lt1"/>
-          </a:fontRef>
-        </p:style>
-        <p:txBody>
-          <a:bodyPr rtlCol="0" anchor="ctr"/>
-          <a:lstStyle/>
-          <a:p>
-            <a:pPr algn="ctr"/>
-            <a:endParaRPr lang="en-US">
+          </p:spPr>
+          <p:txBody>
+            <a:bodyPr wrap="square" rtlCol="0">
+              <a:spAutoFit/>
+            </a:bodyPr>
+            <a:lstStyle/>
+            <a:p>
+              <a:pPr algn="ctr"/>
+              <a:r>
+                <a:rPr lang="en-US" dirty="0">
+                  <a:solidFill>
+                    <a:schemeClr val="bg1"/>
+                  </a:solidFill>
+                </a:rPr>
+                <a:t>enclave</a:t>
+              </a:r>
+            </a:p>
+          </p:txBody>
+        </p:sp>
+        <p:sp>
+          <p:nvSpPr>
+            <p:cNvPr id="38" name="TextBox 37">
+              <a:extLst>
+                <a:ext uri="{FF2B5EF4-FFF2-40B4-BE49-F238E27FC236}">
+                  <a16:creationId xmlns:a16="http://schemas.microsoft.com/office/drawing/2014/main" id="{A404E825-B499-4EA1-9EB0-CE74D88934C3}"/>
+                </a:ext>
+              </a:extLst>
+            </p:cNvPr>
+            <p:cNvSpPr txBox="1"/>
+            <p:nvPr/>
+          </p:nvSpPr>
+          <p:spPr>
+            <a:xfrm>
+              <a:off x="6805300" y="4360995"/>
+              <a:ext cx="2320975" cy="369332"/>
+            </a:xfrm>
+            <a:prstGeom prst="rect">
+              <a:avLst/>
+            </a:prstGeom>
+            <a:noFill/>
+          </p:spPr>
+          <p:txBody>
+            <a:bodyPr wrap="square" rtlCol="0">
+              <a:spAutoFit/>
+            </a:bodyPr>
+            <a:lstStyle/>
+            <a:p>
+              <a:pPr algn="ctr"/>
+              <a:r>
+                <a:rPr lang="en-US" dirty="0" err="1"/>
+                <a:t>local_attest</a:t>
+              </a:r>
+              <a:r>
+                <a:rPr lang="en-US" dirty="0"/>
+                <a:t>(</a:t>
+              </a:r>
+              <a:r>
+                <a:rPr lang="en-US" dirty="0" err="1"/>
+                <a:t>qe</a:t>
+              </a:r>
+              <a:r>
+                <a:rPr lang="en-US" dirty="0"/>
+                <a:t>), nonce</a:t>
+              </a:r>
+            </a:p>
+          </p:txBody>
+        </p:sp>
+        <p:cxnSp>
+          <p:nvCxnSpPr>
+            <p:cNvPr id="37" name="Straight Arrow Connector 36">
+              <a:extLst>
+                <a:ext uri="{FF2B5EF4-FFF2-40B4-BE49-F238E27FC236}">
+                  <a16:creationId xmlns:a16="http://schemas.microsoft.com/office/drawing/2014/main" id="{05CA96D0-F861-437F-AFB1-056338DA081F}"/>
+                </a:ext>
+              </a:extLst>
+            </p:cNvPr>
+            <p:cNvCxnSpPr/>
+            <p:nvPr/>
+          </p:nvCxnSpPr>
+          <p:spPr>
+            <a:xfrm>
+              <a:off x="6812389" y="4726172"/>
+              <a:ext cx="2320976" cy="0"/>
+            </a:xfrm>
+            <a:prstGeom prst="straightConnector1">
+              <a:avLst/>
+            </a:prstGeom>
+            <a:ln w="15875">
               <a:solidFill>
                 <a:schemeClr val="tx1"/>
               </a:solidFill>
-            </a:endParaRPr>
-          </a:p>
-        </p:txBody>
-      </p:sp>
-      <p:sp>
-        <p:nvSpPr>
-          <p:cNvPr id="16" name="TextBox 15">
-            <a:extLst>
-              <a:ext uri="{FF2B5EF4-FFF2-40B4-BE49-F238E27FC236}">
-                <a16:creationId xmlns:a16="http://schemas.microsoft.com/office/drawing/2014/main" id="{C48C0B54-2A73-49E6-9A2F-75AAB3FE7118}"/>
-              </a:ext>
-            </a:extLst>
-          </p:cNvPr>
-          <p:cNvSpPr txBox="1"/>
-          <p:nvPr/>
-        </p:nvSpPr>
-        <p:spPr>
-          <a:xfrm>
-            <a:off x="7211555" y="2482542"/>
-            <a:ext cx="1171575" cy="646331"/>
-          </a:xfrm>
-          <a:prstGeom prst="rect">
-            <a:avLst/>
-          </a:prstGeom>
-          <a:noFill/>
-        </p:spPr>
-        <p:txBody>
-          <a:bodyPr wrap="square" rtlCol="0">
-            <a:spAutoFit/>
-          </a:bodyPr>
-          <a:lstStyle/>
-          <a:p>
-            <a:r>
-              <a:rPr lang="en-US" dirty="0"/>
-              <a:t>EPID Key Gen</a:t>
-            </a:r>
-          </a:p>
-        </p:txBody>
-      </p:sp>
-      <p:cxnSp>
-        <p:nvCxnSpPr>
-          <p:cNvPr id="18" name="Straight Arrow Connector 17">
-            <a:extLst>
-              <a:ext uri="{FF2B5EF4-FFF2-40B4-BE49-F238E27FC236}">
-                <a16:creationId xmlns:a16="http://schemas.microsoft.com/office/drawing/2014/main" id="{A1DF2CF6-8318-4AED-8E78-9AE6095AEE4F}"/>
-              </a:ext>
-            </a:extLst>
-          </p:cNvPr>
-          <p:cNvCxnSpPr/>
-          <p:nvPr/>
-        </p:nvCxnSpPr>
-        <p:spPr>
-          <a:xfrm>
-            <a:off x="8527888" y="3354572"/>
-            <a:ext cx="2411820" cy="0"/>
-          </a:xfrm>
-          <a:prstGeom prst="straightConnector1">
-            <a:avLst/>
-          </a:prstGeom>
-          <a:ln w="25400">
-            <a:solidFill>
+              <a:headEnd type="arrow"/>
+              <a:tailEnd type="none" w="lg" len="lg"/>
+            </a:ln>
+          </p:spPr>
+          <p:style>
+            <a:lnRef idx="1">
+              <a:schemeClr val="accent1"/>
+            </a:lnRef>
+            <a:fillRef idx="0">
+              <a:schemeClr val="accent1"/>
+            </a:fillRef>
+            <a:effectRef idx="0">
+              <a:schemeClr val="accent1"/>
+            </a:effectRef>
+            <a:fontRef idx="minor">
               <a:schemeClr val="tx1"/>
-            </a:solidFill>
-            <a:tailEnd type="arrow" w="lg" len="lg"/>
-          </a:ln>
-        </p:spPr>
-        <p:style>
-          <a:lnRef idx="1">
-            <a:schemeClr val="accent1"/>
-          </a:lnRef>
-          <a:fillRef idx="0">
-            <a:schemeClr val="accent1"/>
-          </a:fillRef>
-          <a:effectRef idx="0">
-            <a:schemeClr val="accent1"/>
-          </a:effectRef>
-          <a:fontRef idx="minor">
-            <a:schemeClr val="tx1"/>
-          </a:fontRef>
-        </p:style>
-      </p:cxnSp>
-      <p:cxnSp>
-        <p:nvCxnSpPr>
-          <p:cNvPr id="20" name="Straight Arrow Connector 19">
-            <a:extLst>
-              <a:ext uri="{FF2B5EF4-FFF2-40B4-BE49-F238E27FC236}">
-                <a16:creationId xmlns:a16="http://schemas.microsoft.com/office/drawing/2014/main" id="{A03078F8-0C6E-4E63-A5FD-B491E1201CF1}"/>
-              </a:ext>
-            </a:extLst>
-          </p:cNvPr>
-          <p:cNvCxnSpPr/>
-          <p:nvPr/>
-        </p:nvCxnSpPr>
-        <p:spPr>
-          <a:xfrm>
-            <a:off x="8542065" y="4086446"/>
-            <a:ext cx="2411820" cy="0"/>
-          </a:xfrm>
-          <a:prstGeom prst="straightConnector1">
-            <a:avLst/>
-          </a:prstGeom>
-          <a:ln w="25400">
-            <a:solidFill>
-              <a:schemeClr val="tx1"/>
-            </a:solidFill>
-            <a:headEnd type="arrow"/>
-            <a:tailEnd type="none" w="lg" len="lg"/>
-          </a:ln>
-        </p:spPr>
-        <p:style>
-          <a:lnRef idx="1">
-            <a:schemeClr val="accent1"/>
-          </a:lnRef>
-          <a:fillRef idx="0">
-            <a:schemeClr val="accent1"/>
-          </a:fillRef>
-          <a:effectRef idx="0">
-            <a:schemeClr val="accent1"/>
-          </a:effectRef>
-          <a:fontRef idx="minor">
-            <a:schemeClr val="tx1"/>
-          </a:fontRef>
-        </p:style>
-      </p:cxnSp>
-      <p:sp>
-        <p:nvSpPr>
-          <p:cNvPr id="22" name="TextBox 21">
-            <a:extLst>
-              <a:ext uri="{FF2B5EF4-FFF2-40B4-BE49-F238E27FC236}">
-                <a16:creationId xmlns:a16="http://schemas.microsoft.com/office/drawing/2014/main" id="{95CAE067-91A0-4ABE-8BCC-396C527D16CF}"/>
-              </a:ext>
-            </a:extLst>
-          </p:cNvPr>
-          <p:cNvSpPr txBox="1"/>
-          <p:nvPr/>
-        </p:nvSpPr>
-        <p:spPr>
-          <a:xfrm flipH="1">
-            <a:off x="8531786" y="3760899"/>
-            <a:ext cx="2415010" cy="646331"/>
-          </a:xfrm>
-          <a:prstGeom prst="rect">
-            <a:avLst/>
-          </a:prstGeom>
-          <a:noFill/>
-        </p:spPr>
-        <p:txBody>
-          <a:bodyPr wrap="square" rtlCol="0">
-            <a:spAutoFit/>
-          </a:bodyPr>
-          <a:lstStyle/>
-          <a:p>
-            <a:pPr algn="ctr"/>
-            <a:r>
-              <a:rPr lang="en-US" dirty="0"/>
-              <a:t>Group Credentials </a:t>
-            </a:r>
-            <a:br>
-              <a:rPr lang="en-US" dirty="0"/>
-            </a:br>
-            <a:r>
-              <a:rPr lang="en-US" dirty="0"/>
-              <a:t>(if </a:t>
-            </a:r>
-            <a:r>
-              <a:rPr lang="en-US" dirty="0" err="1"/>
-              <a:t>PoK</a:t>
-            </a:r>
-            <a:r>
-              <a:rPr lang="en-US" dirty="0"/>
-              <a:t> valid)</a:t>
-            </a:r>
-          </a:p>
-        </p:txBody>
-      </p:sp>
-      <p:sp>
-        <p:nvSpPr>
-          <p:cNvPr id="17" name="Arrow: Curved Right 16">
-            <a:extLst>
-              <a:ext uri="{FF2B5EF4-FFF2-40B4-BE49-F238E27FC236}">
-                <a16:creationId xmlns:a16="http://schemas.microsoft.com/office/drawing/2014/main" id="{70224B67-A4C9-42B6-A066-5902C3AF7B37}"/>
-              </a:ext>
-            </a:extLst>
-          </p:cNvPr>
-          <p:cNvSpPr/>
-          <p:nvPr/>
-        </p:nvSpPr>
-        <p:spPr>
-          <a:xfrm>
-            <a:off x="8127751" y="2520875"/>
-            <a:ext cx="388088" cy="643270"/>
-          </a:xfrm>
-          <a:prstGeom prst="curvedRightArrow">
-            <a:avLst/>
-          </a:prstGeom>
-          <a:solidFill>
-            <a:srgbClr val="002060"/>
-          </a:solidFill>
-          <a:ln>
-            <a:solidFill>
-              <a:schemeClr val="tx1"/>
-            </a:solidFill>
-          </a:ln>
-        </p:spPr>
-        <p:style>
-          <a:lnRef idx="2">
-            <a:schemeClr val="accent1">
-              <a:shade val="50000"/>
-            </a:schemeClr>
-          </a:lnRef>
-          <a:fillRef idx="1">
-            <a:schemeClr val="accent1"/>
-          </a:fillRef>
-          <a:effectRef idx="0">
-            <a:schemeClr val="accent1"/>
-          </a:effectRef>
-          <a:fontRef idx="minor">
-            <a:schemeClr val="lt1"/>
-          </a:fontRef>
-        </p:style>
-        <p:txBody>
-          <a:bodyPr rtlCol="0" anchor="ctr"/>
-          <a:lstStyle/>
-          <a:p>
-            <a:pPr algn="ctr"/>
-            <a:endParaRPr lang="en-US">
+            </a:fontRef>
+          </p:style>
+        </p:cxnSp>
+        <p:sp>
+          <p:nvSpPr>
+            <p:cNvPr id="40" name="TextBox 39">
+              <a:extLst>
+                <a:ext uri="{FF2B5EF4-FFF2-40B4-BE49-F238E27FC236}">
+                  <a16:creationId xmlns:a16="http://schemas.microsoft.com/office/drawing/2014/main" id="{FA5C49B8-0E2A-4070-AE7D-82C3B32541A4}"/>
+                </a:ext>
+              </a:extLst>
+            </p:cNvPr>
+            <p:cNvSpPr txBox="1"/>
+            <p:nvPr/>
+          </p:nvSpPr>
+          <p:spPr>
+            <a:xfrm>
+              <a:off x="6814160" y="4959962"/>
+              <a:ext cx="2320975" cy="646331"/>
+            </a:xfrm>
+            <a:prstGeom prst="rect">
+              <a:avLst/>
+            </a:prstGeom>
+            <a:noFill/>
+          </p:spPr>
+          <p:txBody>
+            <a:bodyPr wrap="square" rtlCol="0">
+              <a:spAutoFit/>
+            </a:bodyPr>
+            <a:lstStyle/>
+            <a:p>
+              <a:pPr algn="ctr"/>
+              <a:r>
+                <a:rPr lang="en-US" b="1" dirty="0" err="1">
+                  <a:solidFill>
+                    <a:srgbClr val="FF0000"/>
+                  </a:solidFill>
+                </a:rPr>
+                <a:t>enc</a:t>
+              </a:r>
+              <a:r>
+                <a:rPr lang="en-US" b="1" dirty="0">
+                  <a:solidFill>
+                    <a:srgbClr val="FF0000"/>
+                  </a:solidFill>
+                </a:rPr>
+                <a:t>(</a:t>
+              </a:r>
+              <a:r>
+                <a:rPr lang="en-US" b="1" dirty="0" err="1">
+                  <a:solidFill>
+                    <a:srgbClr val="FF0000"/>
+                  </a:solidFill>
+                </a:rPr>
+                <a:t>epid_sig</a:t>
+              </a:r>
+              <a:r>
+                <a:rPr lang="en-US" b="1" dirty="0">
+                  <a:solidFill>
+                    <a:srgbClr val="FF0000"/>
+                  </a:solidFill>
+                </a:rPr>
+                <a:t>)</a:t>
+              </a:r>
+              <a:r>
+                <a:rPr lang="en-US" dirty="0"/>
+                <a:t>, </a:t>
+              </a:r>
+              <a:r>
+                <a:rPr lang="en-US" dirty="0" err="1"/>
+                <a:t>local_attest</a:t>
+              </a:r>
+              <a:r>
+                <a:rPr lang="en-US" dirty="0"/>
+                <a:t>(enclave) </a:t>
+              </a:r>
+            </a:p>
+          </p:txBody>
+        </p:sp>
+        <p:cxnSp>
+          <p:nvCxnSpPr>
+            <p:cNvPr id="39" name="Straight Arrow Connector 38">
+              <a:extLst>
+                <a:ext uri="{FF2B5EF4-FFF2-40B4-BE49-F238E27FC236}">
+                  <a16:creationId xmlns:a16="http://schemas.microsoft.com/office/drawing/2014/main" id="{4475BEFB-F005-45CB-B0B9-61C9439841F6}"/>
+                </a:ext>
+              </a:extLst>
+            </p:cNvPr>
+            <p:cNvCxnSpPr/>
+            <p:nvPr/>
+          </p:nvCxnSpPr>
+          <p:spPr>
+            <a:xfrm>
+              <a:off x="6810618" y="5293242"/>
+              <a:ext cx="2320976" cy="0"/>
+            </a:xfrm>
+            <a:prstGeom prst="straightConnector1">
+              <a:avLst/>
+            </a:prstGeom>
+            <a:ln w="15875">
               <a:solidFill>
                 <a:schemeClr val="tx1"/>
               </a:solidFill>
-            </a:endParaRPr>
-          </a:p>
-        </p:txBody>
-      </p:sp>
-      <p:sp>
-        <p:nvSpPr>
-          <p:cNvPr id="21" name="TextBox 20">
-            <a:extLst>
-              <a:ext uri="{FF2B5EF4-FFF2-40B4-BE49-F238E27FC236}">
-                <a16:creationId xmlns:a16="http://schemas.microsoft.com/office/drawing/2014/main" id="{7DD781C7-DD8C-4904-AEAE-B3227D3DCE08}"/>
-              </a:ext>
-            </a:extLst>
-          </p:cNvPr>
-          <p:cNvSpPr txBox="1"/>
-          <p:nvPr/>
-        </p:nvSpPr>
-        <p:spPr>
-          <a:xfrm>
-            <a:off x="7162269" y="4210898"/>
-            <a:ext cx="1171575" cy="646331"/>
-          </a:xfrm>
-          <a:prstGeom prst="rect">
-            <a:avLst/>
-          </a:prstGeom>
-          <a:noFill/>
-        </p:spPr>
-        <p:txBody>
-          <a:bodyPr wrap="square" rtlCol="0">
-            <a:spAutoFit/>
-          </a:bodyPr>
-          <a:lstStyle/>
-          <a:p>
-            <a:r>
-              <a:rPr lang="en-US" dirty="0"/>
-              <a:t>Gen Quote</a:t>
-            </a:r>
-          </a:p>
-        </p:txBody>
-      </p:sp>
+              <a:headEnd type="none" w="lg" len="lg"/>
+              <a:tailEnd type="arrow" w="lg" len="lg"/>
+            </a:ln>
+          </p:spPr>
+          <p:style>
+            <a:lnRef idx="1">
+              <a:schemeClr val="accent1"/>
+            </a:lnRef>
+            <a:fillRef idx="0">
+              <a:schemeClr val="accent1"/>
+            </a:fillRef>
+            <a:effectRef idx="0">
+              <a:schemeClr val="accent1"/>
+            </a:effectRef>
+            <a:fontRef idx="minor">
+              <a:schemeClr val="tx1"/>
+            </a:fontRef>
+          </p:style>
+        </p:cxnSp>
+        <p:cxnSp>
+          <p:nvCxnSpPr>
+            <p:cNvPr id="49" name="Straight Arrow Connector 48">
+              <a:extLst>
+                <a:ext uri="{FF2B5EF4-FFF2-40B4-BE49-F238E27FC236}">
+                  <a16:creationId xmlns:a16="http://schemas.microsoft.com/office/drawing/2014/main" id="{AF0D8D18-437F-4DAB-AF19-3ACFB43FCC6D}"/>
+                </a:ext>
+              </a:extLst>
+            </p:cNvPr>
+            <p:cNvCxnSpPr>
+              <a:cxnSpLocks/>
+            </p:cNvCxnSpPr>
+            <p:nvPr/>
+          </p:nvCxnSpPr>
+          <p:spPr>
+            <a:xfrm>
+              <a:off x="9138681" y="5498805"/>
+              <a:ext cx="1877225" cy="0"/>
+            </a:xfrm>
+            <a:prstGeom prst="straightConnector1">
+              <a:avLst/>
+            </a:prstGeom>
+            <a:ln w="15875">
+              <a:solidFill>
+                <a:schemeClr val="tx1"/>
+              </a:solidFill>
+              <a:headEnd type="none" w="lg" len="lg"/>
+              <a:tailEnd type="arrow" w="lg" len="lg"/>
+            </a:ln>
+          </p:spPr>
+          <p:style>
+            <a:lnRef idx="1">
+              <a:schemeClr val="accent1"/>
+            </a:lnRef>
+            <a:fillRef idx="0">
+              <a:schemeClr val="accent1"/>
+            </a:fillRef>
+            <a:effectRef idx="0">
+              <a:schemeClr val="accent1"/>
+            </a:effectRef>
+            <a:fontRef idx="minor">
+              <a:schemeClr val="tx1"/>
+            </a:fontRef>
+          </p:style>
+        </p:cxnSp>
+        <p:cxnSp>
+          <p:nvCxnSpPr>
+            <p:cNvPr id="52" name="Straight Arrow Connector 51">
+              <a:extLst>
+                <a:ext uri="{FF2B5EF4-FFF2-40B4-BE49-F238E27FC236}">
+                  <a16:creationId xmlns:a16="http://schemas.microsoft.com/office/drawing/2014/main" id="{0B1DD540-7262-40CB-BBF2-D783ACE3D468}"/>
+                </a:ext>
+              </a:extLst>
+            </p:cNvPr>
+            <p:cNvCxnSpPr>
+              <a:cxnSpLocks/>
+            </p:cNvCxnSpPr>
+            <p:nvPr/>
+          </p:nvCxnSpPr>
+          <p:spPr>
+            <a:xfrm flipV="1">
+              <a:off x="10980760" y="5730044"/>
+              <a:ext cx="948971" cy="10582"/>
+            </a:xfrm>
+            <a:prstGeom prst="straightConnector1">
+              <a:avLst/>
+            </a:prstGeom>
+            <a:ln w="25400">
+              <a:solidFill>
+                <a:srgbClr val="FF0000"/>
+              </a:solidFill>
+              <a:prstDash val="dash"/>
+              <a:headEnd type="none" w="lg" len="lg"/>
+              <a:tailEnd type="arrow" w="lg" len="lg"/>
+            </a:ln>
+          </p:spPr>
+          <p:style>
+            <a:lnRef idx="1">
+              <a:schemeClr val="accent1"/>
+            </a:lnRef>
+            <a:fillRef idx="0">
+              <a:schemeClr val="accent1"/>
+            </a:fillRef>
+            <a:effectRef idx="0">
+              <a:schemeClr val="accent1"/>
+            </a:effectRef>
+            <a:fontRef idx="minor">
+              <a:schemeClr val="tx1"/>
+            </a:fontRef>
+          </p:style>
+        </p:cxnSp>
+        <p:cxnSp>
+          <p:nvCxnSpPr>
+            <p:cNvPr id="12" name="Straight Connector 11">
+              <a:extLst>
+                <a:ext uri="{FF2B5EF4-FFF2-40B4-BE49-F238E27FC236}">
+                  <a16:creationId xmlns:a16="http://schemas.microsoft.com/office/drawing/2014/main" id="{245BDD42-CC9B-46C4-9527-F0879DCCD7D9}"/>
+                </a:ext>
+              </a:extLst>
+            </p:cNvPr>
+            <p:cNvCxnSpPr>
+              <a:cxnSpLocks/>
+              <a:stCxn id="9" idx="1"/>
+              <a:endCxn id="24" idx="3"/>
+            </p:cNvCxnSpPr>
+            <p:nvPr/>
+          </p:nvCxnSpPr>
+          <p:spPr>
+            <a:xfrm>
+              <a:off x="8646795" y="1777163"/>
+              <a:ext cx="1775282" cy="16686"/>
+            </a:xfrm>
+            <a:prstGeom prst="line">
+              <a:avLst/>
+            </a:prstGeom>
+            <a:ln w="38100">
+              <a:solidFill>
+                <a:srgbClr val="00B050"/>
+              </a:solidFill>
+              <a:headEnd type="oval" w="lg" len="lg"/>
+              <a:tailEnd type="oval" w="lg" len="lg"/>
+            </a:ln>
+          </p:spPr>
+          <p:style>
+            <a:lnRef idx="1">
+              <a:schemeClr val="accent1"/>
+            </a:lnRef>
+            <a:fillRef idx="0">
+              <a:schemeClr val="accent1"/>
+            </a:fillRef>
+            <a:effectRef idx="0">
+              <a:schemeClr val="accent1"/>
+            </a:effectRef>
+            <a:fontRef idx="minor">
+              <a:schemeClr val="tx1"/>
+            </a:fontRef>
+          </p:style>
+        </p:cxnSp>
+        <p:cxnSp>
+          <p:nvCxnSpPr>
+            <p:cNvPr id="59" name="Straight Arrow Connector 58">
+              <a:extLst>
+                <a:ext uri="{FF2B5EF4-FFF2-40B4-BE49-F238E27FC236}">
+                  <a16:creationId xmlns:a16="http://schemas.microsoft.com/office/drawing/2014/main" id="{E22D4D8B-1BA0-4C46-93E2-19ACF550788D}"/>
+                </a:ext>
+              </a:extLst>
+            </p:cNvPr>
+            <p:cNvCxnSpPr/>
+            <p:nvPr/>
+          </p:nvCxnSpPr>
+          <p:spPr>
+            <a:xfrm>
+              <a:off x="6583806" y="2461437"/>
+              <a:ext cx="1428579" cy="0"/>
+            </a:xfrm>
+            <a:prstGeom prst="straightConnector1">
+              <a:avLst/>
+            </a:prstGeom>
+            <a:ln w="25400">
+              <a:solidFill>
+                <a:schemeClr val="tx1"/>
+              </a:solidFill>
+              <a:prstDash val="lgDash"/>
+              <a:tailEnd type="arrow" w="lg" len="lg"/>
+            </a:ln>
+          </p:spPr>
+          <p:style>
+            <a:lnRef idx="1">
+              <a:schemeClr val="accent1"/>
+            </a:lnRef>
+            <a:fillRef idx="0">
+              <a:schemeClr val="accent1"/>
+            </a:fillRef>
+            <a:effectRef idx="0">
+              <a:schemeClr val="accent1"/>
+            </a:effectRef>
+            <a:fontRef idx="minor">
+              <a:schemeClr val="tx1"/>
+            </a:fontRef>
+          </p:style>
+        </p:cxnSp>
+      </p:grpSp>
     </p:spTree>
     <p:extLst>
       <p:ext uri="{BB962C8B-B14F-4D97-AF65-F5344CB8AC3E}">
@@ -9394,8 +10979,8 @@
         </p:blipFill>
         <p:spPr>
           <a:xfrm>
-            <a:off x="181459" y="2025502"/>
-            <a:ext cx="5733282" cy="4088219"/>
+            <a:off x="181458" y="1863030"/>
+            <a:ext cx="5961133" cy="4250692"/>
           </a:xfrm>
           <a:prstGeom prst="rect">
             <a:avLst/>

</xml_diff>

<commit_message>
Adding slides on quoting enclave
Added slides for quoting enclave and am almost done with slides.
</commit_message>
<xml_diff>
--- a/presentation/us-17-Swami-SGX-Remote-Attestation-Is-Not-Sufficient.pptx
+++ b/presentation/us-17-Swami-SGX-Remote-Attestation-Is-Not-Sufficient.pptx
@@ -5,7 +5,7 @@
     <p:sldMasterId id="2147483648" r:id="rId1"/>
   </p:sldMasterIdLst>
   <p:notesMasterIdLst>
-    <p:notesMasterId r:id="rId21"/>
+    <p:notesMasterId r:id="rId22"/>
   </p:notesMasterIdLst>
   <p:sldIdLst>
     <p:sldId id="256" r:id="rId2"/>
@@ -27,6 +27,7 @@
     <p:sldId id="267" r:id="rId18"/>
     <p:sldId id="268" r:id="rId19"/>
     <p:sldId id="279" r:id="rId20"/>
+    <p:sldId id="280" r:id="rId21"/>
   </p:sldIdLst>
   <p:sldSz cx="12192000" cy="6858000"/>
   <p:notesSz cx="6858000" cy="9144000"/>
@@ -197,7 +198,7 @@
             </a:lvl1pPr>
           </a:lstStyle>
           <a:p>
-            <a:endParaRPr lang="en-US"/>
+            <a:endParaRPr lang="en-US" dirty="0"/>
           </a:p>
         </p:txBody>
       </p:sp>
@@ -232,7 +233,7 @@
               <a:rPr lang="en-US" smtClean="0"/>
               <a:t>7/24/2017</a:t>
             </a:fld>
-            <a:endParaRPr lang="en-US"/>
+            <a:endParaRPr lang="en-US" dirty="0"/>
           </a:p>
         </p:txBody>
       </p:sp>
@@ -265,7 +266,7 @@
           <a:bodyPr vert="horz" lIns="91440" tIns="45720" rIns="91440" bIns="45720" rtlCol="0" anchor="ctr"/>
           <a:lstStyle/>
           <a:p>
-            <a:endParaRPr lang="en-US"/>
+            <a:endParaRPr lang="en-US" dirty="0"/>
           </a:p>
         </p:txBody>
       </p:sp>
@@ -355,7 +356,7 @@
             </a:lvl1pPr>
           </a:lstStyle>
           <a:p>
-            <a:endParaRPr lang="en-US"/>
+            <a:endParaRPr lang="en-US" dirty="0"/>
           </a:p>
         </p:txBody>
       </p:sp>
@@ -390,7 +391,7 @@
               <a:rPr lang="en-US" smtClean="0"/>
               <a:t>‹#›</a:t>
             </a:fld>
-            <a:endParaRPr lang="en-US"/>
+            <a:endParaRPr lang="en-US" dirty="0"/>
           </a:p>
         </p:txBody>
       </p:sp>
@@ -564,7 +565,7 @@
               <a:rPr lang="en-US" smtClean="0"/>
               <a:t>2</a:t>
             </a:fld>
-            <a:endParaRPr lang="en-US"/>
+            <a:endParaRPr lang="en-US" dirty="0"/>
           </a:p>
         </p:txBody>
       </p:sp>
@@ -648,7 +649,7 @@
               <a:rPr lang="en-US" smtClean="0"/>
               <a:t>3</a:t>
             </a:fld>
-            <a:endParaRPr lang="en-US"/>
+            <a:endParaRPr lang="en-US" dirty="0"/>
           </a:p>
         </p:txBody>
       </p:sp>
@@ -732,7 +733,7 @@
               <a:rPr lang="en-US" smtClean="0"/>
               <a:t>4</a:t>
             </a:fld>
-            <a:endParaRPr lang="en-US"/>
+            <a:endParaRPr lang="en-US" dirty="0"/>
           </a:p>
         </p:txBody>
       </p:sp>
@@ -816,7 +817,7 @@
               <a:rPr lang="en-US" smtClean="0"/>
               <a:t>5</a:t>
             </a:fld>
-            <a:endParaRPr lang="en-US"/>
+            <a:endParaRPr lang="en-US" dirty="0"/>
           </a:p>
         </p:txBody>
       </p:sp>
@@ -900,7 +901,7 @@
               <a:rPr lang="en-US" smtClean="0"/>
               <a:t>6</a:t>
             </a:fld>
-            <a:endParaRPr lang="en-US"/>
+            <a:endParaRPr lang="en-US" dirty="0"/>
           </a:p>
         </p:txBody>
       </p:sp>
@@ -984,7 +985,7 @@
               <a:rPr lang="en-US" smtClean="0"/>
               <a:t>7</a:t>
             </a:fld>
-            <a:endParaRPr lang="en-US"/>
+            <a:endParaRPr lang="en-US" dirty="0"/>
           </a:p>
         </p:txBody>
       </p:sp>
@@ -1068,7 +1069,7 @@
               <a:rPr lang="en-US" smtClean="0"/>
               <a:t>8</a:t>
             </a:fld>
-            <a:endParaRPr lang="en-US"/>
+            <a:endParaRPr lang="en-US" dirty="0"/>
           </a:p>
         </p:txBody>
       </p:sp>
@@ -1152,7 +1153,7 @@
               <a:rPr lang="en-US" smtClean="0"/>
               <a:t>9</a:t>
             </a:fld>
-            <a:endParaRPr lang="en-US"/>
+            <a:endParaRPr lang="en-US" dirty="0"/>
           </a:p>
         </p:txBody>
       </p:sp>
@@ -1300,7 +1301,7 @@
               <a:rPr lang="en-US" smtClean="0"/>
               <a:t>7/24/2017</a:t>
             </a:fld>
-            <a:endParaRPr lang="en-US"/>
+            <a:endParaRPr lang="en-US" dirty="0"/>
           </a:p>
         </p:txBody>
       </p:sp>
@@ -1319,7 +1320,7 @@
           <a:bodyPr/>
           <a:lstStyle/>
           <a:p>
-            <a:endParaRPr lang="en-US"/>
+            <a:endParaRPr lang="en-US" dirty="0"/>
           </a:p>
         </p:txBody>
       </p:sp>
@@ -1342,7 +1343,7 @@
               <a:rPr lang="en-US" smtClean="0"/>
               <a:t>‹#›</a:t>
             </a:fld>
-            <a:endParaRPr lang="en-US"/>
+            <a:endParaRPr lang="en-US" dirty="0"/>
           </a:p>
         </p:txBody>
       </p:sp>
@@ -1468,7 +1469,7 @@
               <a:rPr lang="en-US" smtClean="0"/>
               <a:t>7/24/2017</a:t>
             </a:fld>
-            <a:endParaRPr lang="en-US"/>
+            <a:endParaRPr lang="en-US" dirty="0"/>
           </a:p>
         </p:txBody>
       </p:sp>
@@ -1487,7 +1488,7 @@
           <a:bodyPr/>
           <a:lstStyle/>
           <a:p>
-            <a:endParaRPr lang="en-US"/>
+            <a:endParaRPr lang="en-US" dirty="0"/>
           </a:p>
         </p:txBody>
       </p:sp>
@@ -1510,7 +1511,7 @@
               <a:rPr lang="en-US" smtClean="0"/>
               <a:t>‹#›</a:t>
             </a:fld>
-            <a:endParaRPr lang="en-US"/>
+            <a:endParaRPr lang="en-US" dirty="0"/>
           </a:p>
         </p:txBody>
       </p:sp>
@@ -1646,7 +1647,7 @@
               <a:rPr lang="en-US" smtClean="0"/>
               <a:t>7/24/2017</a:t>
             </a:fld>
-            <a:endParaRPr lang="en-US"/>
+            <a:endParaRPr lang="en-US" dirty="0"/>
           </a:p>
         </p:txBody>
       </p:sp>
@@ -1665,7 +1666,7 @@
           <a:bodyPr/>
           <a:lstStyle/>
           <a:p>
-            <a:endParaRPr lang="en-US"/>
+            <a:endParaRPr lang="en-US" dirty="0"/>
           </a:p>
         </p:txBody>
       </p:sp>
@@ -1688,7 +1689,7 @@
               <a:rPr lang="en-US" smtClean="0"/>
               <a:t>‹#›</a:t>
             </a:fld>
-            <a:endParaRPr lang="en-US"/>
+            <a:endParaRPr lang="en-US" dirty="0"/>
           </a:p>
         </p:txBody>
       </p:sp>
@@ -1814,7 +1815,7 @@
               <a:rPr lang="en-US" smtClean="0"/>
               <a:t>7/24/2017</a:t>
             </a:fld>
-            <a:endParaRPr lang="en-US"/>
+            <a:endParaRPr lang="en-US" dirty="0"/>
           </a:p>
         </p:txBody>
       </p:sp>
@@ -1833,7 +1834,7 @@
           <a:bodyPr/>
           <a:lstStyle/>
           <a:p>
-            <a:endParaRPr lang="en-US"/>
+            <a:endParaRPr lang="en-US" dirty="0"/>
           </a:p>
         </p:txBody>
       </p:sp>
@@ -1856,7 +1857,7 @@
               <a:rPr lang="en-US" smtClean="0"/>
               <a:t>‹#›</a:t>
             </a:fld>
-            <a:endParaRPr lang="en-US"/>
+            <a:endParaRPr lang="en-US" dirty="0"/>
           </a:p>
         </p:txBody>
       </p:sp>
@@ -2059,7 +2060,7 @@
               <a:rPr lang="en-US" smtClean="0"/>
               <a:t>7/24/2017</a:t>
             </a:fld>
-            <a:endParaRPr lang="en-US"/>
+            <a:endParaRPr lang="en-US" dirty="0"/>
           </a:p>
         </p:txBody>
       </p:sp>
@@ -2078,7 +2079,7 @@
           <a:bodyPr/>
           <a:lstStyle/>
           <a:p>
-            <a:endParaRPr lang="en-US"/>
+            <a:endParaRPr lang="en-US" dirty="0"/>
           </a:p>
         </p:txBody>
       </p:sp>
@@ -2101,7 +2102,7 @@
               <a:rPr lang="en-US" smtClean="0"/>
               <a:t>‹#›</a:t>
             </a:fld>
-            <a:endParaRPr lang="en-US"/>
+            <a:endParaRPr lang="en-US" dirty="0"/>
           </a:p>
         </p:txBody>
       </p:sp>
@@ -2288,7 +2289,7 @@
               <a:rPr lang="en-US" smtClean="0"/>
               <a:t>7/24/2017</a:t>
             </a:fld>
-            <a:endParaRPr lang="en-US"/>
+            <a:endParaRPr lang="en-US" dirty="0"/>
           </a:p>
         </p:txBody>
       </p:sp>
@@ -2307,7 +2308,7 @@
           <a:bodyPr/>
           <a:lstStyle/>
           <a:p>
-            <a:endParaRPr lang="en-US"/>
+            <a:endParaRPr lang="en-US" dirty="0"/>
           </a:p>
         </p:txBody>
       </p:sp>
@@ -2330,7 +2331,7 @@
               <a:rPr lang="en-US" smtClean="0"/>
               <a:t>‹#›</a:t>
             </a:fld>
-            <a:endParaRPr lang="en-US"/>
+            <a:endParaRPr lang="en-US" dirty="0"/>
           </a:p>
         </p:txBody>
       </p:sp>
@@ -2652,7 +2653,7 @@
               <a:rPr lang="en-US" smtClean="0"/>
               <a:t>7/24/2017</a:t>
             </a:fld>
-            <a:endParaRPr lang="en-US"/>
+            <a:endParaRPr lang="en-US" dirty="0"/>
           </a:p>
         </p:txBody>
       </p:sp>
@@ -2671,7 +2672,7 @@
           <a:bodyPr/>
           <a:lstStyle/>
           <a:p>
-            <a:endParaRPr lang="en-US"/>
+            <a:endParaRPr lang="en-US" dirty="0"/>
           </a:p>
         </p:txBody>
       </p:sp>
@@ -2694,7 +2695,7 @@
               <a:rPr lang="en-US" smtClean="0"/>
               <a:t>‹#›</a:t>
             </a:fld>
-            <a:endParaRPr lang="en-US"/>
+            <a:endParaRPr lang="en-US" dirty="0"/>
           </a:p>
         </p:txBody>
       </p:sp>
@@ -2769,7 +2770,7 @@
               <a:rPr lang="en-US" smtClean="0"/>
               <a:t>7/24/2017</a:t>
             </a:fld>
-            <a:endParaRPr lang="en-US"/>
+            <a:endParaRPr lang="en-US" dirty="0"/>
           </a:p>
         </p:txBody>
       </p:sp>
@@ -2788,7 +2789,7 @@
           <a:bodyPr/>
           <a:lstStyle/>
           <a:p>
-            <a:endParaRPr lang="en-US"/>
+            <a:endParaRPr lang="en-US" dirty="0"/>
           </a:p>
         </p:txBody>
       </p:sp>
@@ -2811,7 +2812,7 @@
               <a:rPr lang="en-US" smtClean="0"/>
               <a:t>‹#›</a:t>
             </a:fld>
-            <a:endParaRPr lang="en-US"/>
+            <a:endParaRPr lang="en-US" dirty="0"/>
           </a:p>
         </p:txBody>
       </p:sp>
@@ -2864,7 +2865,7 @@
               <a:rPr lang="en-US" smtClean="0"/>
               <a:t>7/24/2017</a:t>
             </a:fld>
-            <a:endParaRPr lang="en-US"/>
+            <a:endParaRPr lang="en-US" dirty="0"/>
           </a:p>
         </p:txBody>
       </p:sp>
@@ -2883,7 +2884,7 @@
           <a:bodyPr/>
           <a:lstStyle/>
           <a:p>
-            <a:endParaRPr lang="en-US"/>
+            <a:endParaRPr lang="en-US" dirty="0"/>
           </a:p>
         </p:txBody>
       </p:sp>
@@ -2906,7 +2907,7 @@
               <a:rPr lang="en-US" smtClean="0"/>
               <a:t>‹#›</a:t>
             </a:fld>
-            <a:endParaRPr lang="en-US"/>
+            <a:endParaRPr lang="en-US" dirty="0"/>
           </a:p>
         </p:txBody>
       </p:sp>
@@ -3139,7 +3140,7 @@
               <a:rPr lang="en-US" smtClean="0"/>
               <a:t>7/24/2017</a:t>
             </a:fld>
-            <a:endParaRPr lang="en-US"/>
+            <a:endParaRPr lang="en-US" dirty="0"/>
           </a:p>
         </p:txBody>
       </p:sp>
@@ -3158,7 +3159,7 @@
           <a:bodyPr/>
           <a:lstStyle/>
           <a:p>
-            <a:endParaRPr lang="en-US"/>
+            <a:endParaRPr lang="en-US" dirty="0"/>
           </a:p>
         </p:txBody>
       </p:sp>
@@ -3181,7 +3182,7 @@
               <a:rPr lang="en-US" smtClean="0"/>
               <a:t>‹#›</a:t>
             </a:fld>
-            <a:endParaRPr lang="en-US"/>
+            <a:endParaRPr lang="en-US" dirty="0"/>
           </a:p>
         </p:txBody>
       </p:sp>
@@ -3303,7 +3304,7 @@
             </a:lvl9pPr>
           </a:lstStyle>
           <a:p>
-            <a:endParaRPr lang="en-US"/>
+            <a:endParaRPr lang="en-US" dirty="0"/>
           </a:p>
         </p:txBody>
       </p:sp>
@@ -3391,7 +3392,7 @@
               <a:rPr lang="en-US" smtClean="0"/>
               <a:t>7/24/2017</a:t>
             </a:fld>
-            <a:endParaRPr lang="en-US"/>
+            <a:endParaRPr lang="en-US" dirty="0"/>
           </a:p>
         </p:txBody>
       </p:sp>
@@ -3410,7 +3411,7 @@
           <a:bodyPr/>
           <a:lstStyle/>
           <a:p>
-            <a:endParaRPr lang="en-US"/>
+            <a:endParaRPr lang="en-US" dirty="0"/>
           </a:p>
         </p:txBody>
       </p:sp>
@@ -3433,7 +3434,7 @@
               <a:rPr lang="en-US" smtClean="0"/>
               <a:t>‹#›</a:t>
             </a:fld>
-            <a:endParaRPr lang="en-US"/>
+            <a:endParaRPr lang="en-US" dirty="0"/>
           </a:p>
         </p:txBody>
       </p:sp>
@@ -3608,7 +3609,7 @@
               <a:rPr lang="en-US" smtClean="0"/>
               <a:t>7/24/2017</a:t>
             </a:fld>
-            <a:endParaRPr lang="en-US"/>
+            <a:endParaRPr lang="en-US" dirty="0"/>
           </a:p>
         </p:txBody>
       </p:sp>
@@ -3645,7 +3646,7 @@
             </a:lvl1pPr>
           </a:lstStyle>
           <a:p>
-            <a:endParaRPr lang="en-US"/>
+            <a:endParaRPr lang="en-US" dirty="0"/>
           </a:p>
         </p:txBody>
       </p:sp>
@@ -3686,7 +3687,7 @@
               <a:rPr lang="en-US" smtClean="0"/>
               <a:t>‹#›</a:t>
             </a:fld>
-            <a:endParaRPr lang="en-US"/>
+            <a:endParaRPr lang="en-US" dirty="0"/>
           </a:p>
         </p:txBody>
       </p:sp>
@@ -4039,7 +4040,7 @@
         </p:nvSpPr>
         <p:spPr>
           <a:xfrm>
-            <a:off x="6303005" y="5153891"/>
+            <a:off x="6228577" y="4948972"/>
             <a:ext cx="5774900" cy="830997"/>
           </a:xfrm>
           <a:prstGeom prst="rect">
@@ -4060,23 +4061,7 @@
                   <a:schemeClr val="bg1"/>
                 </a:solidFill>
               </a:rPr>
-              <a:t>Yogesh </a:t>
-            </a:r>
-            <a:r>
-              <a:rPr lang="en-US" sz="4800" dirty="0" err="1">
-                <a:solidFill>
-                  <a:schemeClr val="bg1"/>
-                </a:solidFill>
-              </a:rPr>
-              <a:t>Prem</a:t>
-            </a:r>
-            <a:r>
-              <a:rPr lang="en-US" sz="4800" dirty="0">
-                <a:solidFill>
-                  <a:schemeClr val="bg1"/>
-                </a:solidFill>
-              </a:rPr>
-              <a:t> Swami</a:t>
+              <a:t>Yogesh Prem Swami</a:t>
             </a:r>
           </a:p>
         </p:txBody>
@@ -4095,7 +4080,7 @@
         </p:nvSpPr>
         <p:spPr>
           <a:xfrm>
-            <a:off x="3281082" y="3546122"/>
+            <a:off x="3281082" y="3312206"/>
             <a:ext cx="8625678" cy="1754326"/>
           </a:xfrm>
           <a:prstGeom prst="rect">
@@ -4252,38 +4237,14 @@
             <a:pPr lvl="1"/>
             <a:r>
               <a:rPr lang="en-US" dirty="0"/>
-              <a:t>Enclave’s own identity (</a:t>
-            </a:r>
-            <a:r>
-              <a:rPr lang="en-US" dirty="0" err="1"/>
-              <a:t>mrenclave</a:t>
-            </a:r>
-            <a:r>
-              <a:rPr lang="en-US" dirty="0"/>
-              <a:t>, </a:t>
-            </a:r>
-            <a:r>
-              <a:rPr lang="en-US" dirty="0" err="1"/>
-              <a:t>mrsigner</a:t>
-            </a:r>
-            <a:r>
-              <a:rPr lang="en-US" dirty="0"/>
-              <a:t>, attributes)</a:t>
+              <a:t>Enclave’s own identity (mrenclave, mrsigner, attributes)</a:t>
             </a:r>
           </a:p>
           <a:p>
             <a:pPr lvl="1"/>
             <a:r>
               <a:rPr lang="en-US" dirty="0"/>
-              <a:t>Potentially </a:t>
-            </a:r>
-            <a:r>
-              <a:rPr lang="en-US" dirty="0" err="1"/>
-              <a:t>adversarially</a:t>
-            </a:r>
-            <a:r>
-              <a:rPr lang="en-US" dirty="0"/>
-              <a:t> selected 128-bit random  number</a:t>
+              <a:t>Potentially adversarial selected 128-bit random  number</a:t>
             </a:r>
           </a:p>
           <a:p>
@@ -4489,15 +4450,7 @@
           <a:p>
             <a:r>
               <a:rPr lang="en-US" dirty="0"/>
-              <a:t>Non-</a:t>
-            </a:r>
-            <a:r>
-              <a:rPr lang="en-US" dirty="0" err="1"/>
-              <a:t>Frameability</a:t>
-            </a:r>
-            <a:r>
-              <a:rPr lang="en-US" dirty="0"/>
-              <a:t> [</a:t>
+              <a:t>Non-Frameability [</a:t>
             </a:r>
             <a:r>
               <a:rPr lang="en-US" dirty="0">
@@ -4872,16 +4825,10 @@
               <a:t>Private-Key Base Revocation (</a:t>
             </a:r>
             <a:r>
-              <a:rPr lang="en-US" dirty="0" err="1">
-                <a:latin typeface="Inconsolata" panose="020B0609030003000000" pitchFamily="49" charset="0"/>
-              </a:rPr>
-              <a:t>Priv</a:t>
-            </a:r>
-            <a:r>
               <a:rPr lang="en-US" dirty="0">
                 <a:latin typeface="Inconsolata" panose="020B0609030003000000" pitchFamily="49" charset="0"/>
               </a:rPr>
-              <a:t>-RL</a:t>
+              <a:t>Priv-RL</a:t>
             </a:r>
             <a:r>
               <a:rPr lang="en-US" dirty="0"/>
@@ -4959,15 +4906,7 @@
             </a:r>
             <a:r>
               <a:rPr lang="en-US" dirty="0"/>
-              <a:t>(B can be fixed if user wants </a:t>
-            </a:r>
-            <a:r>
-              <a:rPr lang="en-US" dirty="0" err="1"/>
-              <a:t>linkability</a:t>
-            </a:r>
-            <a:r>
-              <a:rPr lang="en-US" dirty="0"/>
-              <a:t>)</a:t>
+              <a:t>(B can be fixed if user wants link-ability)</a:t>
             </a:r>
           </a:p>
           <a:p>
@@ -5055,28 +4994,22 @@
               <a:rPr lang="en-US" dirty="0">
                 <a:sym typeface="Symbol" panose="05050102010706020507" pitchFamily="18" charset="2"/>
               </a:rPr>
-              <a:t>&gt;, …, &lt;</a:t>
-            </a:r>
-            <a:r>
-              <a:rPr lang="en-US" dirty="0" err="1">
+              <a:t>&gt;, …, &lt;B</a:t>
+            </a:r>
+            <a:r>
+              <a:rPr lang="en-US" baseline="-25000" dirty="0">
                 <a:sym typeface="Symbol" panose="05050102010706020507" pitchFamily="18" charset="2"/>
               </a:rPr>
-              <a:t>B</a:t>
-            </a:r>
-            <a:r>
-              <a:rPr lang="en-US" baseline="-25000" dirty="0" err="1">
+              <a:t>n</a:t>
+            </a:r>
+            <a:r>
+              <a:rPr lang="en-US" dirty="0">
                 <a:sym typeface="Symbol" panose="05050102010706020507" pitchFamily="18" charset="2"/>
               </a:rPr>
-              <a:t>n</a:t>
-            </a:r>
-            <a:r>
-              <a:rPr lang="en-US" dirty="0" err="1">
-                <a:sym typeface="Symbol" panose="05050102010706020507" pitchFamily="18" charset="2"/>
-              </a:rPr>
               <a:t>,K</a:t>
             </a:r>
             <a:r>
-              <a:rPr lang="en-US" baseline="-25000" dirty="0" err="1">
+              <a:rPr lang="en-US" baseline="-25000" dirty="0">
                 <a:sym typeface="Symbol" panose="05050102010706020507" pitchFamily="18" charset="2"/>
               </a:rPr>
               <a:t>n</a:t>
@@ -5135,22 +5068,13 @@
               <a:t> </a:t>
             </a:r>
             <a:r>
-              <a:rPr lang="en-US" dirty="0" err="1">
+              <a:rPr lang="en-US" dirty="0">
                 <a:solidFill>
                   <a:srgbClr val="C00000"/>
                 </a:solidFill>
                 <a:sym typeface="Symbol" panose="05050102010706020507" pitchFamily="18" charset="2"/>
               </a:rPr>
               <a:t>K</a:t>
-            </a:r>
-            <a:r>
-              <a:rPr lang="en-US" baseline="-25000" dirty="0" err="1">
-                <a:solidFill>
-                  <a:srgbClr val="C00000"/>
-                </a:solidFill>
-                <a:sym typeface="Symbol" panose="05050102010706020507" pitchFamily="18" charset="2"/>
-              </a:rPr>
-              <a:t>j</a:t>
             </a:r>
             <a:r>
               <a:rPr lang="en-US" baseline="-25000" dirty="0">
@@ -5159,7 +5083,7 @@
                 </a:solidFill>
                 <a:sym typeface="Symbol" panose="05050102010706020507" pitchFamily="18" charset="2"/>
               </a:rPr>
-              <a:t> </a:t>
+              <a:t>j </a:t>
             </a:r>
             <a:r>
               <a:rPr lang="en-US" dirty="0">
@@ -5168,28 +5092,19 @@
                 </a:solidFill>
                 <a:sym typeface="Symbol" panose="05050102010706020507" pitchFamily="18" charset="2"/>
               </a:rPr>
-              <a:t> </a:t>
-            </a:r>
-            <a:r>
-              <a:rPr lang="en-US" dirty="0" err="1">
+              <a:t> B</a:t>
+            </a:r>
+            <a:r>
+              <a:rPr lang="en-US" baseline="-25000" dirty="0">
                 <a:solidFill>
                   <a:srgbClr val="C00000"/>
                 </a:solidFill>
                 <a:sym typeface="Symbol" panose="05050102010706020507" pitchFamily="18" charset="2"/>
               </a:rPr>
-              <a:t>B</a:t>
-            </a:r>
-            <a:r>
-              <a:rPr lang="en-US" baseline="-25000" dirty="0" err="1">
-                <a:solidFill>
-                  <a:srgbClr val="C00000"/>
-                </a:solidFill>
-                <a:sym typeface="Symbol" panose="05050102010706020507" pitchFamily="18" charset="2"/>
-              </a:rPr>
               <a:t>j</a:t>
             </a:r>
             <a:r>
-              <a:rPr lang="en-US" baseline="30000" dirty="0" err="1">
+              <a:rPr lang="en-US" baseline="30000" dirty="0">
                 <a:solidFill>
                   <a:srgbClr val="C00000"/>
                 </a:solidFill>
@@ -5386,7 +5301,7 @@
           <a:p>
             <a:pPr lvl="1"/>
             <a:r>
-              <a:rPr lang="en-US" dirty="0" err="1">
+              <a:rPr lang="en-US" dirty="0">
                 <a:solidFill>
                   <a:srgbClr val="C00000"/>
                 </a:solidFill>
@@ -5401,7 +5316,7 @@
           <a:p>
             <a:pPr lvl="1"/>
             <a:r>
-              <a:rPr lang="en-US" dirty="0" err="1">
+              <a:rPr lang="en-US" dirty="0">
                 <a:solidFill>
                   <a:srgbClr val="C00000"/>
                 </a:solidFill>
@@ -5436,7 +5351,7 @@
           <a:p>
             <a:pPr lvl="1"/>
             <a:r>
-              <a:rPr lang="en-US" dirty="0" err="1">
+              <a:rPr lang="en-US" dirty="0">
                 <a:latin typeface="Inconsolata" panose="020B0609030003000000" pitchFamily="49" charset="0"/>
               </a:rPr>
               <a:t>ppid</a:t>
@@ -5456,7 +5371,7 @@
               <a:t> </a:t>
             </a:r>
             <a:r>
-              <a:rPr lang="en-US" b="1" dirty="0" err="1"/>
+              <a:rPr lang="en-US" b="1" dirty="0"/>
               <a:t>cmac</a:t>
             </a:r>
             <a:r>
@@ -5464,7 +5379,7 @@
               <a:t>(</a:t>
             </a:r>
             <a:r>
-              <a:rPr lang="en-US" dirty="0" err="1">
+              <a:rPr lang="en-US" dirty="0">
                 <a:latin typeface="Inconsolata" panose="020B0609030003000000" pitchFamily="49" charset="0"/>
               </a:rPr>
               <a:t>provision_key</a:t>
@@ -5602,61 +5517,21 @@
           <a:p>
             <a:pPr lvl="1"/>
             <a:r>
-              <a:rPr lang="en-US" dirty="0" err="1"/>
-              <a:t>PvE</a:t>
-            </a:r>
-            <a:r>
-              <a:rPr lang="en-US" dirty="0"/>
-              <a:t>/</a:t>
-            </a:r>
-            <a:r>
-              <a:rPr lang="en-US" dirty="0" err="1"/>
-              <a:t>PcE</a:t>
-            </a:r>
-            <a:r>
-              <a:rPr lang="en-US" dirty="0"/>
-              <a:t> send OAEP encrypted PPID to IAS</a:t>
+              <a:rPr lang="en-US" dirty="0"/>
+              <a:t>PvE/PcE send OAEP encrypted PPID to IAS</a:t>
             </a:r>
           </a:p>
           <a:p>
             <a:pPr lvl="1"/>
             <a:r>
               <a:rPr lang="en-US" dirty="0"/>
-              <a:t>IAS responds with &lt;nonce, Signed EPID System </a:t>
-            </a:r>
-            <a:r>
-              <a:rPr lang="en-US" dirty="0" err="1"/>
-              <a:t>Params</a:t>
-            </a:r>
-            <a:r>
-              <a:rPr lang="en-US" dirty="0"/>
-              <a:t>&gt;</a:t>
-            </a:r>
-          </a:p>
-          <a:p>
-            <a:r>
-              <a:rPr lang="en-US" dirty="0" err="1"/>
-              <a:t>EpidJoin</a:t>
-            </a:r>
-            <a:r>
-              <a:rPr lang="en-US" dirty="0"/>
-              <a:t> (</a:t>
-            </a:r>
-            <a:r>
-              <a:rPr lang="en-US" dirty="0" err="1"/>
-              <a:t>PvE</a:t>
-            </a:r>
-            <a:r>
-              <a:rPr lang="en-US" dirty="0"/>
-              <a:t>/</a:t>
-            </a:r>
-            <a:r>
-              <a:rPr lang="en-US" dirty="0" err="1"/>
-              <a:t>PcE</a:t>
-            </a:r>
-            <a:r>
-              <a:rPr lang="en-US" dirty="0"/>
-              <a:t> action)</a:t>
+              <a:t>IAS responds with &lt;nonce, Signed EPID System Params&gt;</a:t>
+            </a:r>
+          </a:p>
+          <a:p>
+            <a:r>
+              <a:rPr lang="en-US" dirty="0"/>
+              <a:t>EpidJoin (PvE/PcE action)</a:t>
             </a:r>
           </a:p>
           <a:p>
@@ -5664,89 +5539,6 @@
             <a:r>
               <a:rPr lang="en-US" dirty="0"/>
               <a:t>Generate </a:t>
-            </a:r>
-            <a:r>
-              <a:rPr lang="en-US" dirty="0" err="1">
-                <a:solidFill>
-                  <a:srgbClr val="0070C0"/>
-                </a:solidFill>
-              </a:rPr>
-              <a:t>EpidPrivateKey</a:t>
-            </a:r>
-            <a:r>
-              <a:rPr lang="en-US" dirty="0"/>
-              <a:t> and </a:t>
-            </a:r>
-            <a:r>
-              <a:rPr lang="en-US" dirty="0" err="1">
-                <a:solidFill>
-                  <a:srgbClr val="0070C0"/>
-                </a:solidFill>
-              </a:rPr>
-              <a:t>EpidJoinRequest</a:t>
-            </a:r>
-            <a:r>
-              <a:rPr lang="en-US" dirty="0"/>
-              <a:t> with given nonce</a:t>
-            </a:r>
-          </a:p>
-          <a:p>
-            <a:pPr lvl="1"/>
-            <a:r>
-              <a:rPr lang="en-US" dirty="0"/>
-              <a:t>Encrypt </a:t>
-            </a:r>
-            <a:r>
-              <a:rPr lang="en-US" dirty="0" err="1">
-                <a:solidFill>
-                  <a:srgbClr val="0070C0"/>
-                </a:solidFill>
-              </a:rPr>
-              <a:t>EpidPrivateKey</a:t>
-            </a:r>
-            <a:r>
-              <a:rPr lang="en-US" dirty="0"/>
-              <a:t> with </a:t>
-            </a:r>
-            <a:r>
-              <a:rPr lang="en-US" dirty="0" err="1">
-                <a:solidFill>
-                  <a:srgbClr val="C00000"/>
-                </a:solidFill>
-              </a:rPr>
-              <a:t>ProvisioningSealKey</a:t>
-            </a:r>
-            <a:r>
-              <a:rPr lang="en-US" dirty="0"/>
-              <a:t> to create </a:t>
-            </a:r>
-            <a:r>
-              <a:rPr lang="en-US" dirty="0" err="1">
-                <a:solidFill>
-                  <a:srgbClr val="0070C0"/>
-                </a:solidFill>
-              </a:rPr>
-              <a:t>EpidKeyEscrow</a:t>
-            </a:r>
-            <a:endParaRPr lang="en-US" dirty="0">
-              <a:solidFill>
-                <a:srgbClr val="0070C0"/>
-              </a:solidFill>
-            </a:endParaRPr>
-          </a:p>
-          <a:p>
-            <a:pPr lvl="1"/>
-            <a:r>
-              <a:rPr lang="en-US" dirty="0"/>
-              <a:t>Encrypt </a:t>
-            </a:r>
-            <a:r>
-              <a:rPr lang="en-US" dirty="0" err="1">
-                <a:solidFill>
-                  <a:srgbClr val="0070C0"/>
-                </a:solidFill>
-              </a:rPr>
-              <a:t>EpidJoinRequest</a:t>
             </a:r>
             <a:r>
               <a:rPr lang="en-US" dirty="0">
@@ -5754,15 +5546,11 @@
                   <a:srgbClr val="0070C0"/>
                 </a:solidFill>
               </a:rPr>
-              <a:t> || </a:t>
-            </a:r>
-            <a:r>
-              <a:rPr lang="en-US" dirty="0" err="1">
-                <a:solidFill>
-                  <a:srgbClr val="0070C0"/>
-                </a:solidFill>
-              </a:rPr>
-              <a:t>EpidKeyEscrow</a:t>
+              <a:t>EpidPrivateKey</a:t>
+            </a:r>
+            <a:r>
+              <a:rPr lang="en-US" dirty="0"/>
+              <a:t> and </a:t>
             </a:r>
             <a:r>
               <a:rPr lang="en-US" dirty="0">
@@ -5770,11 +5558,18 @@
                   <a:srgbClr val="0070C0"/>
                 </a:solidFill>
               </a:rPr>
-              <a:t> </a:t>
-            </a:r>
-            <a:r>
-              <a:rPr lang="en-US" dirty="0"/>
-              <a:t>with</a:t>
+              <a:t>EpidJoinRequest</a:t>
+            </a:r>
+            <a:r>
+              <a:rPr lang="en-US" dirty="0"/>
+              <a:t> with given nonce</a:t>
+            </a:r>
+          </a:p>
+          <a:p>
+            <a:pPr lvl="1"/>
+            <a:r>
+              <a:rPr lang="en-US" dirty="0"/>
+              <a:t>Encrypt </a:t>
             </a:r>
             <a:r>
               <a:rPr lang="en-US" dirty="0">
@@ -5782,102 +5577,125 @@
                   <a:srgbClr val="0070C0"/>
                 </a:solidFill>
               </a:rPr>
-              <a:t> </a:t>
-            </a:r>
-            <a:r>
-              <a:rPr lang="en-US" dirty="0" err="1">
-                <a:solidFill>
-                  <a:srgbClr val="C00000"/>
-                </a:solidFill>
-              </a:rPr>
-              <a:t>ProvisioningKey</a:t>
-            </a:r>
-            <a:endParaRPr lang="en-US" dirty="0">
-              <a:solidFill>
-                <a:srgbClr val="C00000"/>
-              </a:solidFill>
-            </a:endParaRPr>
-          </a:p>
-          <a:p>
-            <a:pPr lvl="1"/>
-            <a:r>
-              <a:rPr lang="en-US" dirty="0"/>
-              <a:t>ECDSA sign encrypted blob with a key derived from </a:t>
-            </a:r>
-            <a:r>
-              <a:rPr lang="en-US" dirty="0" err="1">
-                <a:solidFill>
-                  <a:srgbClr val="C00000"/>
-                </a:solidFill>
-              </a:rPr>
-              <a:t>ProvisioningKey</a:t>
-            </a:r>
-            <a:endParaRPr lang="en-US" dirty="0">
-              <a:solidFill>
-                <a:srgbClr val="C00000"/>
-              </a:solidFill>
-            </a:endParaRPr>
-          </a:p>
-          <a:p>
-            <a:pPr lvl="1"/>
+              <a:t>EpidPrivateKey</a:t>
+            </a:r>
+            <a:r>
+              <a:rPr lang="en-US" dirty="0"/>
+              <a:t> with </a:t>
+            </a:r>
             <a:r>
               <a:rPr lang="en-US" dirty="0">
                 <a:solidFill>
                   <a:srgbClr val="C00000"/>
                 </a:solidFill>
               </a:rPr>
-              <a:t>Whole step skipped if platform already provisioned in past</a:t>
-            </a:r>
-          </a:p>
-          <a:p>
-            <a:r>
-              <a:rPr lang="en-US" dirty="0"/>
-              <a:t>Finalize (IAS action)</a:t>
+              <a:t>ProvisioningSealKey</a:t>
+            </a:r>
+            <a:r>
+              <a:rPr lang="en-US" dirty="0"/>
+              <a:t> to create </a:t>
+            </a:r>
+            <a:r>
+              <a:rPr lang="en-US" dirty="0">
+                <a:solidFill>
+                  <a:srgbClr val="0070C0"/>
+                </a:solidFill>
+              </a:rPr>
+              <a:t>EpidKeyEscrow</a:t>
             </a:r>
           </a:p>
           <a:p>
             <a:pPr lvl="1"/>
             <a:r>
               <a:rPr lang="en-US" dirty="0"/>
-              <a:t>Member certificate </a:t>
-            </a:r>
-            <a:r>
-              <a:rPr lang="en-US" dirty="0" err="1"/>
-              <a:t>encypted</a:t>
-            </a:r>
-            <a:r>
-              <a:rPr lang="en-US" dirty="0"/>
-              <a:t> with </a:t>
-            </a:r>
-            <a:r>
-              <a:rPr lang="en-US" dirty="0" err="1">
+              <a:t>Encrypt </a:t>
+            </a:r>
+            <a:r>
+              <a:rPr lang="en-US" dirty="0">
+                <a:solidFill>
+                  <a:srgbClr val="0070C0"/>
+                </a:solidFill>
+              </a:rPr>
+              <a:t>EpidJoinRequest || EpidKeyEscrow </a:t>
+            </a:r>
+            <a:r>
+              <a:rPr lang="en-US" dirty="0"/>
+              <a:t>with</a:t>
+            </a:r>
+            <a:r>
+              <a:rPr lang="en-US" dirty="0">
+                <a:solidFill>
+                  <a:srgbClr val="0070C0"/>
+                </a:solidFill>
+              </a:rPr>
+              <a:t> </a:t>
+            </a:r>
+            <a:r>
+              <a:rPr lang="en-US" dirty="0">
                 <a:solidFill>
                   <a:srgbClr val="C00000"/>
                 </a:solidFill>
               </a:rPr>
               <a:t>ProvisioningKey</a:t>
             </a:r>
-            <a:endParaRPr lang="en-US" dirty="0">
-              <a:solidFill>
-                <a:srgbClr val="C00000"/>
-              </a:solidFill>
-            </a:endParaRPr>
           </a:p>
           <a:p>
             <a:pPr lvl="1"/>
             <a:r>
-              <a:rPr lang="en-US" dirty="0" err="1">
+              <a:rPr lang="en-US" dirty="0"/>
+              <a:t>ECDSA sign encrypted blob with a key derived from </a:t>
+            </a:r>
+            <a:r>
+              <a:rPr lang="en-US" dirty="0">
+                <a:solidFill>
+                  <a:srgbClr val="C00000"/>
+                </a:solidFill>
+              </a:rPr>
+              <a:t>ProvisioningKey</a:t>
+            </a:r>
+          </a:p>
+          <a:p>
+            <a:pPr lvl="1"/>
+            <a:r>
+              <a:rPr lang="en-US" dirty="0">
+                <a:solidFill>
+                  <a:srgbClr val="C00000"/>
+                </a:solidFill>
+              </a:rPr>
+              <a:t>Whole step skipped if platform already provisioned in past</a:t>
+            </a:r>
+          </a:p>
+          <a:p>
+            <a:r>
+              <a:rPr lang="en-US" dirty="0"/>
+              <a:t>Finalize (IAS action)</a:t>
+            </a:r>
+          </a:p>
+          <a:p>
+            <a:pPr lvl="1"/>
+            <a:r>
+              <a:rPr lang="en-US" dirty="0"/>
+              <a:t>Member certificate encrypted with </a:t>
+            </a:r>
+            <a:r>
+              <a:rPr lang="en-US" dirty="0">
+                <a:solidFill>
+                  <a:srgbClr val="C00000"/>
+                </a:solidFill>
+              </a:rPr>
+              <a:t>ProvisioningKey</a:t>
+            </a:r>
+          </a:p>
+          <a:p>
+            <a:pPr lvl="1"/>
+            <a:r>
+              <a:rPr lang="en-US" dirty="0">
                 <a:solidFill>
                   <a:srgbClr val="0070C0"/>
                 </a:solidFill>
               </a:rPr>
               <a:t>EpidKeyEscrow</a:t>
             </a:r>
-            <a:endParaRPr lang="en-US" dirty="0">
-              <a:solidFill>
-                <a:srgbClr val="0070C0"/>
-              </a:solidFill>
-            </a:endParaRPr>
           </a:p>
           <a:p>
             <a:r>
@@ -5891,7 +5709,7 @@
               <a:t>Encrypting </a:t>
             </a:r>
             <a:r>
-              <a:rPr lang="en-US" dirty="0" err="1">
+              <a:rPr lang="en-US" dirty="0">
                 <a:solidFill>
                   <a:srgbClr val="0070C0"/>
                 </a:solidFill>
@@ -6158,12 +5976,14 @@
           </a:xfrm>
         </p:spPr>
         <p:txBody>
-          <a:bodyPr/>
+          <a:bodyPr>
+            <a:normAutofit/>
+          </a:bodyPr>
           <a:lstStyle/>
           <a:p>
             <a:r>
               <a:rPr lang="en-US" dirty="0"/>
-              <a:t>Allows source enclave to prove it’s identity is valid to any target enclave</a:t>
+              <a:t>Allows source enclave to prove that it’s identity is valid to any target enclave</a:t>
             </a:r>
           </a:p>
           <a:p>
@@ -6179,58 +5999,46 @@
               <a:t>EREPORT provides oracle access to target enclave’s </a:t>
             </a:r>
             <a:r>
-              <a:rPr lang="en-US" dirty="0" err="1">
+              <a:rPr lang="en-US" dirty="0">
                 <a:solidFill>
                   <a:srgbClr val="0070C0"/>
                 </a:solidFill>
               </a:rPr>
               <a:t>ReportKey</a:t>
             </a:r>
-            <a:endParaRPr lang="en-US" dirty="0">
-              <a:solidFill>
-                <a:srgbClr val="0070C0"/>
-              </a:solidFill>
-            </a:endParaRPr>
           </a:p>
           <a:p>
             <a:pPr lvl="1"/>
             <a:r>
-              <a:rPr lang="en-US" b="1" dirty="0" err="1">
+              <a:rPr lang="en-US" b="1" dirty="0">
+                <a:latin typeface="Inconsolata" panose="020B0609030003000000" pitchFamily="49" charset="0"/>
+              </a:rPr>
+              <a:t>cmac</a:t>
+            </a:r>
+            <a:r>
+              <a:rPr lang="en-US" dirty="0"/>
+              <a:t> over source enclave’s identity present in CPU (cannot be forged)</a:t>
+            </a:r>
+          </a:p>
+          <a:p>
+            <a:pPr lvl="1"/>
+            <a:r>
+              <a:rPr lang="en-US" dirty="0"/>
+              <a:t>Randomized by CR_REPORT_KEYID set at bootup time</a:t>
+            </a:r>
+          </a:p>
+          <a:p>
+            <a:r>
+              <a:rPr lang="en-US" dirty="0"/>
+              <a:t>Target enclave manually computes the CMAC using it’s own </a:t>
+            </a:r>
+            <a:r>
+              <a:rPr lang="en-US" dirty="0">
                 <a:solidFill>
                   <a:srgbClr val="0070C0"/>
                 </a:solidFill>
-                <a:latin typeface="Inconsolata" panose="020B0609030003000000" pitchFamily="49" charset="0"/>
-              </a:rPr>
-              <a:t>cmac</a:t>
-            </a:r>
-            <a:r>
-              <a:rPr lang="en-US" dirty="0"/>
-              <a:t> over source enclave’s identity present in CPU (cannot be forged)</a:t>
-            </a:r>
-          </a:p>
-          <a:p>
-            <a:pPr lvl="1"/>
-            <a:r>
-              <a:rPr lang="en-US" dirty="0"/>
-              <a:t>Randomized by CR_REPORT_KEYID set at bootup time</a:t>
-            </a:r>
-          </a:p>
-          <a:p>
-            <a:r>
-              <a:rPr lang="en-US" dirty="0"/>
-              <a:t>Target enclave manually computes the CMAC using it’s own </a:t>
-            </a:r>
-            <a:r>
-              <a:rPr lang="en-US" dirty="0" err="1">
-                <a:solidFill>
-                  <a:srgbClr val="0070C0"/>
-                </a:solidFill>
               </a:rPr>
               <a:t>ReportKey</a:t>
-            </a:r>
-            <a:r>
-              <a:rPr lang="en-US" dirty="0"/>
-              <a:t> </a:t>
             </a:r>
           </a:p>
         </p:txBody>
@@ -6343,12 +6151,7 @@
             <p:ph type="title"/>
           </p:nvPr>
         </p:nvSpPr>
-        <p:spPr>
-          <a:xfrm>
-            <a:off x="4476306" y="210952"/>
-            <a:ext cx="7276215" cy="1325563"/>
-          </a:xfrm>
-        </p:spPr>
+        <p:spPr/>
         <p:txBody>
           <a:bodyPr/>
           <a:lstStyle/>
@@ -6365,6 +6168,1084 @@
           </a:p>
         </p:txBody>
       </p:sp>
+      <p:sp>
+        <p:nvSpPr>
+          <p:cNvPr id="3" name="Content Placeholder 2">
+            <a:extLst>
+              <a:ext uri="{FF2B5EF4-FFF2-40B4-BE49-F238E27FC236}">
+                <a16:creationId xmlns:a16="http://schemas.microsoft.com/office/drawing/2014/main" id="{1B837BD0-A0D2-4D5F-8BDD-87A45FC39C3D}"/>
+              </a:ext>
+            </a:extLst>
+          </p:cNvPr>
+          <p:cNvSpPr>
+            <a:spLocks noGrp="1"/>
+          </p:cNvSpPr>
+          <p:nvPr>
+            <p:ph sz="half" idx="1"/>
+          </p:nvPr>
+        </p:nvSpPr>
+        <p:spPr>
+          <a:xfrm>
+            <a:off x="79559" y="1464762"/>
+            <a:ext cx="6010331" cy="5169953"/>
+          </a:xfrm>
+        </p:spPr>
+        <p:txBody>
+          <a:bodyPr>
+            <a:normAutofit/>
+          </a:bodyPr>
+          <a:lstStyle/>
+          <a:p>
+            <a:r>
+              <a:rPr lang="en-US" dirty="0"/>
+              <a:t>Service Provider (SP) and IAS establish </a:t>
+            </a:r>
+          </a:p>
+          <a:p>
+            <a:pPr lvl="1"/>
+            <a:r>
+              <a:rPr lang="en-US" dirty="0"/>
+              <a:t>SP Certificate + Service Provider ID (SPID)</a:t>
+            </a:r>
+          </a:p>
+          <a:p>
+            <a:r>
+              <a:rPr lang="en-US" dirty="0"/>
+              <a:t>Enclave creates local attestation for QE</a:t>
+            </a:r>
+          </a:p>
+          <a:p>
+            <a:pPr lvl="1"/>
+            <a:r>
+              <a:rPr lang="en-US" dirty="0"/>
+              <a:t>Optionally request QE to generate local attestation on Quote for Enclave</a:t>
+            </a:r>
+          </a:p>
+          <a:p>
+            <a:r>
+              <a:rPr lang="en-US" dirty="0"/>
+              <a:t>QE Creates encrypted EPID Quote </a:t>
+            </a:r>
+          </a:p>
+          <a:p>
+            <a:pPr lvl="1"/>
+            <a:r>
+              <a:rPr lang="en-US" dirty="0"/>
+              <a:t>Enclave validates QE’s local attestation on encrypted Quote</a:t>
+            </a:r>
+          </a:p>
+          <a:p>
+            <a:r>
+              <a:rPr lang="en-US" dirty="0"/>
+              <a:t>Enclave sends Encrypted Quote to SP</a:t>
+            </a:r>
+          </a:p>
+          <a:p>
+            <a:pPr lvl="1"/>
+            <a:r>
+              <a:rPr lang="en-US" dirty="0">
+                <a:solidFill>
+                  <a:srgbClr val="C00000"/>
+                </a:solidFill>
+              </a:rPr>
+              <a:t>SP cannot validate the quote itself even if it has access to Group Public Key</a:t>
+            </a:r>
+          </a:p>
+          <a:p>
+            <a:r>
+              <a:rPr lang="en-US" dirty="0"/>
+              <a:t>SP get Quote Validity YES/NO from IAS</a:t>
+            </a:r>
+          </a:p>
+        </p:txBody>
+      </p:sp>
+      <p:grpSp>
+        <p:nvGrpSpPr>
+          <p:cNvPr id="47" name="Group 46">
+            <a:extLst>
+              <a:ext uri="{FF2B5EF4-FFF2-40B4-BE49-F238E27FC236}">
+                <a16:creationId xmlns:a16="http://schemas.microsoft.com/office/drawing/2014/main" id="{79A73960-5EDB-461D-91A2-647D597A7803}"/>
+              </a:ext>
+            </a:extLst>
+          </p:cNvPr>
+          <p:cNvGrpSpPr/>
+          <p:nvPr/>
+        </p:nvGrpSpPr>
+        <p:grpSpPr>
+          <a:xfrm>
+            <a:off x="6314847" y="2256356"/>
+            <a:ext cx="5754969" cy="3199034"/>
+            <a:chOff x="6314847" y="2256356"/>
+            <a:chExt cx="5754969" cy="3199034"/>
+          </a:xfrm>
+        </p:grpSpPr>
+        <p:sp>
+          <p:nvSpPr>
+            <p:cNvPr id="25" name="TextBox 24">
+              <a:extLst>
+                <a:ext uri="{FF2B5EF4-FFF2-40B4-BE49-F238E27FC236}">
+                  <a16:creationId xmlns:a16="http://schemas.microsoft.com/office/drawing/2014/main" id="{4BA2E238-238B-4164-987B-97F4362CE2AF}"/>
+                </a:ext>
+              </a:extLst>
+            </p:cNvPr>
+            <p:cNvSpPr txBox="1"/>
+            <p:nvPr/>
+          </p:nvSpPr>
+          <p:spPr>
+            <a:xfrm>
+              <a:off x="6766829" y="2813438"/>
+              <a:ext cx="1607383" cy="646331"/>
+            </a:xfrm>
+            <a:prstGeom prst="rect">
+              <a:avLst/>
+            </a:prstGeom>
+            <a:noFill/>
+          </p:spPr>
+          <p:txBody>
+            <a:bodyPr wrap="square" rtlCol="0">
+              <a:spAutoFit/>
+            </a:bodyPr>
+            <a:lstStyle/>
+            <a:p>
+              <a:pPr algn="ctr"/>
+              <a:r>
+                <a:rPr lang="en-US" dirty="0"/>
+                <a:t>local_attest,</a:t>
+              </a:r>
+            </a:p>
+            <a:p>
+              <a:pPr algn="ctr"/>
+              <a:r>
+                <a:rPr lang="en-US" dirty="0">
+                  <a:solidFill>
+                    <a:srgbClr val="C00000"/>
+                  </a:solidFill>
+                </a:rPr>
+                <a:t>SPID</a:t>
+              </a:r>
+              <a:r>
+                <a:rPr lang="en-US" dirty="0"/>
+                <a:t>, nonce</a:t>
+              </a:r>
+            </a:p>
+          </p:txBody>
+        </p:sp>
+        <p:sp>
+          <p:nvSpPr>
+            <p:cNvPr id="10" name="Rectangle 9">
+              <a:extLst>
+                <a:ext uri="{FF2B5EF4-FFF2-40B4-BE49-F238E27FC236}">
+                  <a16:creationId xmlns:a16="http://schemas.microsoft.com/office/drawing/2014/main" id="{970F7A69-7523-456B-976F-E6C21A03D34D}"/>
+                </a:ext>
+              </a:extLst>
+            </p:cNvPr>
+            <p:cNvSpPr/>
+            <p:nvPr/>
+          </p:nvSpPr>
+          <p:spPr>
+            <a:xfrm>
+              <a:off x="11139467" y="2443957"/>
+              <a:ext cx="930349" cy="271130"/>
+            </a:xfrm>
+            <a:prstGeom prst="rect">
+              <a:avLst/>
+            </a:prstGeom>
+            <a:solidFill>
+              <a:schemeClr val="tx1"/>
+            </a:solidFill>
+            <a:ln>
+              <a:solidFill>
+                <a:schemeClr val="tx1"/>
+              </a:solidFill>
+            </a:ln>
+          </p:spPr>
+          <p:style>
+            <a:lnRef idx="2">
+              <a:schemeClr val="accent1">
+                <a:shade val="50000"/>
+              </a:schemeClr>
+            </a:lnRef>
+            <a:fillRef idx="1">
+              <a:schemeClr val="accent1"/>
+            </a:fillRef>
+            <a:effectRef idx="0">
+              <a:schemeClr val="accent1"/>
+            </a:effectRef>
+            <a:fontRef idx="minor">
+              <a:schemeClr val="lt1"/>
+            </a:fontRef>
+          </p:style>
+          <p:txBody>
+            <a:bodyPr rtlCol="0" anchor="ctr"/>
+            <a:lstStyle/>
+            <a:p>
+              <a:pPr algn="ctr"/>
+              <a:r>
+                <a:rPr lang="en-US" dirty="0"/>
+                <a:t>IAS</a:t>
+              </a:r>
+            </a:p>
+          </p:txBody>
+        </p:sp>
+        <p:sp>
+          <p:nvSpPr>
+            <p:cNvPr id="11" name="Rectangle 10">
+              <a:extLst>
+                <a:ext uri="{FF2B5EF4-FFF2-40B4-BE49-F238E27FC236}">
+                  <a16:creationId xmlns:a16="http://schemas.microsoft.com/office/drawing/2014/main" id="{279DAC9D-CD73-431A-AF72-E5F2E4D024E7}"/>
+                </a:ext>
+              </a:extLst>
+            </p:cNvPr>
+            <p:cNvSpPr/>
+            <p:nvPr/>
+          </p:nvSpPr>
+          <p:spPr>
+            <a:xfrm>
+              <a:off x="9526863" y="2443957"/>
+              <a:ext cx="930349" cy="271130"/>
+            </a:xfrm>
+            <a:prstGeom prst="rect">
+              <a:avLst/>
+            </a:prstGeom>
+            <a:solidFill>
+              <a:schemeClr val="tx1"/>
+            </a:solidFill>
+            <a:ln>
+              <a:solidFill>
+                <a:schemeClr val="tx1"/>
+              </a:solidFill>
+            </a:ln>
+          </p:spPr>
+          <p:style>
+            <a:lnRef idx="2">
+              <a:schemeClr val="accent1">
+                <a:shade val="50000"/>
+              </a:schemeClr>
+            </a:lnRef>
+            <a:fillRef idx="1">
+              <a:schemeClr val="accent1"/>
+            </a:fillRef>
+            <a:effectRef idx="0">
+              <a:schemeClr val="accent1"/>
+            </a:effectRef>
+            <a:fontRef idx="minor">
+              <a:schemeClr val="lt1"/>
+            </a:fontRef>
+          </p:style>
+          <p:txBody>
+            <a:bodyPr rtlCol="0" anchor="ctr"/>
+            <a:lstStyle/>
+            <a:p>
+              <a:pPr algn="ctr"/>
+              <a:r>
+                <a:rPr lang="en-US" dirty="0"/>
+                <a:t>SP</a:t>
+              </a:r>
+            </a:p>
+          </p:txBody>
+        </p:sp>
+        <p:sp>
+          <p:nvSpPr>
+            <p:cNvPr id="12" name="Rectangle 11">
+              <a:extLst>
+                <a:ext uri="{FF2B5EF4-FFF2-40B4-BE49-F238E27FC236}">
+                  <a16:creationId xmlns:a16="http://schemas.microsoft.com/office/drawing/2014/main" id="{6FF79065-A792-4615-BCFE-A9C0EC9C6447}"/>
+                </a:ext>
+              </a:extLst>
+            </p:cNvPr>
+            <p:cNvSpPr/>
+            <p:nvPr/>
+          </p:nvSpPr>
+          <p:spPr>
+            <a:xfrm>
+              <a:off x="7919481" y="2428119"/>
+              <a:ext cx="930349" cy="271130"/>
+            </a:xfrm>
+            <a:prstGeom prst="rect">
+              <a:avLst/>
+            </a:prstGeom>
+            <a:solidFill>
+              <a:schemeClr val="tx1"/>
+            </a:solidFill>
+            <a:ln>
+              <a:solidFill>
+                <a:schemeClr val="tx1"/>
+              </a:solidFill>
+            </a:ln>
+          </p:spPr>
+          <p:style>
+            <a:lnRef idx="2">
+              <a:schemeClr val="accent1">
+                <a:shade val="50000"/>
+              </a:schemeClr>
+            </a:lnRef>
+            <a:fillRef idx="1">
+              <a:schemeClr val="accent1"/>
+            </a:fillRef>
+            <a:effectRef idx="0">
+              <a:schemeClr val="accent1"/>
+            </a:effectRef>
+            <a:fontRef idx="minor">
+              <a:schemeClr val="lt1"/>
+            </a:fontRef>
+          </p:style>
+          <p:txBody>
+            <a:bodyPr rtlCol="0" anchor="ctr"/>
+            <a:lstStyle/>
+            <a:p>
+              <a:pPr algn="ctr"/>
+              <a:r>
+                <a:rPr lang="en-US" dirty="0"/>
+                <a:t>Enclave</a:t>
+              </a:r>
+            </a:p>
+          </p:txBody>
+        </p:sp>
+        <p:cxnSp>
+          <p:nvCxnSpPr>
+            <p:cNvPr id="9" name="Straight Connector 8">
+              <a:extLst>
+                <a:ext uri="{FF2B5EF4-FFF2-40B4-BE49-F238E27FC236}">
+                  <a16:creationId xmlns:a16="http://schemas.microsoft.com/office/drawing/2014/main" id="{D1BD5A4D-C800-4610-A8E8-1DF470E1A1D2}"/>
+                </a:ext>
+              </a:extLst>
+            </p:cNvPr>
+            <p:cNvCxnSpPr>
+              <a:cxnSpLocks/>
+            </p:cNvCxnSpPr>
+            <p:nvPr/>
+          </p:nvCxnSpPr>
+          <p:spPr>
+            <a:xfrm>
+              <a:off x="6766830" y="2692823"/>
+              <a:ext cx="13191" cy="2724465"/>
+            </a:xfrm>
+            <a:prstGeom prst="line">
+              <a:avLst/>
+            </a:prstGeom>
+            <a:ln w="25400">
+              <a:solidFill>
+                <a:schemeClr val="tx1"/>
+              </a:solidFill>
+            </a:ln>
+          </p:spPr>
+          <p:style>
+            <a:lnRef idx="1">
+              <a:schemeClr val="accent1"/>
+            </a:lnRef>
+            <a:fillRef idx="0">
+              <a:schemeClr val="accent1"/>
+            </a:fillRef>
+            <a:effectRef idx="0">
+              <a:schemeClr val="accent1"/>
+            </a:effectRef>
+            <a:fontRef idx="minor">
+              <a:schemeClr val="tx1"/>
+            </a:fontRef>
+          </p:style>
+        </p:cxnSp>
+        <p:sp>
+          <p:nvSpPr>
+            <p:cNvPr id="13" name="Rectangle 12">
+              <a:extLst>
+                <a:ext uri="{FF2B5EF4-FFF2-40B4-BE49-F238E27FC236}">
+                  <a16:creationId xmlns:a16="http://schemas.microsoft.com/office/drawing/2014/main" id="{B12E4FDB-2401-40FD-AD2A-7CDA252D4614}"/>
+                </a:ext>
+              </a:extLst>
+            </p:cNvPr>
+            <p:cNvSpPr/>
+            <p:nvPr/>
+          </p:nvSpPr>
+          <p:spPr>
+            <a:xfrm>
+              <a:off x="6314847" y="2428119"/>
+              <a:ext cx="930349" cy="271130"/>
+            </a:xfrm>
+            <a:prstGeom prst="rect">
+              <a:avLst/>
+            </a:prstGeom>
+            <a:solidFill>
+              <a:schemeClr val="tx1"/>
+            </a:solidFill>
+            <a:ln>
+              <a:solidFill>
+                <a:schemeClr val="tx1"/>
+              </a:solidFill>
+            </a:ln>
+          </p:spPr>
+          <p:style>
+            <a:lnRef idx="2">
+              <a:schemeClr val="accent1">
+                <a:shade val="50000"/>
+              </a:schemeClr>
+            </a:lnRef>
+            <a:fillRef idx="1">
+              <a:schemeClr val="accent1"/>
+            </a:fillRef>
+            <a:effectRef idx="0">
+              <a:schemeClr val="accent1"/>
+            </a:effectRef>
+            <a:fontRef idx="minor">
+              <a:schemeClr val="lt1"/>
+            </a:fontRef>
+          </p:style>
+          <p:txBody>
+            <a:bodyPr rtlCol="0" anchor="ctr"/>
+            <a:lstStyle/>
+            <a:p>
+              <a:pPr algn="ctr"/>
+              <a:r>
+                <a:rPr lang="en-US" dirty="0"/>
+                <a:t>QE</a:t>
+              </a:r>
+            </a:p>
+          </p:txBody>
+        </p:sp>
+        <p:cxnSp>
+          <p:nvCxnSpPr>
+            <p:cNvPr id="19" name="Straight Arrow Connector 18">
+              <a:extLst>
+                <a:ext uri="{FF2B5EF4-FFF2-40B4-BE49-F238E27FC236}">
+                  <a16:creationId xmlns:a16="http://schemas.microsoft.com/office/drawing/2014/main" id="{5BCA4171-476F-4B47-8906-CA53C345EF06}"/>
+                </a:ext>
+              </a:extLst>
+            </p:cNvPr>
+            <p:cNvCxnSpPr>
+              <a:cxnSpLocks/>
+              <a:stCxn id="11" idx="3"/>
+              <a:endCxn id="10" idx="1"/>
+            </p:cNvCxnSpPr>
+            <p:nvPr/>
+          </p:nvCxnSpPr>
+          <p:spPr>
+            <a:xfrm>
+              <a:off x="10457212" y="2579522"/>
+              <a:ext cx="682255" cy="0"/>
+            </a:xfrm>
+            <a:prstGeom prst="straightConnector1">
+              <a:avLst/>
+            </a:prstGeom>
+            <a:ln w="25400">
+              <a:solidFill>
+                <a:srgbClr val="00B050"/>
+              </a:solidFill>
+              <a:headEnd type="oval" w="lg" len="lg"/>
+              <a:tailEnd type="oval" w="lg" len="lg"/>
+            </a:ln>
+          </p:spPr>
+          <p:style>
+            <a:lnRef idx="1">
+              <a:schemeClr val="accent1"/>
+            </a:lnRef>
+            <a:fillRef idx="0">
+              <a:schemeClr val="accent1"/>
+            </a:fillRef>
+            <a:effectRef idx="0">
+              <a:schemeClr val="accent1"/>
+            </a:effectRef>
+            <a:fontRef idx="minor">
+              <a:schemeClr val="tx1"/>
+            </a:fontRef>
+          </p:style>
+        </p:cxnSp>
+        <p:sp>
+          <p:nvSpPr>
+            <p:cNvPr id="22" name="TextBox 21">
+              <a:extLst>
+                <a:ext uri="{FF2B5EF4-FFF2-40B4-BE49-F238E27FC236}">
+                  <a16:creationId xmlns:a16="http://schemas.microsoft.com/office/drawing/2014/main" id="{CE072DE2-6E66-4AEA-AA5B-47F0D109EC4E}"/>
+                </a:ext>
+              </a:extLst>
+            </p:cNvPr>
+            <p:cNvSpPr txBox="1"/>
+            <p:nvPr/>
+          </p:nvSpPr>
+          <p:spPr>
+            <a:xfrm>
+              <a:off x="10318197" y="2256356"/>
+              <a:ext cx="897655" cy="646331"/>
+            </a:xfrm>
+            <a:prstGeom prst="rect">
+              <a:avLst/>
+            </a:prstGeom>
+            <a:noFill/>
+          </p:spPr>
+          <p:txBody>
+            <a:bodyPr wrap="square" rtlCol="0">
+              <a:spAutoFit/>
+            </a:bodyPr>
+            <a:lstStyle/>
+            <a:p>
+              <a:pPr algn="ctr"/>
+              <a:r>
+                <a:rPr lang="en-US" dirty="0"/>
+                <a:t>Cert</a:t>
+              </a:r>
+            </a:p>
+            <a:p>
+              <a:pPr algn="ctr"/>
+              <a:r>
+                <a:rPr lang="en-US" dirty="0"/>
+                <a:t>SPID</a:t>
+              </a:r>
+            </a:p>
+          </p:txBody>
+        </p:sp>
+        <p:cxnSp>
+          <p:nvCxnSpPr>
+            <p:cNvPr id="24" name="Straight Arrow Connector 23">
+              <a:extLst>
+                <a:ext uri="{FF2B5EF4-FFF2-40B4-BE49-F238E27FC236}">
+                  <a16:creationId xmlns:a16="http://schemas.microsoft.com/office/drawing/2014/main" id="{458BABAF-4080-4F92-8A7D-62A9FE4F55A1}"/>
+                </a:ext>
+              </a:extLst>
+            </p:cNvPr>
+            <p:cNvCxnSpPr/>
+            <p:nvPr/>
+          </p:nvCxnSpPr>
+          <p:spPr>
+            <a:xfrm flipH="1">
+              <a:off x="6766830" y="3136604"/>
+              <a:ext cx="1612604" cy="0"/>
+            </a:xfrm>
+            <a:prstGeom prst="straightConnector1">
+              <a:avLst/>
+            </a:prstGeom>
+            <a:ln w="25400">
+              <a:solidFill>
+                <a:schemeClr val="tx1"/>
+              </a:solidFill>
+              <a:tailEnd type="triangle" w="lg" len="lg"/>
+            </a:ln>
+          </p:spPr>
+          <p:style>
+            <a:lnRef idx="1">
+              <a:schemeClr val="accent1"/>
+            </a:lnRef>
+            <a:fillRef idx="0">
+              <a:schemeClr val="accent1"/>
+            </a:fillRef>
+            <a:effectRef idx="0">
+              <a:schemeClr val="accent1"/>
+            </a:effectRef>
+            <a:fontRef idx="minor">
+              <a:schemeClr val="tx1"/>
+            </a:fontRef>
+          </p:style>
+        </p:cxnSp>
+        <p:sp>
+          <p:nvSpPr>
+            <p:cNvPr id="26" name="TextBox 25">
+              <a:extLst>
+                <a:ext uri="{FF2B5EF4-FFF2-40B4-BE49-F238E27FC236}">
+                  <a16:creationId xmlns:a16="http://schemas.microsoft.com/office/drawing/2014/main" id="{BAA464DF-474F-4D2E-9253-4A2F08B68A74}"/>
+                </a:ext>
+              </a:extLst>
+            </p:cNvPr>
+            <p:cNvSpPr txBox="1"/>
+            <p:nvPr/>
+          </p:nvSpPr>
+          <p:spPr>
+            <a:xfrm>
+              <a:off x="6761609" y="3533970"/>
+              <a:ext cx="1607383" cy="646331"/>
+            </a:xfrm>
+            <a:prstGeom prst="rect">
+              <a:avLst/>
+            </a:prstGeom>
+            <a:noFill/>
+          </p:spPr>
+          <p:txBody>
+            <a:bodyPr wrap="square" rtlCol="0">
+              <a:spAutoFit/>
+            </a:bodyPr>
+            <a:lstStyle/>
+            <a:p>
+              <a:pPr algn="ctr"/>
+              <a:r>
+                <a:rPr lang="en-US" dirty="0">
+                  <a:solidFill>
+                    <a:srgbClr val="C00000"/>
+                  </a:solidFill>
+                </a:rPr>
+                <a:t>enc(epid_sig)</a:t>
+              </a:r>
+              <a:r>
+                <a:rPr lang="en-US" dirty="0"/>
+                <a:t>,</a:t>
+              </a:r>
+            </a:p>
+            <a:p>
+              <a:pPr algn="ctr"/>
+              <a:r>
+                <a:rPr lang="en-US" dirty="0"/>
+                <a:t>local_attest</a:t>
+              </a:r>
+            </a:p>
+          </p:txBody>
+        </p:sp>
+        <p:cxnSp>
+          <p:nvCxnSpPr>
+            <p:cNvPr id="27" name="Straight Arrow Connector 26">
+              <a:extLst>
+                <a:ext uri="{FF2B5EF4-FFF2-40B4-BE49-F238E27FC236}">
+                  <a16:creationId xmlns:a16="http://schemas.microsoft.com/office/drawing/2014/main" id="{34E87675-EA10-47F3-AE50-6A4EE7CE2BC0}"/>
+                </a:ext>
+              </a:extLst>
+            </p:cNvPr>
+            <p:cNvCxnSpPr/>
+            <p:nvPr/>
+          </p:nvCxnSpPr>
+          <p:spPr>
+            <a:xfrm flipH="1">
+              <a:off x="6756388" y="3863162"/>
+              <a:ext cx="1612604" cy="0"/>
+            </a:xfrm>
+            <a:prstGeom prst="straightConnector1">
+              <a:avLst/>
+            </a:prstGeom>
+            <a:ln w="25400">
+              <a:solidFill>
+                <a:schemeClr val="tx1"/>
+              </a:solidFill>
+              <a:headEnd type="triangle" w="lg" len="lg"/>
+              <a:tailEnd type="none" w="lg" len="lg"/>
+            </a:ln>
+          </p:spPr>
+          <p:style>
+            <a:lnRef idx="1">
+              <a:schemeClr val="accent1"/>
+            </a:lnRef>
+            <a:fillRef idx="0">
+              <a:schemeClr val="accent1"/>
+            </a:fillRef>
+            <a:effectRef idx="0">
+              <a:schemeClr val="accent1"/>
+            </a:effectRef>
+            <a:fontRef idx="minor">
+              <a:schemeClr val="tx1"/>
+            </a:fontRef>
+          </p:style>
+        </p:cxnSp>
+        <p:grpSp>
+          <p:nvGrpSpPr>
+            <p:cNvPr id="32" name="Group 31">
+              <a:extLst>
+                <a:ext uri="{FF2B5EF4-FFF2-40B4-BE49-F238E27FC236}">
+                  <a16:creationId xmlns:a16="http://schemas.microsoft.com/office/drawing/2014/main" id="{8D4FD25E-2C1E-4E76-BCA6-AF05976EEDDA}"/>
+                </a:ext>
+              </a:extLst>
+            </p:cNvPr>
+            <p:cNvGrpSpPr/>
+            <p:nvPr/>
+          </p:nvGrpSpPr>
+          <p:grpSpPr>
+            <a:xfrm>
+              <a:off x="8368992" y="3673969"/>
+              <a:ext cx="1628268" cy="373494"/>
+              <a:chOff x="8374308" y="3285877"/>
+              <a:chExt cx="1628268" cy="373494"/>
+            </a:xfrm>
+          </p:grpSpPr>
+          <p:sp>
+            <p:nvSpPr>
+              <p:cNvPr id="29" name="TextBox 28">
+                <a:extLst>
+                  <a:ext uri="{FF2B5EF4-FFF2-40B4-BE49-F238E27FC236}">
+                    <a16:creationId xmlns:a16="http://schemas.microsoft.com/office/drawing/2014/main" id="{E6CF063C-F950-49D6-94BB-1267757868A4}"/>
+                  </a:ext>
+                </a:extLst>
+              </p:cNvPr>
+              <p:cNvSpPr txBox="1"/>
+              <p:nvPr/>
+            </p:nvSpPr>
+            <p:spPr>
+              <a:xfrm>
+                <a:off x="8395193" y="3285877"/>
+                <a:ext cx="1607383" cy="369332"/>
+              </a:xfrm>
+              <a:prstGeom prst="rect">
+                <a:avLst/>
+              </a:prstGeom>
+              <a:noFill/>
+            </p:spPr>
+            <p:txBody>
+              <a:bodyPr wrap="square" rtlCol="0">
+                <a:spAutoFit/>
+              </a:bodyPr>
+              <a:lstStyle/>
+              <a:p>
+                <a:pPr algn="ctr"/>
+                <a:r>
+                  <a:rPr lang="en-US" dirty="0">
+                    <a:solidFill>
+                      <a:srgbClr val="C00000"/>
+                    </a:solidFill>
+                  </a:rPr>
+                  <a:t>enc(epid_sig)</a:t>
+                </a:r>
+                <a:endParaRPr lang="en-US" dirty="0"/>
+              </a:p>
+            </p:txBody>
+          </p:sp>
+          <p:cxnSp>
+            <p:nvCxnSpPr>
+              <p:cNvPr id="28" name="Straight Arrow Connector 27">
+                <a:extLst>
+                  <a:ext uri="{FF2B5EF4-FFF2-40B4-BE49-F238E27FC236}">
+                    <a16:creationId xmlns:a16="http://schemas.microsoft.com/office/drawing/2014/main" id="{E68C7765-0BFE-4425-899D-14C0B43EAB33}"/>
+                  </a:ext>
+                </a:extLst>
+              </p:cNvPr>
+              <p:cNvCxnSpPr/>
+              <p:nvPr/>
+            </p:nvCxnSpPr>
+            <p:spPr>
+              <a:xfrm flipH="1">
+                <a:off x="8374308" y="3659371"/>
+                <a:ext cx="1612604" cy="0"/>
+              </a:xfrm>
+              <a:prstGeom prst="straightConnector1">
+                <a:avLst/>
+              </a:prstGeom>
+              <a:ln w="25400">
+                <a:solidFill>
+                  <a:schemeClr val="tx1"/>
+                </a:solidFill>
+                <a:headEnd type="triangle" w="lg" len="lg"/>
+                <a:tailEnd type="none" w="lg" len="lg"/>
+              </a:ln>
+            </p:spPr>
+            <p:style>
+              <a:lnRef idx="1">
+                <a:schemeClr val="accent1"/>
+              </a:lnRef>
+              <a:fillRef idx="0">
+                <a:schemeClr val="accent1"/>
+              </a:fillRef>
+              <a:effectRef idx="0">
+                <a:schemeClr val="accent1"/>
+              </a:effectRef>
+              <a:fontRef idx="minor">
+                <a:schemeClr val="tx1"/>
+              </a:fontRef>
+            </p:style>
+          </p:cxnSp>
+        </p:grpSp>
+        <p:grpSp>
+          <p:nvGrpSpPr>
+            <p:cNvPr id="34" name="Group 33">
+              <a:extLst>
+                <a:ext uri="{FF2B5EF4-FFF2-40B4-BE49-F238E27FC236}">
+                  <a16:creationId xmlns:a16="http://schemas.microsoft.com/office/drawing/2014/main" id="{C61CE775-472F-46CF-96B1-697AB01A3AFE}"/>
+                </a:ext>
+              </a:extLst>
+            </p:cNvPr>
+            <p:cNvGrpSpPr/>
+            <p:nvPr/>
+          </p:nvGrpSpPr>
+          <p:grpSpPr>
+            <a:xfrm>
+              <a:off x="9997260" y="3826365"/>
+              <a:ext cx="1628268" cy="373494"/>
+              <a:chOff x="8374308" y="3285877"/>
+              <a:chExt cx="1628268" cy="373494"/>
+            </a:xfrm>
+          </p:grpSpPr>
+          <p:sp>
+            <p:nvSpPr>
+              <p:cNvPr id="35" name="TextBox 34">
+                <a:extLst>
+                  <a:ext uri="{FF2B5EF4-FFF2-40B4-BE49-F238E27FC236}">
+                    <a16:creationId xmlns:a16="http://schemas.microsoft.com/office/drawing/2014/main" id="{4573808F-C12A-4AD0-B43D-06A9138C7FCE}"/>
+                  </a:ext>
+                </a:extLst>
+              </p:cNvPr>
+              <p:cNvSpPr txBox="1"/>
+              <p:nvPr/>
+            </p:nvSpPr>
+            <p:spPr>
+              <a:xfrm>
+                <a:off x="8395193" y="3285877"/>
+                <a:ext cx="1607383" cy="369332"/>
+              </a:xfrm>
+              <a:prstGeom prst="rect">
+                <a:avLst/>
+              </a:prstGeom>
+              <a:noFill/>
+            </p:spPr>
+            <p:txBody>
+              <a:bodyPr wrap="square" rtlCol="0">
+                <a:spAutoFit/>
+              </a:bodyPr>
+              <a:lstStyle/>
+              <a:p>
+                <a:pPr algn="ctr"/>
+                <a:r>
+                  <a:rPr lang="en-US" dirty="0">
+                    <a:solidFill>
+                      <a:srgbClr val="C00000"/>
+                    </a:solidFill>
+                  </a:rPr>
+                  <a:t>enc(epid_sig)</a:t>
+                </a:r>
+                <a:endParaRPr lang="en-US" dirty="0"/>
+              </a:p>
+            </p:txBody>
+          </p:sp>
+          <p:cxnSp>
+            <p:nvCxnSpPr>
+              <p:cNvPr id="36" name="Straight Arrow Connector 35">
+                <a:extLst>
+                  <a:ext uri="{FF2B5EF4-FFF2-40B4-BE49-F238E27FC236}">
+                    <a16:creationId xmlns:a16="http://schemas.microsoft.com/office/drawing/2014/main" id="{AB559F25-5310-4388-9FE6-58BC12C624CF}"/>
+                  </a:ext>
+                </a:extLst>
+              </p:cNvPr>
+              <p:cNvCxnSpPr/>
+              <p:nvPr/>
+            </p:nvCxnSpPr>
+            <p:spPr>
+              <a:xfrm flipH="1">
+                <a:off x="8374308" y="3659371"/>
+                <a:ext cx="1612604" cy="0"/>
+              </a:xfrm>
+              <a:prstGeom prst="straightConnector1">
+                <a:avLst/>
+              </a:prstGeom>
+              <a:ln w="25400">
+                <a:solidFill>
+                  <a:schemeClr val="tx1"/>
+                </a:solidFill>
+                <a:headEnd type="triangle" w="lg" len="lg"/>
+                <a:tailEnd type="none" w="lg" len="lg"/>
+              </a:ln>
+            </p:spPr>
+            <p:style>
+              <a:lnRef idx="1">
+                <a:schemeClr val="accent1"/>
+              </a:lnRef>
+              <a:fillRef idx="0">
+                <a:schemeClr val="accent1"/>
+              </a:fillRef>
+              <a:effectRef idx="0">
+                <a:schemeClr val="accent1"/>
+              </a:effectRef>
+              <a:fontRef idx="minor">
+                <a:schemeClr val="tx1"/>
+              </a:fontRef>
+            </p:style>
+          </p:cxnSp>
+        </p:grpSp>
+        <p:sp>
+          <p:nvSpPr>
+            <p:cNvPr id="39" name="TextBox 38">
+              <a:extLst>
+                <a:ext uri="{FF2B5EF4-FFF2-40B4-BE49-F238E27FC236}">
+                  <a16:creationId xmlns:a16="http://schemas.microsoft.com/office/drawing/2014/main" id="{F57E31B2-A6B4-4F27-BA13-7348AA1F66D9}"/>
+                </a:ext>
+              </a:extLst>
+            </p:cNvPr>
+            <p:cNvSpPr txBox="1"/>
+            <p:nvPr/>
+          </p:nvSpPr>
+          <p:spPr>
+            <a:xfrm>
+              <a:off x="10048270" y="4606086"/>
+              <a:ext cx="1607383" cy="369332"/>
+            </a:xfrm>
+            <a:prstGeom prst="rect">
+              <a:avLst/>
+            </a:prstGeom>
+            <a:noFill/>
+          </p:spPr>
+          <p:txBody>
+            <a:bodyPr wrap="square" rtlCol="0">
+              <a:spAutoFit/>
+            </a:bodyPr>
+            <a:lstStyle/>
+            <a:p>
+              <a:pPr algn="ctr"/>
+              <a:r>
+                <a:rPr lang="en-US" dirty="0"/>
+                <a:t>Yes/No</a:t>
+              </a:r>
+            </a:p>
+          </p:txBody>
+        </p:sp>
+        <p:cxnSp>
+          <p:nvCxnSpPr>
+            <p:cNvPr id="40" name="Straight Arrow Connector 39">
+              <a:extLst>
+                <a:ext uri="{FF2B5EF4-FFF2-40B4-BE49-F238E27FC236}">
+                  <a16:creationId xmlns:a16="http://schemas.microsoft.com/office/drawing/2014/main" id="{4CD9B35B-59DF-4E17-98FE-CE7E4348D50B}"/>
+                </a:ext>
+              </a:extLst>
+            </p:cNvPr>
+            <p:cNvCxnSpPr/>
+            <p:nvPr/>
+          </p:nvCxnSpPr>
+          <p:spPr>
+            <a:xfrm flipH="1">
+              <a:off x="10011437" y="4979580"/>
+              <a:ext cx="1612604" cy="0"/>
+            </a:xfrm>
+            <a:prstGeom prst="straightConnector1">
+              <a:avLst/>
+            </a:prstGeom>
+            <a:ln w="25400">
+              <a:solidFill>
+                <a:schemeClr val="tx1"/>
+              </a:solidFill>
+              <a:headEnd type="none" w="lg" len="lg"/>
+              <a:tailEnd type="triangle" w="lg" len="lg"/>
+            </a:ln>
+          </p:spPr>
+          <p:style>
+            <a:lnRef idx="1">
+              <a:schemeClr val="accent1"/>
+            </a:lnRef>
+            <a:fillRef idx="0">
+              <a:schemeClr val="accent1"/>
+            </a:fillRef>
+            <a:effectRef idx="0">
+              <a:schemeClr val="accent1"/>
+            </a:effectRef>
+            <a:fontRef idx="minor">
+              <a:schemeClr val="tx1"/>
+            </a:fontRef>
+          </p:style>
+        </p:cxnSp>
+        <p:cxnSp>
+          <p:nvCxnSpPr>
+            <p:cNvPr id="43" name="Straight Connector 42">
+              <a:extLst>
+                <a:ext uri="{FF2B5EF4-FFF2-40B4-BE49-F238E27FC236}">
+                  <a16:creationId xmlns:a16="http://schemas.microsoft.com/office/drawing/2014/main" id="{B5A34551-A55E-4983-BC7A-AABBC6C381E7}"/>
+                </a:ext>
+              </a:extLst>
+            </p:cNvPr>
+            <p:cNvCxnSpPr>
+              <a:cxnSpLocks/>
+            </p:cNvCxnSpPr>
+            <p:nvPr/>
+          </p:nvCxnSpPr>
+          <p:spPr>
+            <a:xfrm>
+              <a:off x="8375586" y="2699249"/>
+              <a:ext cx="13191" cy="2724465"/>
+            </a:xfrm>
+            <a:prstGeom prst="line">
+              <a:avLst/>
+            </a:prstGeom>
+            <a:ln w="25400">
+              <a:solidFill>
+                <a:schemeClr val="tx1"/>
+              </a:solidFill>
+            </a:ln>
+          </p:spPr>
+          <p:style>
+            <a:lnRef idx="1">
+              <a:schemeClr val="accent1"/>
+            </a:lnRef>
+            <a:fillRef idx="0">
+              <a:schemeClr val="accent1"/>
+            </a:fillRef>
+            <a:effectRef idx="0">
+              <a:schemeClr val="accent1"/>
+            </a:effectRef>
+            <a:fontRef idx="minor">
+              <a:schemeClr val="tx1"/>
+            </a:fontRef>
+          </p:style>
+        </p:cxnSp>
+        <p:cxnSp>
+          <p:nvCxnSpPr>
+            <p:cNvPr id="44" name="Straight Connector 43">
+              <a:extLst>
+                <a:ext uri="{FF2B5EF4-FFF2-40B4-BE49-F238E27FC236}">
+                  <a16:creationId xmlns:a16="http://schemas.microsoft.com/office/drawing/2014/main" id="{4B1F01B1-58B9-4A17-B078-FFD8FA8647A1}"/>
+                </a:ext>
+              </a:extLst>
+            </p:cNvPr>
+            <p:cNvCxnSpPr>
+              <a:cxnSpLocks/>
+            </p:cNvCxnSpPr>
+            <p:nvPr/>
+          </p:nvCxnSpPr>
+          <p:spPr>
+            <a:xfrm>
+              <a:off x="9990173" y="2715087"/>
+              <a:ext cx="13191" cy="2724465"/>
+            </a:xfrm>
+            <a:prstGeom prst="line">
+              <a:avLst/>
+            </a:prstGeom>
+            <a:ln w="25400">
+              <a:solidFill>
+                <a:schemeClr val="tx1"/>
+              </a:solidFill>
+            </a:ln>
+          </p:spPr>
+          <p:style>
+            <a:lnRef idx="1">
+              <a:schemeClr val="accent1"/>
+            </a:lnRef>
+            <a:fillRef idx="0">
+              <a:schemeClr val="accent1"/>
+            </a:fillRef>
+            <a:effectRef idx="0">
+              <a:schemeClr val="accent1"/>
+            </a:effectRef>
+            <a:fontRef idx="minor">
+              <a:schemeClr val="tx1"/>
+            </a:fontRef>
+          </p:style>
+        </p:cxnSp>
+        <p:cxnSp>
+          <p:nvCxnSpPr>
+            <p:cNvPr id="45" name="Straight Connector 44">
+              <a:extLst>
+                <a:ext uri="{FF2B5EF4-FFF2-40B4-BE49-F238E27FC236}">
+                  <a16:creationId xmlns:a16="http://schemas.microsoft.com/office/drawing/2014/main" id="{4874184D-36CB-43E0-A92B-F01146C9A95A}"/>
+                </a:ext>
+              </a:extLst>
+            </p:cNvPr>
+            <p:cNvCxnSpPr>
+              <a:cxnSpLocks/>
+            </p:cNvCxnSpPr>
+            <p:nvPr/>
+          </p:nvCxnSpPr>
+          <p:spPr>
+            <a:xfrm>
+              <a:off x="11626024" y="2730925"/>
+              <a:ext cx="13191" cy="2724465"/>
+            </a:xfrm>
+            <a:prstGeom prst="line">
+              <a:avLst/>
+            </a:prstGeom>
+            <a:ln w="25400">
+              <a:solidFill>
+                <a:schemeClr val="tx1"/>
+              </a:solidFill>
+            </a:ln>
+          </p:spPr>
+          <p:style>
+            <a:lnRef idx="1">
+              <a:schemeClr val="accent1"/>
+            </a:lnRef>
+            <a:fillRef idx="0">
+              <a:schemeClr val="accent1"/>
+            </a:fillRef>
+            <a:effectRef idx="0">
+              <a:schemeClr val="accent1"/>
+            </a:effectRef>
+            <a:fontRef idx="minor">
+              <a:schemeClr val="tx1"/>
+            </a:fontRef>
+          </p:style>
+        </p:cxnSp>
+      </p:grpSp>
     </p:spTree>
     <p:extLst>
       <p:ext uri="{BB962C8B-B14F-4D97-AF65-F5344CB8AC3E}">
@@ -6411,12 +7292,7 @@
             <p:ph type="title"/>
           </p:nvPr>
         </p:nvSpPr>
-        <p:spPr>
-          <a:xfrm>
-            <a:off x="4476306" y="210952"/>
-            <a:ext cx="7276215" cy="1325563"/>
-          </a:xfrm>
-        </p:spPr>
+        <p:spPr/>
         <p:txBody>
           <a:bodyPr/>
           <a:lstStyle/>
@@ -6428,7 +7304,98 @@
                   <a:schemeClr val="accent4"/>
                 </a:solidFill>
               </a:rPr>
-              <a:t>Quote Verification Pitfalls</a:t>
+              <a:t>Conclusion</a:t>
+            </a:r>
+          </a:p>
+        </p:txBody>
+      </p:sp>
+      <p:sp>
+        <p:nvSpPr>
+          <p:cNvPr id="6" name="Content Placeholder 5">
+            <a:extLst>
+              <a:ext uri="{FF2B5EF4-FFF2-40B4-BE49-F238E27FC236}">
+                <a16:creationId xmlns:a16="http://schemas.microsoft.com/office/drawing/2014/main" id="{0221B99F-CCA8-4B27-8B71-F7FF9195D73F}"/>
+              </a:ext>
+            </a:extLst>
+          </p:cNvPr>
+          <p:cNvSpPr>
+            <a:spLocks noGrp="1"/>
+          </p:cNvSpPr>
+          <p:nvPr>
+            <p:ph idx="1"/>
+          </p:nvPr>
+        </p:nvSpPr>
+        <p:spPr/>
+        <p:txBody>
+          <a:bodyPr/>
+          <a:lstStyle/>
+          <a:p>
+            <a:r>
+              <a:rPr lang="en-US" dirty="0"/>
+              <a:t>Provisioning Enclave and Quoting Enclaves are securely implemented</a:t>
+            </a:r>
+          </a:p>
+          <a:p>
+            <a:pPr lvl="1"/>
+            <a:r>
+              <a:rPr lang="en-US" dirty="0"/>
+              <a:t>Lots of bike shedding crypto</a:t>
+            </a:r>
+          </a:p>
+          <a:p>
+            <a:pPr lvl="1"/>
+            <a:r>
+              <a:rPr lang="en-US" dirty="0"/>
+              <a:t>Secure against sequential, concurrent, and state malleability</a:t>
+            </a:r>
+            <a:r>
+              <a:rPr lang="en-US" dirty="0">
+                <a:solidFill>
+                  <a:srgbClr val="00B050"/>
+                </a:solidFill>
+              </a:rPr>
+              <a:t> </a:t>
+            </a:r>
+          </a:p>
+          <a:p>
+            <a:r>
+              <a:rPr lang="en-US" dirty="0">
+                <a:solidFill>
+                  <a:srgbClr val="C00000"/>
+                </a:solidFill>
+              </a:rPr>
+              <a:t>No privacy in-spite of group signatures</a:t>
+            </a:r>
+          </a:p>
+          <a:p>
+            <a:pPr lvl="1"/>
+            <a:r>
+              <a:rPr lang="en-US" dirty="0"/>
+              <a:t>Provisioning Enclave uses PPID and Provisioning Keys directly</a:t>
+            </a:r>
+          </a:p>
+          <a:p>
+            <a:pPr lvl="1"/>
+            <a:r>
+              <a:rPr lang="en-US" dirty="0"/>
+              <a:t>Quoting enclave uses SPID even with un-linkable base name</a:t>
+            </a:r>
+          </a:p>
+          <a:p>
+            <a:pPr lvl="1"/>
+            <a:r>
+              <a:rPr lang="en-US" dirty="0"/>
+              <a:t>Remote attestation quotes are encrypted and can only be validated by Intel destroying Service Provider’s privacy</a:t>
+            </a:r>
+          </a:p>
+          <a:p>
+            <a:r>
+              <a:rPr lang="en-US" dirty="0">
+                <a:solidFill>
+                  <a:srgbClr val="C00000"/>
+                </a:solidFill>
+              </a:rPr>
+              <a:t>Creating secure enclaves beyond basic use-cases is non-trivial</a:t>
             </a:r>
           </a:p>
         </p:txBody>
@@ -7339,6 +8306,66 @@
 </p:sld>
 </file>
 
+<file path=ppt/slides/slide20.xml><?xml version="1.0" encoding="utf-8"?>
+<p:sld xmlns:a="http://schemas.openxmlformats.org/drawingml/2006/main" xmlns:r="http://schemas.openxmlformats.org/officeDocument/2006/relationships" xmlns:p="http://schemas.openxmlformats.org/presentationml/2006/main">
+  <p:cSld>
+    <p:spTree>
+      <p:nvGrpSpPr>
+        <p:cNvPr id="1" name=""/>
+        <p:cNvGrpSpPr/>
+        <p:nvPr/>
+      </p:nvGrpSpPr>
+      <p:grpSpPr>
+        <a:xfrm>
+          <a:off x="0" y="0"/>
+          <a:ext cx="0" cy="0"/>
+          <a:chOff x="0" y="0"/>
+          <a:chExt cx="0" cy="0"/>
+        </a:xfrm>
+      </p:grpSpPr>
+      <p:sp>
+        <p:nvSpPr>
+          <p:cNvPr id="3" name="Subtitle 2">
+            <a:extLst>
+              <a:ext uri="{FF2B5EF4-FFF2-40B4-BE49-F238E27FC236}">
+                <a16:creationId xmlns:a16="http://schemas.microsoft.com/office/drawing/2014/main" id="{824E4EC3-1FA7-4454-B406-9C558D38EE27}"/>
+              </a:ext>
+            </a:extLst>
+          </p:cNvPr>
+          <p:cNvSpPr>
+            <a:spLocks noGrp="1"/>
+          </p:cNvSpPr>
+          <p:nvPr>
+            <p:ph type="subTitle" idx="1"/>
+          </p:nvPr>
+        </p:nvSpPr>
+        <p:spPr/>
+        <p:txBody>
+          <a:bodyPr>
+            <a:normAutofit/>
+          </a:bodyPr>
+          <a:lstStyle/>
+          <a:p>
+            <a:r>
+              <a:rPr lang="en-US" sz="6000" dirty="0"/>
+              <a:t>Questions?</a:t>
+            </a:r>
+          </a:p>
+        </p:txBody>
+      </p:sp>
+    </p:spTree>
+    <p:extLst>
+      <p:ext uri="{BB962C8B-B14F-4D97-AF65-F5344CB8AC3E}">
+        <p14:creationId xmlns:p14="http://schemas.microsoft.com/office/powerpoint/2010/main" val="2688334132"/>
+      </p:ext>
+    </p:extLst>
+  </p:cSld>
+  <p:clrMapOvr>
+    <a:masterClrMapping/>
+  </p:clrMapOvr>
+</p:sld>
+</file>
+
 <file path=ppt/slides/slide3.xml><?xml version="1.0" encoding="utf-8"?>
 <p:sld xmlns:a="http://schemas.openxmlformats.org/drawingml/2006/main" xmlns:r="http://schemas.openxmlformats.org/officeDocument/2006/relationships" xmlns:p="http://schemas.openxmlformats.org/presentationml/2006/main">
   <p:cSld>
@@ -7468,38 +8495,14 @@
             <a:pPr lvl="1"/>
             <a:r>
               <a:rPr lang="en-US" dirty="0"/>
-              <a:t>Create signed/mac-</a:t>
-            </a:r>
-            <a:r>
-              <a:rPr lang="en-US" dirty="0" err="1"/>
-              <a:t>ed</a:t>
-            </a:r>
-            <a:r>
-              <a:rPr lang="en-US" dirty="0"/>
-              <a:t> Audit Log of events (e.g., which key was used, etc.)</a:t>
+              <a:t>Create signed/mac-ed Audit Log of events (e.g., which key was used, etc.)</a:t>
             </a:r>
           </a:p>
           <a:p>
             <a:pPr lvl="1"/>
             <a:r>
               <a:rPr lang="en-US" dirty="0"/>
-              <a:t>Make arbitrary </a:t>
-            </a:r>
-            <a:r>
-              <a:rPr lang="en-US" dirty="0" err="1"/>
-              <a:t>ecalls</a:t>
-            </a:r>
-            <a:r>
-              <a:rPr lang="en-US" dirty="0"/>
-              <a:t>, </a:t>
-            </a:r>
-            <a:r>
-              <a:rPr lang="en-US" dirty="0" err="1"/>
-              <a:t>ocalls</a:t>
-            </a:r>
-            <a:r>
-              <a:rPr lang="en-US" dirty="0"/>
-              <a:t>, and exit from enclave due to interrupts</a:t>
+              <a:t>Make arbitrary ecalls, ocalls, and exit from enclave due to interrupts</a:t>
             </a:r>
           </a:p>
           <a:p>
@@ -7840,16 +8843,10 @@
               <a:t>|</a:t>
             </a:r>
             <a:r>
-              <a:rPr lang="en-US" baseline="-25000" dirty="0" err="1">
-                <a:sym typeface="Symbol" panose="05050102010706020507" pitchFamily="18" charset="2"/>
-              </a:rPr>
-              <a:t>i</a:t>
-            </a:r>
-            <a:r>
               <a:rPr lang="en-US" baseline="-25000" dirty="0">
                 <a:sym typeface="Symbol" panose="05050102010706020507" pitchFamily="18" charset="2"/>
               </a:rPr>
-              <a:t></a:t>
+              <a:t>i</a:t>
             </a:r>
             <a:r>
               <a:rPr lang="en-US" dirty="0"/>
@@ -7879,15 +8876,7 @@
             </a:r>
             <a:r>
               <a:rPr lang="en-US" baseline="30000" dirty="0"/>
-              <a:t>min{</a:t>
-            </a:r>
-            <a:r>
-              <a:rPr lang="en-US" baseline="30000" dirty="0" err="1"/>
-              <a:t>x,y</a:t>
-            </a:r>
-            <a:r>
-              <a:rPr lang="en-US" baseline="30000" dirty="0"/>
-              <a:t>} </a:t>
+              <a:t>min{x,y} </a:t>
             </a:r>
             <a:endParaRPr lang="en-US" dirty="0">
               <a:solidFill>
@@ -8069,7 +9058,7 @@
               <a:t>&lt;</a:t>
             </a:r>
             <a:r>
-              <a:rPr lang="en-US" dirty="0" err="1">
+              <a:rPr lang="en-US" dirty="0">
                 <a:solidFill>
                   <a:srgbClr val="C00000"/>
                 </a:solidFill>
@@ -8078,11 +9067,11 @@
               <a:t>tpm_cntr</a:t>
             </a:r>
             <a:r>
-              <a:rPr lang="en-US" dirty="0" err="1"/>
+              <a:rPr lang="en-US" dirty="0"/>
               <a:t>,</a:t>
             </a:r>
             <a:r>
-              <a:rPr lang="en-US" dirty="0" err="1">
+              <a:rPr lang="en-US" dirty="0">
                 <a:solidFill>
                   <a:srgbClr val="C00000"/>
                 </a:solidFill>
@@ -8124,15 +9113,7 @@
             <a:pPr lvl="1"/>
             <a:r>
               <a:rPr lang="en-US" dirty="0"/>
-              <a:t>TPM and CPU needs mutual </a:t>
-            </a:r>
-            <a:r>
-              <a:rPr lang="en-US" dirty="0" err="1"/>
-              <a:t>auth</a:t>
-            </a:r>
-            <a:r>
-              <a:rPr lang="en-US" dirty="0"/>
-              <a:t> (motherboard/CPU swap!)</a:t>
+              <a:t>TPM and CPU needs mutual auth (motherboard/CPU swap!)</a:t>
             </a:r>
           </a:p>
           <a:p>
@@ -8302,15 +9283,7 @@
             <a:pPr lvl="1"/>
             <a:r>
               <a:rPr lang="en-US" dirty="0"/>
-              <a:t>SGX allows making </a:t>
-            </a:r>
-            <a:r>
-              <a:rPr lang="en-US" dirty="0" err="1"/>
-              <a:t>ecalls</a:t>
-            </a:r>
-            <a:r>
-              <a:rPr lang="en-US" dirty="0"/>
-              <a:t> after returning from interrupts</a:t>
+              <a:t>SGX allows making ecalls after returning from interrupts</a:t>
             </a:r>
           </a:p>
           <a:p>
@@ -8331,22 +9304,14 @@
               <a:t>Requires careful </a:t>
             </a:r>
             <a:r>
-              <a:rPr lang="en-US" dirty="0" err="1">
+              <a:rPr lang="en-US" dirty="0">
                 <a:latin typeface="Inconsolata" panose="020B0609030003000000" pitchFamily="49" charset="0"/>
               </a:rPr>
               <a:t>ecall</a:t>
             </a:r>
             <a:r>
               <a:rPr lang="en-US" dirty="0"/>
-              <a:t> interface for Proof-of-Knowledge (</a:t>
-            </a:r>
-            <a:r>
-              <a:rPr lang="en-US" dirty="0" err="1"/>
-              <a:t>PoK</a:t>
-            </a:r>
-            <a:r>
-              <a:rPr lang="en-US" dirty="0"/>
-              <a:t>) protocols</a:t>
+              <a:t> interface for Proof-of-Knowledge (PoK) protocols</a:t>
             </a:r>
           </a:p>
         </p:txBody>
@@ -8446,23 +9411,7 @@
                   <a:schemeClr val="accent4"/>
                 </a:solidFill>
               </a:rPr>
-              <a:t>State Malleability and </a:t>
-            </a:r>
-            <a:r>
-              <a:rPr lang="en-US" dirty="0" err="1">
-                <a:solidFill>
-                  <a:schemeClr val="accent4"/>
-                </a:solidFill>
-              </a:rPr>
-              <a:t>PoK</a:t>
-            </a:r>
-            <a:r>
-              <a:rPr lang="en-US" dirty="0">
-                <a:solidFill>
-                  <a:schemeClr val="accent4"/>
-                </a:solidFill>
-              </a:rPr>
-              <a:t> extractor</a:t>
+              <a:t>State Malleability and PoK extractor</a:t>
             </a:r>
           </a:p>
         </p:txBody>
@@ -8505,16 +9454,7 @@
                 </a:solidFill>
                 <a:latin typeface="Inconsolata" panose="020B0609030003000000" pitchFamily="49" charset="0"/>
               </a:rPr>
-              <a:t>static </a:t>
-            </a:r>
-            <a:r>
-              <a:rPr lang="en-US" sz="1800" dirty="0" err="1">
-                <a:solidFill>
-                  <a:srgbClr val="0070C0"/>
-                </a:solidFill>
-                <a:latin typeface="Inconsolata" panose="020B0609030003000000" pitchFamily="49" charset="0"/>
-              </a:rPr>
-              <a:t>int</a:t>
+              <a:t>static int</a:t>
             </a:r>
             <a:r>
               <a:rPr lang="en-US" sz="1800" dirty="0">
@@ -8523,7 +9463,7 @@
               <a:t> </a:t>
             </a:r>
             <a:r>
-              <a:rPr lang="en-US" sz="1800" b="1" dirty="0" err="1">
+              <a:rPr lang="en-US" sz="1800" b="1" dirty="0">
                 <a:solidFill>
                   <a:srgbClr val="C00000"/>
                 </a:solidFill>
@@ -8569,19 +9509,7 @@
               <a:rPr lang="en-US" sz="1800" dirty="0">
                 <a:latin typeface="Inconsolata" panose="020B0609030003000000" pitchFamily="49" charset="0"/>
               </a:rPr>
-              <a:t> </a:t>
-            </a:r>
-            <a:r>
-              <a:rPr lang="en-US" sz="1800" dirty="0" err="1">
-                <a:latin typeface="Inconsolata" panose="020B0609030003000000" pitchFamily="49" charset="0"/>
-              </a:rPr>
-              <a:t>general_info</a:t>
-            </a:r>
-            <a:r>
-              <a:rPr lang="en-US" sz="1800" dirty="0">
-                <a:latin typeface="Inconsolata" panose="020B0609030003000000" pitchFamily="49" charset="0"/>
-              </a:rPr>
-              <a:t>{</a:t>
+              <a:t> general_info{</a:t>
             </a:r>
             <a:br>
               <a:rPr lang="en-US" sz="1800" dirty="0">
@@ -8607,57 +9535,7 @@
               <a:rPr lang="en-US" sz="1800" dirty="0">
                 <a:latin typeface="Inconsolata" panose="020B0609030003000000" pitchFamily="49" charset="0"/>
               </a:rPr>
-              <a:t> </a:t>
-            </a:r>
-            <a:r>
-              <a:rPr lang="en-US" sz="1800" dirty="0" err="1">
-                <a:latin typeface="Inconsolata" panose="020B0609030003000000" pitchFamily="49" charset="0"/>
-              </a:rPr>
-              <a:t>general_name</a:t>
-            </a:r>
-            <a:r>
-              <a:rPr lang="en-US" sz="1800" dirty="0">
-                <a:latin typeface="Inconsolata" panose="020B0609030003000000" pitchFamily="49" charset="0"/>
-              </a:rPr>
-              <a:t>[256]; </a:t>
-            </a:r>
-            <a:br>
-              <a:rPr lang="en-US" sz="1800" dirty="0">
-                <a:latin typeface="Inconsolata" panose="020B0609030003000000" pitchFamily="49" charset="0"/>
-              </a:rPr>
-            </a:br>
-            <a:r>
-              <a:rPr lang="en-US" sz="1800" dirty="0">
-                <a:latin typeface="Inconsolata" panose="020B0609030003000000" pitchFamily="49" charset="0"/>
-              </a:rPr>
-              <a:t>  </a:t>
-            </a:r>
-            <a:r>
-              <a:rPr lang="en-US" sz="1800" dirty="0" err="1">
-                <a:solidFill>
-                  <a:srgbClr val="0070C0"/>
-                </a:solidFill>
-                <a:latin typeface="Inconsolata" panose="020B0609030003000000" pitchFamily="49" charset="0"/>
-              </a:rPr>
-              <a:t>const</a:t>
-            </a:r>
-            <a:r>
-              <a:rPr lang="en-US" sz="1800" dirty="0">
-                <a:latin typeface="Inconsolata" panose="020B0609030003000000" pitchFamily="49" charset="0"/>
-              </a:rPr>
-              <a:t> sgx_ec256_public_t </a:t>
-            </a:r>
-            <a:r>
-              <a:rPr lang="en-US" sz="1800" dirty="0" err="1">
-                <a:latin typeface="Inconsolata" panose="020B0609030003000000" pitchFamily="49" charset="0"/>
-              </a:rPr>
-              <a:t>general_pub</a:t>
-            </a:r>
-            <a:r>
-              <a:rPr lang="en-US" sz="1800" dirty="0">
-                <a:latin typeface="Inconsolata" panose="020B0609030003000000" pitchFamily="49" charset="0"/>
-              </a:rPr>
-              <a:t>; </a:t>
+              <a:t> general_name[256]; </a:t>
             </a:r>
             <a:br>
               <a:rPr lang="en-US" sz="1800" dirty="0">
@@ -8677,25 +9555,39 @@
                 </a:solidFill>
                 <a:latin typeface="Inconsolata" panose="020B0609030003000000" pitchFamily="49" charset="0"/>
               </a:rPr>
-              <a:t>bool</a:t>
+              <a:t>const</a:t>
             </a:r>
             <a:r>
               <a:rPr lang="en-US" sz="1800" dirty="0">
                 <a:latin typeface="Inconsolata" panose="020B0609030003000000" pitchFamily="49" charset="0"/>
               </a:rPr>
-              <a:t> </a:t>
-            </a:r>
-            <a:r>
-              <a:rPr lang="en-US" sz="1800" dirty="0" err="1">
-                <a:latin typeface="Inconsolata" panose="020B0609030003000000" pitchFamily="49" charset="0"/>
-              </a:rPr>
-              <a:t>has_authorized</a:t>
-            </a:r>
-            <a:r>
+              <a:t> sgx_ec256_public_t general_pub; </a:t>
+            </a:r>
+            <a:br>
               <a:rPr lang="en-US" sz="1800" dirty="0">
                 <a:latin typeface="Inconsolata" panose="020B0609030003000000" pitchFamily="49" charset="0"/>
               </a:rPr>
-              <a:t>; </a:t>
+            </a:br>
+            <a:r>
+              <a:rPr lang="en-US" sz="1800" dirty="0">
+                <a:latin typeface="Inconsolata" panose="020B0609030003000000" pitchFamily="49" charset="0"/>
+              </a:rPr>
+              <a:t>  </a:t>
+            </a:r>
+            <a:r>
+              <a:rPr lang="en-US" sz="1800" dirty="0">
+                <a:solidFill>
+                  <a:srgbClr val="0070C0"/>
+                </a:solidFill>
+                <a:latin typeface="Inconsolata" panose="020B0609030003000000" pitchFamily="49" charset="0"/>
+              </a:rPr>
+              <a:t>bool</a:t>
+            </a:r>
+            <a:r>
+              <a:rPr lang="en-US" sz="1800" dirty="0">
+                <a:latin typeface="Inconsolata" panose="020B0609030003000000" pitchFamily="49" charset="0"/>
+              </a:rPr>
+              <a:t> has_authorized; </a:t>
             </a:r>
             <a:r>
               <a:rPr lang="en-US" sz="1800" dirty="0">
@@ -8765,133 +9657,34 @@
               </a:rPr>
             </a:br>
             <a:r>
-              <a:rPr lang="en-US" sz="1800" dirty="0" err="1">
-                <a:solidFill>
-                  <a:srgbClr val="0070C0"/>
-                </a:solidFill>
-                <a:latin typeface="Inconsolata" panose="020B0609030003000000" pitchFamily="49" charset="0"/>
-              </a:rPr>
-              <a:t>int</a:t>
-            </a:r>
-            <a:r>
-              <a:rPr lang="en-US" sz="1800" dirty="0">
-                <a:latin typeface="Inconsolata" panose="020B0609030003000000" pitchFamily="49" charset="0"/>
-              </a:rPr>
-              <a:t> </a:t>
-            </a:r>
-            <a:r>
-              <a:rPr lang="en-US" sz="1800" b="1" dirty="0" err="1">
-                <a:solidFill>
-                  <a:srgbClr val="C00000"/>
-                </a:solidFill>
-                <a:latin typeface="Inconsolata" panose="020B0609030003000000" pitchFamily="49" charset="0"/>
-              </a:rPr>
-              <a:t>auth_and_launch</a:t>
-            </a:r>
-            <a:r>
-              <a:rPr lang="en-US" sz="1800" dirty="0">
-                <a:latin typeface="Inconsolata" panose="020B0609030003000000" pitchFamily="49" charset="0"/>
-              </a:rPr>
-              <a:t>(</a:t>
-            </a:r>
-            <a:r>
-              <a:rPr lang="en-US" sz="1800" dirty="0" err="1">
-                <a:solidFill>
-                  <a:srgbClr val="0070C0"/>
-                </a:solidFill>
-                <a:latin typeface="Inconsolata" panose="020B0609030003000000" pitchFamily="49" charset="0"/>
-              </a:rPr>
-              <a:t>const</a:t>
-            </a:r>
-            <a:r>
               <a:rPr lang="en-US" sz="1800" dirty="0">
                 <a:solidFill>
                   <a:srgbClr val="0070C0"/>
                 </a:solidFill>
                 <a:latin typeface="Inconsolata" panose="020B0609030003000000" pitchFamily="49" charset="0"/>
               </a:rPr>
-              <a:t> char</a:t>
+              <a:t>int</a:t>
             </a:r>
             <a:r>
               <a:rPr lang="en-US" sz="1800" dirty="0">
                 <a:latin typeface="Inconsolata" panose="020B0609030003000000" pitchFamily="49" charset="0"/>
               </a:rPr>
-              <a:t>* </a:t>
-            </a:r>
-            <a:r>
-              <a:rPr lang="en-US" sz="1800" dirty="0" err="1">
+              <a:t> </a:t>
+            </a:r>
+            <a:r>
+              <a:rPr lang="en-US" sz="1800" b="1" dirty="0">
                 <a:solidFill>
-                  <a:srgbClr val="0070C0"/>
+                  <a:srgbClr val="C00000"/>
                 </a:solidFill>
                 <a:latin typeface="Inconsolata" panose="020B0609030003000000" pitchFamily="49" charset="0"/>
               </a:rPr>
-              <a:t>const</a:t>
+              <a:t>auth_and_launch</a:t>
             </a:r>
             <a:r>
               <a:rPr lang="en-US" sz="1800" dirty="0">
                 <a:latin typeface="Inconsolata" panose="020B0609030003000000" pitchFamily="49" charset="0"/>
               </a:rPr>
-              <a:t> </a:t>
-            </a:r>
-            <a:r>
-              <a:rPr lang="en-US" sz="1800" dirty="0" err="1">
-                <a:latin typeface="Inconsolata" panose="020B0609030003000000" pitchFamily="49" charset="0"/>
-              </a:rPr>
-              <a:t>general_name</a:t>
-            </a:r>
-            <a:r>
-              <a:rPr lang="en-US" sz="1800" dirty="0">
-                <a:latin typeface="Inconsolata" panose="020B0609030003000000" pitchFamily="49" charset="0"/>
-              </a:rPr>
-              <a:t>, </a:t>
-            </a:r>
-            <a:br>
-              <a:rPr lang="en-US" sz="1800" dirty="0">
-                <a:latin typeface="Inconsolata" panose="020B0609030003000000" pitchFamily="49" charset="0"/>
-              </a:rPr>
-            </a:br>
-            <a:r>
-              <a:rPr lang="en-US" sz="1800" dirty="0">
-                <a:latin typeface="Inconsolata" panose="020B0609030003000000" pitchFamily="49" charset="0"/>
-              </a:rPr>
-              <a:t>                </a:t>
-            </a:r>
-            <a:r>
-              <a:rPr lang="en-US" sz="1800" dirty="0" err="1">
-                <a:solidFill>
-                  <a:srgbClr val="0070C0"/>
-                </a:solidFill>
-                <a:latin typeface="Inconsolata" panose="020B0609030003000000" pitchFamily="49" charset="0"/>
-              </a:rPr>
-              <a:t>const</a:t>
-            </a:r>
-            <a:r>
-              <a:rPr lang="en-US" sz="1800" dirty="0">
-                <a:latin typeface="Inconsolata" panose="020B0609030003000000" pitchFamily="49" charset="0"/>
-              </a:rPr>
-              <a:t> sgx_ec256_signature_t* sig)</a:t>
-            </a:r>
-            <a:br>
-              <a:rPr lang="en-US" sz="1800" dirty="0">
-                <a:latin typeface="Inconsolata" panose="020B0609030003000000" pitchFamily="49" charset="0"/>
-              </a:rPr>
-            </a:br>
-            <a:r>
-              <a:rPr lang="en-US" sz="1800" dirty="0">
-                <a:latin typeface="Inconsolata" panose="020B0609030003000000" pitchFamily="49" charset="0"/>
-              </a:rPr>
-              <a:t>{     </a:t>
-            </a:r>
-            <a:br>
-              <a:rPr lang="en-US" sz="1800" dirty="0">
-                <a:latin typeface="Inconsolata" panose="020B0609030003000000" pitchFamily="49" charset="0"/>
-              </a:rPr>
-            </a:br>
-            <a:r>
-              <a:rPr lang="en-US" sz="1800" dirty="0">
-                <a:latin typeface="Inconsolata" panose="020B0609030003000000" pitchFamily="49" charset="0"/>
-              </a:rPr>
-              <a:t>  </a:t>
+              <a:t>(</a:t>
             </a:r>
             <a:r>
               <a:rPr lang="en-US" sz="1800" dirty="0">
@@ -8900,83 +9693,13 @@
                 </a:solidFill>
                 <a:latin typeface="Inconsolata" panose="020B0609030003000000" pitchFamily="49" charset="0"/>
               </a:rPr>
-              <a:t>struct</a:t>
+              <a:t>const char</a:t>
             </a:r>
             <a:r>
               <a:rPr lang="en-US" sz="1800" dirty="0">
                 <a:latin typeface="Inconsolata" panose="020B0609030003000000" pitchFamily="49" charset="0"/>
               </a:rPr>
-              <a:t> </a:t>
-            </a:r>
-            <a:r>
-              <a:rPr lang="en-US" sz="1800" dirty="0" err="1">
-                <a:latin typeface="Inconsolata" panose="020B0609030003000000" pitchFamily="49" charset="0"/>
-              </a:rPr>
-              <a:t>general_info</a:t>
-            </a:r>
-            <a:r>
-              <a:rPr lang="en-US" sz="1800" dirty="0">
-                <a:latin typeface="Inconsolata" panose="020B0609030003000000" pitchFamily="49" charset="0"/>
-              </a:rPr>
               <a:t>* </a:t>
-            </a:r>
-            <a:r>
-              <a:rPr lang="en-US" sz="1800" dirty="0" err="1">
-                <a:latin typeface="Inconsolata" panose="020B0609030003000000" pitchFamily="49" charset="0"/>
-              </a:rPr>
-              <a:t>valid_general</a:t>
-            </a:r>
-            <a:r>
-              <a:rPr lang="en-US" sz="1800" dirty="0">
-                <a:latin typeface="Inconsolata" panose="020B0609030003000000" pitchFamily="49" charset="0"/>
-              </a:rPr>
-              <a:t> = </a:t>
-            </a:r>
-            <a:br>
-              <a:rPr lang="en-US" sz="1800" dirty="0">
-                <a:latin typeface="Inconsolata" panose="020B0609030003000000" pitchFamily="49" charset="0"/>
-              </a:rPr>
-            </a:br>
-            <a:r>
-              <a:rPr lang="en-US" sz="1800" dirty="0">
-                <a:latin typeface="Inconsolata" panose="020B0609030003000000" pitchFamily="49" charset="0"/>
-              </a:rPr>
-              <a:t>                </a:t>
-            </a:r>
-            <a:r>
-              <a:rPr lang="en-US" sz="1800" dirty="0" err="1">
-                <a:latin typeface="Inconsolata" panose="020B0609030003000000" pitchFamily="49" charset="0"/>
-              </a:rPr>
-              <a:t>validate_general</a:t>
-            </a:r>
-            <a:r>
-              <a:rPr lang="en-US" sz="1800" dirty="0">
-                <a:latin typeface="Inconsolata" panose="020B0609030003000000" pitchFamily="49" charset="0"/>
-              </a:rPr>
-              <a:t>(</a:t>
-            </a:r>
-            <a:r>
-              <a:rPr lang="en-US" sz="1800" dirty="0" err="1">
-                <a:latin typeface="Inconsolata" panose="020B0609030003000000" pitchFamily="49" charset="0"/>
-              </a:rPr>
-              <a:t>general_name</a:t>
-            </a:r>
-            <a:r>
-              <a:rPr lang="en-US" sz="1800" dirty="0">
-                <a:latin typeface="Inconsolata" panose="020B0609030003000000" pitchFamily="49" charset="0"/>
-              </a:rPr>
-              <a:t>, sig);</a:t>
-            </a:r>
-          </a:p>
-          <a:p>
-            <a:pPr marL="0" indent="0">
-              <a:buNone/>
-            </a:pPr>
-            <a:r>
-              <a:rPr lang="en-US" sz="1800" dirty="0">
-                <a:latin typeface="Inconsolata" panose="020B0609030003000000" pitchFamily="49" charset="0"/>
-              </a:rPr>
-              <a:t>  </a:t>
             </a:r>
             <a:r>
               <a:rPr lang="en-US" sz="1800" dirty="0">
@@ -8985,25 +9708,24 @@
                 </a:solidFill>
                 <a:latin typeface="Inconsolata" panose="020B0609030003000000" pitchFamily="49" charset="0"/>
               </a:rPr>
-              <a:t>if</a:t>
+              <a:t>const</a:t>
             </a:r>
             <a:r>
               <a:rPr lang="en-US" sz="1800" dirty="0">
                 <a:latin typeface="Inconsolata" panose="020B0609030003000000" pitchFamily="49" charset="0"/>
               </a:rPr>
-              <a:t>(!</a:t>
-            </a:r>
-            <a:r>
-              <a:rPr lang="en-US" sz="1800" dirty="0" err="1">
-                <a:latin typeface="Inconsolata" panose="020B0609030003000000" pitchFamily="49" charset="0"/>
-              </a:rPr>
-              <a:t>valid_general</a:t>
-            </a:r>
-            <a:r>
+              <a:t> general_name, </a:t>
+            </a:r>
+            <a:br>
               <a:rPr lang="en-US" sz="1800" dirty="0">
                 <a:latin typeface="Inconsolata" panose="020B0609030003000000" pitchFamily="49" charset="0"/>
               </a:rPr>
-              <a:t>){ </a:t>
+            </a:br>
+            <a:r>
+              <a:rPr lang="en-US" sz="1800" dirty="0">
+                <a:latin typeface="Inconsolata" panose="020B0609030003000000" pitchFamily="49" charset="0"/>
+              </a:rPr>
+              <a:t>                </a:t>
             </a:r>
             <a:r>
               <a:rPr lang="en-US" sz="1800" dirty="0">
@@ -9012,6 +9734,95 @@
                 </a:solidFill>
                 <a:latin typeface="Inconsolata" panose="020B0609030003000000" pitchFamily="49" charset="0"/>
               </a:rPr>
+              <a:t>const</a:t>
+            </a:r>
+            <a:r>
+              <a:rPr lang="en-US" sz="1800" dirty="0">
+                <a:latin typeface="Inconsolata" panose="020B0609030003000000" pitchFamily="49" charset="0"/>
+              </a:rPr>
+              <a:t> sgx_ec256_signature_t* sig)</a:t>
+            </a:r>
+            <a:br>
+              <a:rPr lang="en-US" sz="1800" dirty="0">
+                <a:latin typeface="Inconsolata" panose="020B0609030003000000" pitchFamily="49" charset="0"/>
+              </a:rPr>
+            </a:br>
+            <a:r>
+              <a:rPr lang="en-US" sz="1800" dirty="0">
+                <a:latin typeface="Inconsolata" panose="020B0609030003000000" pitchFamily="49" charset="0"/>
+              </a:rPr>
+              <a:t>{     </a:t>
+            </a:r>
+            <a:br>
+              <a:rPr lang="en-US" sz="1800" dirty="0">
+                <a:latin typeface="Inconsolata" panose="020B0609030003000000" pitchFamily="49" charset="0"/>
+              </a:rPr>
+            </a:br>
+            <a:r>
+              <a:rPr lang="en-US" sz="1800" dirty="0">
+                <a:latin typeface="Inconsolata" panose="020B0609030003000000" pitchFamily="49" charset="0"/>
+              </a:rPr>
+              <a:t>  </a:t>
+            </a:r>
+            <a:r>
+              <a:rPr lang="en-US" sz="1800" dirty="0">
+                <a:solidFill>
+                  <a:srgbClr val="0070C0"/>
+                </a:solidFill>
+                <a:latin typeface="Inconsolata" panose="020B0609030003000000" pitchFamily="49" charset="0"/>
+              </a:rPr>
+              <a:t>struct</a:t>
+            </a:r>
+            <a:r>
+              <a:rPr lang="en-US" sz="1800" dirty="0">
+                <a:latin typeface="Inconsolata" panose="020B0609030003000000" pitchFamily="49" charset="0"/>
+              </a:rPr>
+              <a:t> general_info* valid_general = </a:t>
+            </a:r>
+            <a:br>
+              <a:rPr lang="en-US" sz="1800" dirty="0">
+                <a:latin typeface="Inconsolata" panose="020B0609030003000000" pitchFamily="49" charset="0"/>
+              </a:rPr>
+            </a:br>
+            <a:r>
+              <a:rPr lang="en-US" sz="1800" dirty="0">
+                <a:latin typeface="Inconsolata" panose="020B0609030003000000" pitchFamily="49" charset="0"/>
+              </a:rPr>
+              <a:t>                validate_general(general_name, sig);</a:t>
+            </a:r>
+          </a:p>
+          <a:p>
+            <a:pPr marL="0" indent="0">
+              <a:buNone/>
+            </a:pPr>
+            <a:r>
+              <a:rPr lang="en-US" sz="1800" dirty="0">
+                <a:latin typeface="Inconsolata" panose="020B0609030003000000" pitchFamily="49" charset="0"/>
+              </a:rPr>
+              <a:t>  </a:t>
+            </a:r>
+            <a:r>
+              <a:rPr lang="en-US" sz="1800" dirty="0">
+                <a:solidFill>
+                  <a:srgbClr val="0070C0"/>
+                </a:solidFill>
+                <a:latin typeface="Inconsolata" panose="020B0609030003000000" pitchFamily="49" charset="0"/>
+              </a:rPr>
+              <a:t>if</a:t>
+            </a:r>
+            <a:r>
+              <a:rPr lang="en-US" sz="1800" dirty="0">
+                <a:latin typeface="Inconsolata" panose="020B0609030003000000" pitchFamily="49" charset="0"/>
+              </a:rPr>
+              <a:t>(!valid_general){ </a:t>
+            </a:r>
+            <a:r>
+              <a:rPr lang="en-US" sz="1800" dirty="0">
+                <a:solidFill>
+                  <a:srgbClr val="0070C0"/>
+                </a:solidFill>
+                <a:latin typeface="Inconsolata" panose="020B0609030003000000" pitchFamily="49" charset="0"/>
+              </a:rPr>
               <a:t>return</a:t>
             </a:r>
             <a:r>
@@ -9059,31 +9870,7 @@
               <a:rPr lang="en-US" sz="1800" dirty="0">
                 <a:latin typeface="Inconsolata" panose="020B0609030003000000" pitchFamily="49" charset="0"/>
               </a:rPr>
-              <a:t>(!</a:t>
-            </a:r>
-            <a:r>
-              <a:rPr lang="en-US" sz="1800" dirty="0" err="1">
-                <a:latin typeface="Inconsolata" panose="020B0609030003000000" pitchFamily="49" charset="0"/>
-              </a:rPr>
-              <a:t>valid_general</a:t>
-            </a:r>
-            <a:r>
-              <a:rPr lang="en-US" sz="1800" dirty="0">
-                <a:latin typeface="Inconsolata" panose="020B0609030003000000" pitchFamily="49" charset="0"/>
-              </a:rPr>
-              <a:t>-&gt;</a:t>
-            </a:r>
-            <a:r>
-              <a:rPr lang="en-US" sz="1800" dirty="0" err="1">
-                <a:latin typeface="Inconsolata" panose="020B0609030003000000" pitchFamily="49" charset="0"/>
-              </a:rPr>
-              <a:t>has_authorized</a:t>
-            </a:r>
-            <a:r>
-              <a:rPr lang="en-US" sz="1800" dirty="0">
-                <a:latin typeface="Inconsolata" panose="020B0609030003000000" pitchFamily="49" charset="0"/>
-              </a:rPr>
-              <a:t>){  </a:t>
+              <a:t>(!valid_general-&gt;has_authorized){  </a:t>
             </a:r>
             <a:br>
               <a:rPr lang="en-US" sz="1800" dirty="0">
@@ -9094,19 +9881,7 @@
               <a:rPr lang="en-US" sz="1800" dirty="0">
                 <a:latin typeface="Inconsolata" panose="020B0609030003000000" pitchFamily="49" charset="0"/>
               </a:rPr>
-              <a:t>    </a:t>
-            </a:r>
-            <a:r>
-              <a:rPr lang="en-US" sz="1800" dirty="0" err="1">
-                <a:latin typeface="Inconsolata" panose="020B0609030003000000" pitchFamily="49" charset="0"/>
-              </a:rPr>
-              <a:t>auth_count</a:t>
-            </a:r>
-            <a:r>
-              <a:rPr lang="en-US" sz="1800" dirty="0">
-                <a:latin typeface="Inconsolata" panose="020B0609030003000000" pitchFamily="49" charset="0"/>
-              </a:rPr>
-              <a:t>++; </a:t>
+              <a:t>    auth_count++; </a:t>
             </a:r>
             <a:r>
               <a:rPr lang="en-US" sz="1800" dirty="0">
@@ -9128,31 +9903,7 @@
               <a:rPr lang="en-US" sz="1800" dirty="0">
                 <a:latin typeface="Inconsolata" panose="020B0609030003000000" pitchFamily="49" charset="0"/>
               </a:rPr>
-              <a:t>    </a:t>
-            </a:r>
-            <a:r>
-              <a:rPr lang="en-US" sz="1800" dirty="0" err="1">
-                <a:latin typeface="Inconsolata" panose="020B0609030003000000" pitchFamily="49" charset="0"/>
-              </a:rPr>
-              <a:t>valid_general</a:t>
-            </a:r>
-            <a:r>
-              <a:rPr lang="en-US" sz="1800" dirty="0">
-                <a:latin typeface="Inconsolata" panose="020B0609030003000000" pitchFamily="49" charset="0"/>
-              </a:rPr>
-              <a:t>-&gt;</a:t>
-            </a:r>
-            <a:r>
-              <a:rPr lang="en-US" sz="1800" dirty="0" err="1">
-                <a:latin typeface="Inconsolata" panose="020B0609030003000000" pitchFamily="49" charset="0"/>
-              </a:rPr>
-              <a:t>has_authorized</a:t>
-            </a:r>
-            <a:r>
-              <a:rPr lang="en-US" sz="1800" dirty="0">
-                <a:latin typeface="Inconsolata" panose="020B0609030003000000" pitchFamily="49" charset="0"/>
-              </a:rPr>
-              <a:t> = true; </a:t>
+              <a:t>    valid_general-&gt;has_authorized = true; </a:t>
             </a:r>
             <a:br>
               <a:rPr lang="en-US" sz="1800" dirty="0">
@@ -9251,19 +10002,7 @@
               <a:rPr lang="en-US" sz="1800" dirty="0">
                 <a:latin typeface="Inconsolata" panose="020B0609030003000000" pitchFamily="49" charset="0"/>
               </a:rPr>
-              <a:t>(</a:t>
-            </a:r>
-            <a:r>
-              <a:rPr lang="en-US" sz="1800" dirty="0" err="1">
-                <a:latin typeface="Inconsolata" panose="020B0609030003000000" pitchFamily="49" charset="0"/>
-              </a:rPr>
-              <a:t>auth_count</a:t>
-            </a:r>
-            <a:r>
-              <a:rPr lang="en-US" sz="1800" dirty="0">
-                <a:latin typeface="Inconsolata" panose="020B0609030003000000" pitchFamily="49" charset="0"/>
-              </a:rPr>
-              <a:t> == 2){ </a:t>
+              <a:t>(auth_count == 2){ </a:t>
             </a:r>
             <a:r>
               <a:rPr lang="en-US" sz="1800" dirty="0">
@@ -9320,15 +10059,7 @@
             <a:pPr lvl="1"/>
             <a:r>
               <a:rPr lang="en-US" sz="2800" dirty="0"/>
-              <a:t>Run the same enclave in parallel for poly(</a:t>
-            </a:r>
-            <a:r>
-              <a:rPr lang="en-US" sz="2800" dirty="0" err="1"/>
-              <a:t>instr</a:t>
-            </a:r>
-            <a:r>
-              <a:rPr lang="en-US" sz="2800" dirty="0"/>
-              <a:t>-count) times</a:t>
+              <a:t>Run the same enclave in parallel for poly(instr-count) times</a:t>
             </a:r>
           </a:p>
           <a:p>
@@ -9345,7 +10076,7 @@
               <a:t>Make </a:t>
             </a:r>
             <a:r>
-              <a:rPr lang="en-US" sz="3200" dirty="0" err="1">
+              <a:rPr lang="en-US" sz="3200" dirty="0">
                 <a:latin typeface="Inconsolata" panose="020B0609030003000000" pitchFamily="49" charset="0"/>
               </a:rPr>
               <a:t>ecall</a:t>
@@ -9358,15 +10089,7 @@
           <a:p>
             <a:r>
               <a:rPr lang="en-US" sz="3200" dirty="0"/>
-              <a:t>With multiple threads, one might be able to exploit </a:t>
-            </a:r>
-            <a:r>
-              <a:rPr lang="en-US" sz="3200" dirty="0" err="1"/>
-              <a:t>PoK</a:t>
-            </a:r>
-            <a:r>
-              <a:rPr lang="en-US" sz="3200" dirty="0"/>
-              <a:t> protocols</a:t>
+              <a:t>With multiple threads, one might be able to exploit PoK protocols</a:t>
             </a:r>
           </a:p>
         </p:txBody>
@@ -9421,7 +10144,7 @@
           <a:lstStyle/>
           <a:p>
             <a:pPr algn="ctr"/>
-            <a:endParaRPr lang="en-US"/>
+            <a:endParaRPr lang="en-US" dirty="0"/>
           </a:p>
         </p:txBody>
       </p:sp>
@@ -9556,13 +10279,8 @@
             </a:r>
             <a:r>
               <a:rPr lang="en-US" dirty="0"/>
-              <a:t> as </a:t>
-            </a:r>
-            <a:r>
-              <a:rPr lang="en-US" dirty="0" err="1"/>
-              <a:t>RoT</a:t>
-            </a:r>
-            <a:endParaRPr lang="en-US" dirty="0"/>
+              <a:t> as RoT</a:t>
+            </a:r>
           </a:p>
           <a:p>
             <a:r>
@@ -9697,36 +10415,12 @@
             <a:p>
               <a:pPr algn="ctr"/>
               <a:r>
-                <a:rPr lang="en-US" b="1" dirty="0" err="1">
-                  <a:solidFill>
-                    <a:srgbClr val="FF0000"/>
-                  </a:solidFill>
-                </a:rPr>
-                <a:t>enc</a:t>
-              </a:r>
-              <a:r>
                 <a:rPr lang="en-US" b="1" dirty="0">
                   <a:solidFill>
                     <a:srgbClr val="FF0000"/>
                   </a:solidFill>
                 </a:rPr>
-                <a:t>(</a:t>
-              </a:r>
-              <a:r>
-                <a:rPr lang="en-US" b="1" dirty="0" err="1">
-                  <a:solidFill>
-                    <a:srgbClr val="FF0000"/>
-                  </a:solidFill>
-                </a:rPr>
-                <a:t>epid_sig</a:t>
-              </a:r>
-              <a:r>
-                <a:rPr lang="en-US" b="1" dirty="0">
-                  <a:solidFill>
-                    <a:srgbClr val="FF0000"/>
-                  </a:solidFill>
-                </a:rPr>
-                <a:t>)</a:t>
+                <a:t>enc(epid_sig)</a:t>
               </a:r>
               <a:endParaRPr lang="en-US" dirty="0"/>
             </a:p>
@@ -9812,20 +10506,8 @@
             <a:p>
               <a:pPr algn="ctr"/>
               <a:r>
-                <a:rPr lang="en-US" dirty="0" err="1"/>
-                <a:t>PoK</a:t>
-              </a:r>
-              <a:r>
                 <a:rPr lang="en-US" dirty="0"/>
-                <a:t> of </a:t>
-              </a:r>
-              <a:r>
-                <a:rPr lang="en-US" dirty="0" err="1"/>
-                <a:t>RoT</a:t>
-              </a:r>
-              <a:r>
-                <a:rPr lang="en-US" dirty="0"/>
-                <a:t> </a:t>
+                <a:t>PoK of RoT </a:t>
               </a:r>
             </a:p>
           </p:txBody>
@@ -9945,16 +10627,6 @@
             <a:p>
               <a:pPr algn="ctr"/>
               <a:r>
-                <a:rPr lang="en-US" dirty="0" err="1">
-                  <a:solidFill>
-                    <a:schemeClr val="accent6">
-                      <a:lumMod val="75000"/>
-                    </a:schemeClr>
-                  </a:solidFill>
-                </a:rPr>
-                <a:t>RoT</a:t>
-              </a:r>
-              <a:r>
                 <a:rPr lang="en-US" dirty="0">
                   <a:solidFill>
                     <a:schemeClr val="accent6">
@@ -9962,7 +10634,7 @@
                     </a:schemeClr>
                   </a:solidFill>
                 </a:rPr>
-                <a:t> established </a:t>
+                <a:t>RoT established </a:t>
               </a:r>
             </a:p>
             <a:p>
@@ -9975,25 +10647,8 @@
                     </a:schemeClr>
                   </a:solidFill>
                 </a:rPr>
-                <a:t>at </a:t>
+                <a:t>at mfg.</a:t>
               </a:r>
-              <a:r>
-                <a:rPr lang="en-US" dirty="0" err="1">
-                  <a:solidFill>
-                    <a:schemeClr val="accent6">
-                      <a:lumMod val="75000"/>
-                    </a:schemeClr>
-                  </a:solidFill>
-                </a:rPr>
-                <a:t>mfg</a:t>
-              </a:r>
-              <a:endParaRPr lang="en-US" dirty="0">
-                <a:solidFill>
-                  <a:schemeClr val="accent6">
-                    <a:lumMod val="75000"/>
-                  </a:schemeClr>
-                </a:solidFill>
-              </a:endParaRPr>
             </a:p>
           </p:txBody>
         </p:sp>
@@ -10442,20 +11097,8 @@
             <a:p>
               <a:pPr algn="ctr"/>
               <a:r>
-                <a:rPr lang="en-US" dirty="0" err="1"/>
-                <a:t>local_attest</a:t>
-              </a:r>
-              <a:r>
                 <a:rPr lang="en-US" dirty="0"/>
-                <a:t>(</a:t>
-              </a:r>
-              <a:r>
-                <a:rPr lang="en-US" dirty="0" err="1"/>
-                <a:t>qe</a:t>
-              </a:r>
-              <a:r>
-                <a:rPr lang="en-US" dirty="0"/>
-                <a:t>), nonce</a:t>
+                <a:t>local_attest(qe), nonce</a:t>
               </a:r>
             </a:p>
           </p:txBody>
@@ -10533,48 +11176,16 @@
             <a:p>
               <a:pPr algn="ctr"/>
               <a:r>
-                <a:rPr lang="en-US" b="1" dirty="0" err="1">
-                  <a:solidFill>
-                    <a:srgbClr val="FF0000"/>
-                  </a:solidFill>
-                </a:rPr>
-                <a:t>enc</a:t>
-              </a:r>
-              <a:r>
                 <a:rPr lang="en-US" b="1" dirty="0">
                   <a:solidFill>
                     <a:srgbClr val="FF0000"/>
                   </a:solidFill>
                 </a:rPr>
-                <a:t>(</a:t>
-              </a:r>
-              <a:r>
-                <a:rPr lang="en-US" b="1" dirty="0" err="1">
-                  <a:solidFill>
-                    <a:srgbClr val="FF0000"/>
-                  </a:solidFill>
-                </a:rPr>
-                <a:t>epid_sig</a:t>
-              </a:r>
-              <a:r>
-                <a:rPr lang="en-US" b="1" dirty="0">
-                  <a:solidFill>
-                    <a:srgbClr val="FF0000"/>
-                  </a:solidFill>
-                </a:rPr>
-                <a:t>)</a:t>
+                <a:t>enc(epid_sig)</a:t>
               </a:r>
               <a:r>
                 <a:rPr lang="en-US" dirty="0"/>
-                <a:t>, </a:t>
-              </a:r>
-              <a:r>
-                <a:rPr lang="en-US" dirty="0" err="1"/>
-                <a:t>local_attest</a:t>
-              </a:r>
-              <a:r>
-                <a:rPr lang="en-US" dirty="0"/>
-                <a:t>(enclave) </a:t>
+                <a:t>, local_attest(enclave) </a:t>
               </a:r>
             </a:p>
           </p:txBody>

</xml_diff>